<commit_message>
[#28] Squash: More introduction screens added
</commit_message>
<xml_diff>
--- a/Spacefarm/assets/www/farming/images/textbox/textboxes powerpoint.pptx
+++ b/Spacefarm/assets/www/farming/images/textbox/textboxes powerpoint.pptx
@@ -288,7 +288,7 @@
           <a:p>
             <a:fld id="{A5739391-7E05-4257-8A89-E6BE91A06449}" type="datetimeFigureOut">
               <a:rPr lang="nl-NL" smtClean="0"/>
-              <a:t>14-12-2014</a:t>
+              <a:t>18-12-2014</a:t>
             </a:fld>
             <a:endParaRPr lang="nl-NL"/>
           </a:p>
@@ -458,7 +458,7 @@
           <a:p>
             <a:fld id="{A5739391-7E05-4257-8A89-E6BE91A06449}" type="datetimeFigureOut">
               <a:rPr lang="nl-NL" smtClean="0"/>
-              <a:t>14-12-2014</a:t>
+              <a:t>18-12-2014</a:t>
             </a:fld>
             <a:endParaRPr lang="nl-NL"/>
           </a:p>
@@ -638,7 +638,7 @@
           <a:p>
             <a:fld id="{A5739391-7E05-4257-8A89-E6BE91A06449}" type="datetimeFigureOut">
               <a:rPr lang="nl-NL" smtClean="0"/>
-              <a:t>14-12-2014</a:t>
+              <a:t>18-12-2014</a:t>
             </a:fld>
             <a:endParaRPr lang="nl-NL"/>
           </a:p>
@@ -808,7 +808,7 @@
           <a:p>
             <a:fld id="{A5739391-7E05-4257-8A89-E6BE91A06449}" type="datetimeFigureOut">
               <a:rPr lang="nl-NL" smtClean="0"/>
-              <a:t>14-12-2014</a:t>
+              <a:t>18-12-2014</a:t>
             </a:fld>
             <a:endParaRPr lang="nl-NL"/>
           </a:p>
@@ -1054,7 +1054,7 @@
           <a:p>
             <a:fld id="{A5739391-7E05-4257-8A89-E6BE91A06449}" type="datetimeFigureOut">
               <a:rPr lang="nl-NL" smtClean="0"/>
-              <a:t>14-12-2014</a:t>
+              <a:t>18-12-2014</a:t>
             </a:fld>
             <a:endParaRPr lang="nl-NL"/>
           </a:p>
@@ -1342,7 +1342,7 @@
           <a:p>
             <a:fld id="{A5739391-7E05-4257-8A89-E6BE91A06449}" type="datetimeFigureOut">
               <a:rPr lang="nl-NL" smtClean="0"/>
-              <a:t>14-12-2014</a:t>
+              <a:t>18-12-2014</a:t>
             </a:fld>
             <a:endParaRPr lang="nl-NL"/>
           </a:p>
@@ -1764,7 +1764,7 @@
           <a:p>
             <a:fld id="{A5739391-7E05-4257-8A89-E6BE91A06449}" type="datetimeFigureOut">
               <a:rPr lang="nl-NL" smtClean="0"/>
-              <a:t>14-12-2014</a:t>
+              <a:t>18-12-2014</a:t>
             </a:fld>
             <a:endParaRPr lang="nl-NL"/>
           </a:p>
@@ -1882,7 +1882,7 @@
           <a:p>
             <a:fld id="{A5739391-7E05-4257-8A89-E6BE91A06449}" type="datetimeFigureOut">
               <a:rPr lang="nl-NL" smtClean="0"/>
-              <a:t>14-12-2014</a:t>
+              <a:t>18-12-2014</a:t>
             </a:fld>
             <a:endParaRPr lang="nl-NL"/>
           </a:p>
@@ -1977,7 +1977,7 @@
           <a:p>
             <a:fld id="{A5739391-7E05-4257-8A89-E6BE91A06449}" type="datetimeFigureOut">
               <a:rPr lang="nl-NL" smtClean="0"/>
-              <a:t>14-12-2014</a:t>
+              <a:t>18-12-2014</a:t>
             </a:fld>
             <a:endParaRPr lang="nl-NL"/>
           </a:p>
@@ -2254,7 +2254,7 @@
           <a:p>
             <a:fld id="{A5739391-7E05-4257-8A89-E6BE91A06449}" type="datetimeFigureOut">
               <a:rPr lang="nl-NL" smtClean="0"/>
-              <a:t>14-12-2014</a:t>
+              <a:t>18-12-2014</a:t>
             </a:fld>
             <a:endParaRPr lang="nl-NL"/>
           </a:p>
@@ -2507,7 +2507,7 @@
           <a:p>
             <a:fld id="{A5739391-7E05-4257-8A89-E6BE91A06449}" type="datetimeFigureOut">
               <a:rPr lang="nl-NL" smtClean="0"/>
-              <a:t>14-12-2014</a:t>
+              <a:t>18-12-2014</a:t>
             </a:fld>
             <a:endParaRPr lang="nl-NL"/>
           </a:p>
@@ -2720,7 +2720,7 @@
           <a:p>
             <a:fld id="{A5739391-7E05-4257-8A89-E6BE91A06449}" type="datetimeFigureOut">
               <a:rPr lang="nl-NL" smtClean="0"/>
-              <a:t>14-12-2014</a:t>
+              <a:t>18-12-2014</a:t>
             </a:fld>
             <a:endParaRPr lang="nl-NL"/>
           </a:p>
@@ -4421,6 +4421,411 @@
           </a:p>
         </p:txBody>
       </p:sp>
+      <p:sp>
+        <p:nvSpPr>
+          <p:cNvPr id="7" name="Rounded Rectangular Callout 3"/>
+          <p:cNvSpPr/>
+          <p:nvPr/>
+        </p:nvSpPr>
+        <p:spPr>
+          <a:xfrm flipH="1">
+            <a:off x="3203848" y="2492896"/>
+            <a:ext cx="2664296" cy="2104308"/>
+          </a:xfrm>
+          <a:custGeom>
+            <a:avLst/>
+            <a:gdLst>
+              <a:gd name="connsiteX0" fmla="*/ 0 w 2088232"/>
+              <a:gd name="connsiteY0" fmla="*/ 240031 h 1440160"/>
+              <a:gd name="connsiteX1" fmla="*/ 240031 w 2088232"/>
+              <a:gd name="connsiteY1" fmla="*/ 0 h 1440160"/>
+              <a:gd name="connsiteX2" fmla="*/ 348039 w 2088232"/>
+              <a:gd name="connsiteY2" fmla="*/ 0 h 1440160"/>
+              <a:gd name="connsiteX3" fmla="*/ 348039 w 2088232"/>
+              <a:gd name="connsiteY3" fmla="*/ 0 h 1440160"/>
+              <a:gd name="connsiteX4" fmla="*/ 870097 w 2088232"/>
+              <a:gd name="connsiteY4" fmla="*/ 0 h 1440160"/>
+              <a:gd name="connsiteX5" fmla="*/ 1848201 w 2088232"/>
+              <a:gd name="connsiteY5" fmla="*/ 0 h 1440160"/>
+              <a:gd name="connsiteX6" fmla="*/ 2088232 w 2088232"/>
+              <a:gd name="connsiteY6" fmla="*/ 240031 h 1440160"/>
+              <a:gd name="connsiteX7" fmla="*/ 2088232 w 2088232"/>
+              <a:gd name="connsiteY7" fmla="*/ 840093 h 1440160"/>
+              <a:gd name="connsiteX8" fmla="*/ 2088232 w 2088232"/>
+              <a:gd name="connsiteY8" fmla="*/ 840093 h 1440160"/>
+              <a:gd name="connsiteX9" fmla="*/ 2088232 w 2088232"/>
+              <a:gd name="connsiteY9" fmla="*/ 1200133 h 1440160"/>
+              <a:gd name="connsiteX10" fmla="*/ 2088232 w 2088232"/>
+              <a:gd name="connsiteY10" fmla="*/ 1200129 h 1440160"/>
+              <a:gd name="connsiteX11" fmla="*/ 1848201 w 2088232"/>
+              <a:gd name="connsiteY11" fmla="*/ 1440160 h 1440160"/>
+              <a:gd name="connsiteX12" fmla="*/ 870097 w 2088232"/>
+              <a:gd name="connsiteY12" fmla="*/ 1440160 h 1440160"/>
+              <a:gd name="connsiteX13" fmla="*/ 641735 w 2088232"/>
+              <a:gd name="connsiteY13" fmla="*/ 2616223 h 1440160"/>
+              <a:gd name="connsiteX14" fmla="*/ 348039 w 2088232"/>
+              <a:gd name="connsiteY14" fmla="*/ 1440160 h 1440160"/>
+              <a:gd name="connsiteX15" fmla="*/ 240031 w 2088232"/>
+              <a:gd name="connsiteY15" fmla="*/ 1440160 h 1440160"/>
+              <a:gd name="connsiteX16" fmla="*/ 0 w 2088232"/>
+              <a:gd name="connsiteY16" fmla="*/ 1200129 h 1440160"/>
+              <a:gd name="connsiteX17" fmla="*/ 0 w 2088232"/>
+              <a:gd name="connsiteY17" fmla="*/ 1200133 h 1440160"/>
+              <a:gd name="connsiteX18" fmla="*/ 0 w 2088232"/>
+              <a:gd name="connsiteY18" fmla="*/ 840093 h 1440160"/>
+              <a:gd name="connsiteX19" fmla="*/ 0 w 2088232"/>
+              <a:gd name="connsiteY19" fmla="*/ 840093 h 1440160"/>
+              <a:gd name="connsiteX20" fmla="*/ 0 w 2088232"/>
+              <a:gd name="connsiteY20" fmla="*/ 240031 h 1440160"/>
+              <a:gd name="connsiteX0" fmla="*/ 0 w 2088232"/>
+              <a:gd name="connsiteY0" fmla="*/ 240031 h 2616223"/>
+              <a:gd name="connsiteX1" fmla="*/ 240031 w 2088232"/>
+              <a:gd name="connsiteY1" fmla="*/ 0 h 2616223"/>
+              <a:gd name="connsiteX2" fmla="*/ 348039 w 2088232"/>
+              <a:gd name="connsiteY2" fmla="*/ 0 h 2616223"/>
+              <a:gd name="connsiteX3" fmla="*/ 348039 w 2088232"/>
+              <a:gd name="connsiteY3" fmla="*/ 0 h 2616223"/>
+              <a:gd name="connsiteX4" fmla="*/ 870097 w 2088232"/>
+              <a:gd name="connsiteY4" fmla="*/ 0 h 2616223"/>
+              <a:gd name="connsiteX5" fmla="*/ 1848201 w 2088232"/>
+              <a:gd name="connsiteY5" fmla="*/ 0 h 2616223"/>
+              <a:gd name="connsiteX6" fmla="*/ 2088232 w 2088232"/>
+              <a:gd name="connsiteY6" fmla="*/ 240031 h 2616223"/>
+              <a:gd name="connsiteX7" fmla="*/ 2088232 w 2088232"/>
+              <a:gd name="connsiteY7" fmla="*/ 840093 h 2616223"/>
+              <a:gd name="connsiteX8" fmla="*/ 2088232 w 2088232"/>
+              <a:gd name="connsiteY8" fmla="*/ 840093 h 2616223"/>
+              <a:gd name="connsiteX9" fmla="*/ 2088232 w 2088232"/>
+              <a:gd name="connsiteY9" fmla="*/ 1200133 h 2616223"/>
+              <a:gd name="connsiteX10" fmla="*/ 2088232 w 2088232"/>
+              <a:gd name="connsiteY10" fmla="*/ 1200129 h 2616223"/>
+              <a:gd name="connsiteX11" fmla="*/ 1848201 w 2088232"/>
+              <a:gd name="connsiteY11" fmla="*/ 1440160 h 2616223"/>
+              <a:gd name="connsiteX12" fmla="*/ 731304 w 2088232"/>
+              <a:gd name="connsiteY12" fmla="*/ 1440160 h 2616223"/>
+              <a:gd name="connsiteX13" fmla="*/ 641735 w 2088232"/>
+              <a:gd name="connsiteY13" fmla="*/ 2616223 h 2616223"/>
+              <a:gd name="connsiteX14" fmla="*/ 348039 w 2088232"/>
+              <a:gd name="connsiteY14" fmla="*/ 1440160 h 2616223"/>
+              <a:gd name="connsiteX15" fmla="*/ 240031 w 2088232"/>
+              <a:gd name="connsiteY15" fmla="*/ 1440160 h 2616223"/>
+              <a:gd name="connsiteX16" fmla="*/ 0 w 2088232"/>
+              <a:gd name="connsiteY16" fmla="*/ 1200129 h 2616223"/>
+              <a:gd name="connsiteX17" fmla="*/ 0 w 2088232"/>
+              <a:gd name="connsiteY17" fmla="*/ 1200133 h 2616223"/>
+              <a:gd name="connsiteX18" fmla="*/ 0 w 2088232"/>
+              <a:gd name="connsiteY18" fmla="*/ 840093 h 2616223"/>
+              <a:gd name="connsiteX19" fmla="*/ 0 w 2088232"/>
+              <a:gd name="connsiteY19" fmla="*/ 840093 h 2616223"/>
+              <a:gd name="connsiteX20" fmla="*/ 0 w 2088232"/>
+              <a:gd name="connsiteY20" fmla="*/ 240031 h 2616223"/>
+              <a:gd name="connsiteX0" fmla="*/ 0 w 2088232"/>
+              <a:gd name="connsiteY0" fmla="*/ 240031 h 2616223"/>
+              <a:gd name="connsiteX1" fmla="*/ 240031 w 2088232"/>
+              <a:gd name="connsiteY1" fmla="*/ 0 h 2616223"/>
+              <a:gd name="connsiteX2" fmla="*/ 348039 w 2088232"/>
+              <a:gd name="connsiteY2" fmla="*/ 0 h 2616223"/>
+              <a:gd name="connsiteX3" fmla="*/ 348039 w 2088232"/>
+              <a:gd name="connsiteY3" fmla="*/ 0 h 2616223"/>
+              <a:gd name="connsiteX4" fmla="*/ 870097 w 2088232"/>
+              <a:gd name="connsiteY4" fmla="*/ 0 h 2616223"/>
+              <a:gd name="connsiteX5" fmla="*/ 1848201 w 2088232"/>
+              <a:gd name="connsiteY5" fmla="*/ 0 h 2616223"/>
+              <a:gd name="connsiteX6" fmla="*/ 2088232 w 2088232"/>
+              <a:gd name="connsiteY6" fmla="*/ 240031 h 2616223"/>
+              <a:gd name="connsiteX7" fmla="*/ 2088232 w 2088232"/>
+              <a:gd name="connsiteY7" fmla="*/ 840093 h 2616223"/>
+              <a:gd name="connsiteX8" fmla="*/ 2088232 w 2088232"/>
+              <a:gd name="connsiteY8" fmla="*/ 840093 h 2616223"/>
+              <a:gd name="connsiteX9" fmla="*/ 2088232 w 2088232"/>
+              <a:gd name="connsiteY9" fmla="*/ 1200133 h 2616223"/>
+              <a:gd name="connsiteX10" fmla="*/ 2088232 w 2088232"/>
+              <a:gd name="connsiteY10" fmla="*/ 1200129 h 2616223"/>
+              <a:gd name="connsiteX11" fmla="*/ 1848201 w 2088232"/>
+              <a:gd name="connsiteY11" fmla="*/ 1440160 h 2616223"/>
+              <a:gd name="connsiteX12" fmla="*/ 731304 w 2088232"/>
+              <a:gd name="connsiteY12" fmla="*/ 1440160 h 2616223"/>
+              <a:gd name="connsiteX13" fmla="*/ 641735 w 2088232"/>
+              <a:gd name="connsiteY13" fmla="*/ 2616223 h 2616223"/>
+              <a:gd name="connsiteX14" fmla="*/ 511324 w 2088232"/>
+              <a:gd name="connsiteY14" fmla="*/ 1448324 h 2616223"/>
+              <a:gd name="connsiteX15" fmla="*/ 240031 w 2088232"/>
+              <a:gd name="connsiteY15" fmla="*/ 1440160 h 2616223"/>
+              <a:gd name="connsiteX16" fmla="*/ 0 w 2088232"/>
+              <a:gd name="connsiteY16" fmla="*/ 1200129 h 2616223"/>
+              <a:gd name="connsiteX17" fmla="*/ 0 w 2088232"/>
+              <a:gd name="connsiteY17" fmla="*/ 1200133 h 2616223"/>
+              <a:gd name="connsiteX18" fmla="*/ 0 w 2088232"/>
+              <a:gd name="connsiteY18" fmla="*/ 840093 h 2616223"/>
+              <a:gd name="connsiteX19" fmla="*/ 0 w 2088232"/>
+              <a:gd name="connsiteY19" fmla="*/ 840093 h 2616223"/>
+              <a:gd name="connsiteX20" fmla="*/ 0 w 2088232"/>
+              <a:gd name="connsiteY20" fmla="*/ 240031 h 2616223"/>
+              <a:gd name="connsiteX0" fmla="*/ 0 w 2088232"/>
+              <a:gd name="connsiteY0" fmla="*/ 240031 h 2216173"/>
+              <a:gd name="connsiteX1" fmla="*/ 240031 w 2088232"/>
+              <a:gd name="connsiteY1" fmla="*/ 0 h 2216173"/>
+              <a:gd name="connsiteX2" fmla="*/ 348039 w 2088232"/>
+              <a:gd name="connsiteY2" fmla="*/ 0 h 2216173"/>
+              <a:gd name="connsiteX3" fmla="*/ 348039 w 2088232"/>
+              <a:gd name="connsiteY3" fmla="*/ 0 h 2216173"/>
+              <a:gd name="connsiteX4" fmla="*/ 870097 w 2088232"/>
+              <a:gd name="connsiteY4" fmla="*/ 0 h 2216173"/>
+              <a:gd name="connsiteX5" fmla="*/ 1848201 w 2088232"/>
+              <a:gd name="connsiteY5" fmla="*/ 0 h 2216173"/>
+              <a:gd name="connsiteX6" fmla="*/ 2088232 w 2088232"/>
+              <a:gd name="connsiteY6" fmla="*/ 240031 h 2216173"/>
+              <a:gd name="connsiteX7" fmla="*/ 2088232 w 2088232"/>
+              <a:gd name="connsiteY7" fmla="*/ 840093 h 2216173"/>
+              <a:gd name="connsiteX8" fmla="*/ 2088232 w 2088232"/>
+              <a:gd name="connsiteY8" fmla="*/ 840093 h 2216173"/>
+              <a:gd name="connsiteX9" fmla="*/ 2088232 w 2088232"/>
+              <a:gd name="connsiteY9" fmla="*/ 1200133 h 2216173"/>
+              <a:gd name="connsiteX10" fmla="*/ 2088232 w 2088232"/>
+              <a:gd name="connsiteY10" fmla="*/ 1200129 h 2216173"/>
+              <a:gd name="connsiteX11" fmla="*/ 1848201 w 2088232"/>
+              <a:gd name="connsiteY11" fmla="*/ 1440160 h 2216173"/>
+              <a:gd name="connsiteX12" fmla="*/ 731304 w 2088232"/>
+              <a:gd name="connsiteY12" fmla="*/ 1440160 h 2216173"/>
+              <a:gd name="connsiteX13" fmla="*/ 641735 w 2088232"/>
+              <a:gd name="connsiteY13" fmla="*/ 2216173 h 2216173"/>
+              <a:gd name="connsiteX14" fmla="*/ 511324 w 2088232"/>
+              <a:gd name="connsiteY14" fmla="*/ 1448324 h 2216173"/>
+              <a:gd name="connsiteX15" fmla="*/ 240031 w 2088232"/>
+              <a:gd name="connsiteY15" fmla="*/ 1440160 h 2216173"/>
+              <a:gd name="connsiteX16" fmla="*/ 0 w 2088232"/>
+              <a:gd name="connsiteY16" fmla="*/ 1200129 h 2216173"/>
+              <a:gd name="connsiteX17" fmla="*/ 0 w 2088232"/>
+              <a:gd name="connsiteY17" fmla="*/ 1200133 h 2216173"/>
+              <a:gd name="connsiteX18" fmla="*/ 0 w 2088232"/>
+              <a:gd name="connsiteY18" fmla="*/ 840093 h 2216173"/>
+              <a:gd name="connsiteX19" fmla="*/ 0 w 2088232"/>
+              <a:gd name="connsiteY19" fmla="*/ 840093 h 2216173"/>
+              <a:gd name="connsiteX20" fmla="*/ 0 w 2088232"/>
+              <a:gd name="connsiteY20" fmla="*/ 240031 h 2216173"/>
+              <a:gd name="connsiteX0" fmla="*/ 0 w 2088232"/>
+              <a:gd name="connsiteY0" fmla="*/ 240031 h 2216173"/>
+              <a:gd name="connsiteX1" fmla="*/ 240031 w 2088232"/>
+              <a:gd name="connsiteY1" fmla="*/ 0 h 2216173"/>
+              <a:gd name="connsiteX2" fmla="*/ 348039 w 2088232"/>
+              <a:gd name="connsiteY2" fmla="*/ 0 h 2216173"/>
+              <a:gd name="connsiteX3" fmla="*/ 348039 w 2088232"/>
+              <a:gd name="connsiteY3" fmla="*/ 0 h 2216173"/>
+              <a:gd name="connsiteX4" fmla="*/ 870097 w 2088232"/>
+              <a:gd name="connsiteY4" fmla="*/ 0 h 2216173"/>
+              <a:gd name="connsiteX5" fmla="*/ 1848201 w 2088232"/>
+              <a:gd name="connsiteY5" fmla="*/ 0 h 2216173"/>
+              <a:gd name="connsiteX6" fmla="*/ 2088232 w 2088232"/>
+              <a:gd name="connsiteY6" fmla="*/ 240031 h 2216173"/>
+              <a:gd name="connsiteX7" fmla="*/ 2088232 w 2088232"/>
+              <a:gd name="connsiteY7" fmla="*/ 840093 h 2216173"/>
+              <a:gd name="connsiteX8" fmla="*/ 2088232 w 2088232"/>
+              <a:gd name="connsiteY8" fmla="*/ 840093 h 2216173"/>
+              <a:gd name="connsiteX9" fmla="*/ 2088232 w 2088232"/>
+              <a:gd name="connsiteY9" fmla="*/ 1200133 h 2216173"/>
+              <a:gd name="connsiteX10" fmla="*/ 2088232 w 2088232"/>
+              <a:gd name="connsiteY10" fmla="*/ 1200129 h 2216173"/>
+              <a:gd name="connsiteX11" fmla="*/ 1848201 w 2088232"/>
+              <a:gd name="connsiteY11" fmla="*/ 1440160 h 2216173"/>
+              <a:gd name="connsiteX12" fmla="*/ 731304 w 2088232"/>
+              <a:gd name="connsiteY12" fmla="*/ 1440160 h 2216173"/>
+              <a:gd name="connsiteX13" fmla="*/ 617242 w 2088232"/>
+              <a:gd name="connsiteY13" fmla="*/ 2216173 h 2216173"/>
+              <a:gd name="connsiteX14" fmla="*/ 511324 w 2088232"/>
+              <a:gd name="connsiteY14" fmla="*/ 1448324 h 2216173"/>
+              <a:gd name="connsiteX15" fmla="*/ 240031 w 2088232"/>
+              <a:gd name="connsiteY15" fmla="*/ 1440160 h 2216173"/>
+              <a:gd name="connsiteX16" fmla="*/ 0 w 2088232"/>
+              <a:gd name="connsiteY16" fmla="*/ 1200129 h 2216173"/>
+              <a:gd name="connsiteX17" fmla="*/ 0 w 2088232"/>
+              <a:gd name="connsiteY17" fmla="*/ 1200133 h 2216173"/>
+              <a:gd name="connsiteX18" fmla="*/ 0 w 2088232"/>
+              <a:gd name="connsiteY18" fmla="*/ 840093 h 2216173"/>
+              <a:gd name="connsiteX19" fmla="*/ 0 w 2088232"/>
+              <a:gd name="connsiteY19" fmla="*/ 840093 h 2216173"/>
+              <a:gd name="connsiteX20" fmla="*/ 0 w 2088232"/>
+              <a:gd name="connsiteY20" fmla="*/ 240031 h 2216173"/>
+            </a:gdLst>
+            <a:ahLst/>
+            <a:cxnLst>
+              <a:cxn ang="0">
+                <a:pos x="connsiteX0" y="connsiteY0"/>
+              </a:cxn>
+              <a:cxn ang="0">
+                <a:pos x="connsiteX1" y="connsiteY1"/>
+              </a:cxn>
+              <a:cxn ang="0">
+                <a:pos x="connsiteX2" y="connsiteY2"/>
+              </a:cxn>
+              <a:cxn ang="0">
+                <a:pos x="connsiteX3" y="connsiteY3"/>
+              </a:cxn>
+              <a:cxn ang="0">
+                <a:pos x="connsiteX4" y="connsiteY4"/>
+              </a:cxn>
+              <a:cxn ang="0">
+                <a:pos x="connsiteX5" y="connsiteY5"/>
+              </a:cxn>
+              <a:cxn ang="0">
+                <a:pos x="connsiteX6" y="connsiteY6"/>
+              </a:cxn>
+              <a:cxn ang="0">
+                <a:pos x="connsiteX7" y="connsiteY7"/>
+              </a:cxn>
+              <a:cxn ang="0">
+                <a:pos x="connsiteX8" y="connsiteY8"/>
+              </a:cxn>
+              <a:cxn ang="0">
+                <a:pos x="connsiteX9" y="connsiteY9"/>
+              </a:cxn>
+              <a:cxn ang="0">
+                <a:pos x="connsiteX10" y="connsiteY10"/>
+              </a:cxn>
+              <a:cxn ang="0">
+                <a:pos x="connsiteX11" y="connsiteY11"/>
+              </a:cxn>
+              <a:cxn ang="0">
+                <a:pos x="connsiteX12" y="connsiteY12"/>
+              </a:cxn>
+              <a:cxn ang="0">
+                <a:pos x="connsiteX13" y="connsiteY13"/>
+              </a:cxn>
+              <a:cxn ang="0">
+                <a:pos x="connsiteX14" y="connsiteY14"/>
+              </a:cxn>
+              <a:cxn ang="0">
+                <a:pos x="connsiteX15" y="connsiteY15"/>
+              </a:cxn>
+              <a:cxn ang="0">
+                <a:pos x="connsiteX16" y="connsiteY16"/>
+              </a:cxn>
+              <a:cxn ang="0">
+                <a:pos x="connsiteX17" y="connsiteY17"/>
+              </a:cxn>
+              <a:cxn ang="0">
+                <a:pos x="connsiteX18" y="connsiteY18"/>
+              </a:cxn>
+              <a:cxn ang="0">
+                <a:pos x="connsiteX19" y="connsiteY19"/>
+              </a:cxn>
+              <a:cxn ang="0">
+                <a:pos x="connsiteX20" y="connsiteY20"/>
+              </a:cxn>
+            </a:cxnLst>
+            <a:rect l="l" t="t" r="r" b="b"/>
+            <a:pathLst>
+              <a:path w="2088232" h="2216173">
+                <a:moveTo>
+                  <a:pt x="0" y="240031"/>
+                </a:moveTo>
+                <a:cubicBezTo>
+                  <a:pt x="0" y="107466"/>
+                  <a:pt x="107466" y="0"/>
+                  <a:pt x="240031" y="0"/>
+                </a:cubicBezTo>
+                <a:lnTo>
+                  <a:pt x="348039" y="0"/>
+                </a:lnTo>
+                <a:lnTo>
+                  <a:pt x="348039" y="0"/>
+                </a:lnTo>
+                <a:lnTo>
+                  <a:pt x="870097" y="0"/>
+                </a:lnTo>
+                <a:lnTo>
+                  <a:pt x="1848201" y="0"/>
+                </a:lnTo>
+                <a:cubicBezTo>
+                  <a:pt x="1980766" y="0"/>
+                  <a:pt x="2088232" y="107466"/>
+                  <a:pt x="2088232" y="240031"/>
+                </a:cubicBezTo>
+                <a:lnTo>
+                  <a:pt x="2088232" y="840093"/>
+                </a:lnTo>
+                <a:lnTo>
+                  <a:pt x="2088232" y="840093"/>
+                </a:lnTo>
+                <a:lnTo>
+                  <a:pt x="2088232" y="1200133"/>
+                </a:lnTo>
+                <a:lnTo>
+                  <a:pt x="2088232" y="1200129"/>
+                </a:lnTo>
+                <a:cubicBezTo>
+                  <a:pt x="2088232" y="1332694"/>
+                  <a:pt x="1980766" y="1440160"/>
+                  <a:pt x="1848201" y="1440160"/>
+                </a:cubicBezTo>
+                <a:lnTo>
+                  <a:pt x="731304" y="1440160"/>
+                </a:lnTo>
+                <a:lnTo>
+                  <a:pt x="617242" y="2216173"/>
+                </a:lnTo>
+                <a:lnTo>
+                  <a:pt x="511324" y="1448324"/>
+                </a:lnTo>
+                <a:lnTo>
+                  <a:pt x="240031" y="1440160"/>
+                </a:lnTo>
+                <a:cubicBezTo>
+                  <a:pt x="107466" y="1440160"/>
+                  <a:pt x="0" y="1332694"/>
+                  <a:pt x="0" y="1200129"/>
+                </a:cubicBezTo>
+                <a:lnTo>
+                  <a:pt x="0" y="1200133"/>
+                </a:lnTo>
+                <a:lnTo>
+                  <a:pt x="0" y="840093"/>
+                </a:lnTo>
+                <a:lnTo>
+                  <a:pt x="0" y="840093"/>
+                </a:lnTo>
+                <a:lnTo>
+                  <a:pt x="0" y="240031"/>
+                </a:lnTo>
+                <a:close/>
+              </a:path>
+            </a:pathLst>
+          </a:custGeom>
+          <a:solidFill>
+            <a:schemeClr val="bg1"/>
+          </a:solidFill>
+          <a:ln w="9525">
+            <a:solidFill>
+              <a:schemeClr val="bg1">
+                <a:lumMod val="65000"/>
+              </a:schemeClr>
+            </a:solidFill>
+          </a:ln>
+        </p:spPr>
+        <p:style>
+          <a:lnRef idx="2">
+            <a:schemeClr val="accent1">
+              <a:shade val="50000"/>
+            </a:schemeClr>
+          </a:lnRef>
+          <a:fillRef idx="1">
+            <a:schemeClr val="accent1"/>
+          </a:fillRef>
+          <a:effectRef idx="0">
+            <a:schemeClr val="accent1"/>
+          </a:effectRef>
+          <a:fontRef idx="minor">
+            <a:schemeClr val="lt1"/>
+          </a:fontRef>
+        </p:style>
+        <p:txBody>
+          <a:bodyPr rtlCol="0" anchor="ctr"/>
+          <a:lstStyle/>
+          <a:p>
+            <a:pPr algn="ctr"/>
+            <a:endParaRPr lang="nl-NL"/>
+          </a:p>
+        </p:txBody>
+      </p:sp>
     </p:spTree>
     <p:extLst>
       <p:ext uri="{BB962C8B-B14F-4D97-AF65-F5344CB8AC3E}">

</xml_diff>

<commit_message>
[fixes #28] Finished introduction and changed BODY text
</commit_message>
<xml_diff>
--- a/Spacefarm/assets/www/farming/images/textbox/textboxes powerpoint.pptx
+++ b/Spacefarm/assets/www/farming/images/textbox/textboxes powerpoint.pptx
@@ -288,7 +288,7 @@
           <a:p>
             <a:fld id="{A5739391-7E05-4257-8A89-E6BE91A06449}" type="datetimeFigureOut">
               <a:rPr lang="nl-NL" smtClean="0"/>
-              <a:t>18-12-2014</a:t>
+              <a:t>19-12-2014</a:t>
             </a:fld>
             <a:endParaRPr lang="nl-NL"/>
           </a:p>
@@ -458,7 +458,7 @@
           <a:p>
             <a:fld id="{A5739391-7E05-4257-8A89-E6BE91A06449}" type="datetimeFigureOut">
               <a:rPr lang="nl-NL" smtClean="0"/>
-              <a:t>18-12-2014</a:t>
+              <a:t>19-12-2014</a:t>
             </a:fld>
             <a:endParaRPr lang="nl-NL"/>
           </a:p>
@@ -638,7 +638,7 @@
           <a:p>
             <a:fld id="{A5739391-7E05-4257-8A89-E6BE91A06449}" type="datetimeFigureOut">
               <a:rPr lang="nl-NL" smtClean="0"/>
-              <a:t>18-12-2014</a:t>
+              <a:t>19-12-2014</a:t>
             </a:fld>
             <a:endParaRPr lang="nl-NL"/>
           </a:p>
@@ -808,7 +808,7 @@
           <a:p>
             <a:fld id="{A5739391-7E05-4257-8A89-E6BE91A06449}" type="datetimeFigureOut">
               <a:rPr lang="nl-NL" smtClean="0"/>
-              <a:t>18-12-2014</a:t>
+              <a:t>19-12-2014</a:t>
             </a:fld>
             <a:endParaRPr lang="nl-NL"/>
           </a:p>
@@ -1054,7 +1054,7 @@
           <a:p>
             <a:fld id="{A5739391-7E05-4257-8A89-E6BE91A06449}" type="datetimeFigureOut">
               <a:rPr lang="nl-NL" smtClean="0"/>
-              <a:t>18-12-2014</a:t>
+              <a:t>19-12-2014</a:t>
             </a:fld>
             <a:endParaRPr lang="nl-NL"/>
           </a:p>
@@ -1342,7 +1342,7 @@
           <a:p>
             <a:fld id="{A5739391-7E05-4257-8A89-E6BE91A06449}" type="datetimeFigureOut">
               <a:rPr lang="nl-NL" smtClean="0"/>
-              <a:t>18-12-2014</a:t>
+              <a:t>19-12-2014</a:t>
             </a:fld>
             <a:endParaRPr lang="nl-NL"/>
           </a:p>
@@ -1764,7 +1764,7 @@
           <a:p>
             <a:fld id="{A5739391-7E05-4257-8A89-E6BE91A06449}" type="datetimeFigureOut">
               <a:rPr lang="nl-NL" smtClean="0"/>
-              <a:t>18-12-2014</a:t>
+              <a:t>19-12-2014</a:t>
             </a:fld>
             <a:endParaRPr lang="nl-NL"/>
           </a:p>
@@ -1882,7 +1882,7 @@
           <a:p>
             <a:fld id="{A5739391-7E05-4257-8A89-E6BE91A06449}" type="datetimeFigureOut">
               <a:rPr lang="nl-NL" smtClean="0"/>
-              <a:t>18-12-2014</a:t>
+              <a:t>19-12-2014</a:t>
             </a:fld>
             <a:endParaRPr lang="nl-NL"/>
           </a:p>
@@ -1977,7 +1977,7 @@
           <a:p>
             <a:fld id="{A5739391-7E05-4257-8A89-E6BE91A06449}" type="datetimeFigureOut">
               <a:rPr lang="nl-NL" smtClean="0"/>
-              <a:t>18-12-2014</a:t>
+              <a:t>19-12-2014</a:t>
             </a:fld>
             <a:endParaRPr lang="nl-NL"/>
           </a:p>
@@ -2254,7 +2254,7 @@
           <a:p>
             <a:fld id="{A5739391-7E05-4257-8A89-E6BE91A06449}" type="datetimeFigureOut">
               <a:rPr lang="nl-NL" smtClean="0"/>
-              <a:t>18-12-2014</a:t>
+              <a:t>19-12-2014</a:t>
             </a:fld>
             <a:endParaRPr lang="nl-NL"/>
           </a:p>
@@ -2507,7 +2507,7 @@
           <a:p>
             <a:fld id="{A5739391-7E05-4257-8A89-E6BE91A06449}" type="datetimeFigureOut">
               <a:rPr lang="nl-NL" smtClean="0"/>
-              <a:t>18-12-2014</a:t>
+              <a:t>19-12-2014</a:t>
             </a:fld>
             <a:endParaRPr lang="nl-NL"/>
           </a:p>
@@ -2720,7 +2720,7 @@
           <a:p>
             <a:fld id="{A5739391-7E05-4257-8A89-E6BE91A06449}" type="datetimeFigureOut">
               <a:rPr lang="nl-NL" smtClean="0"/>
-              <a:t>18-12-2014</a:t>
+              <a:t>19-12-2014</a:t>
             </a:fld>
             <a:endParaRPr lang="nl-NL"/>
           </a:p>
@@ -4826,6 +4826,837 @@
           </a:p>
         </p:txBody>
       </p:sp>
+      <p:sp>
+        <p:nvSpPr>
+          <p:cNvPr id="8" name="Rounded Rectangular Callout 5"/>
+          <p:cNvSpPr/>
+          <p:nvPr/>
+        </p:nvSpPr>
+        <p:spPr>
+          <a:xfrm rot="16200000" flipH="1">
+            <a:off x="6841420" y="2166338"/>
+            <a:ext cx="1320623" cy="2261771"/>
+          </a:xfrm>
+          <a:custGeom>
+            <a:avLst/>
+            <a:gdLst>
+              <a:gd name="connsiteX0" fmla="*/ 0 w 1944216"/>
+              <a:gd name="connsiteY0" fmla="*/ 180024 h 1080120"/>
+              <a:gd name="connsiteX1" fmla="*/ 180024 w 1944216"/>
+              <a:gd name="connsiteY1" fmla="*/ 0 h 1080120"/>
+              <a:gd name="connsiteX2" fmla="*/ 324036 w 1944216"/>
+              <a:gd name="connsiteY2" fmla="*/ 0 h 1080120"/>
+              <a:gd name="connsiteX3" fmla="*/ 324036 w 1944216"/>
+              <a:gd name="connsiteY3" fmla="*/ 0 h 1080120"/>
+              <a:gd name="connsiteX4" fmla="*/ 810090 w 1944216"/>
+              <a:gd name="connsiteY4" fmla="*/ 0 h 1080120"/>
+              <a:gd name="connsiteX5" fmla="*/ 1764192 w 1944216"/>
+              <a:gd name="connsiteY5" fmla="*/ 0 h 1080120"/>
+              <a:gd name="connsiteX6" fmla="*/ 1944216 w 1944216"/>
+              <a:gd name="connsiteY6" fmla="*/ 180024 h 1080120"/>
+              <a:gd name="connsiteX7" fmla="*/ 1944216 w 1944216"/>
+              <a:gd name="connsiteY7" fmla="*/ 630070 h 1080120"/>
+              <a:gd name="connsiteX8" fmla="*/ 1944216 w 1944216"/>
+              <a:gd name="connsiteY8" fmla="*/ 630070 h 1080120"/>
+              <a:gd name="connsiteX9" fmla="*/ 1944216 w 1944216"/>
+              <a:gd name="connsiteY9" fmla="*/ 900100 h 1080120"/>
+              <a:gd name="connsiteX10" fmla="*/ 1944216 w 1944216"/>
+              <a:gd name="connsiteY10" fmla="*/ 900096 h 1080120"/>
+              <a:gd name="connsiteX11" fmla="*/ 1764192 w 1944216"/>
+              <a:gd name="connsiteY11" fmla="*/ 1080120 h 1080120"/>
+              <a:gd name="connsiteX12" fmla="*/ 810090 w 1944216"/>
+              <a:gd name="connsiteY12" fmla="*/ 1080120 h 1080120"/>
+              <a:gd name="connsiteX13" fmla="*/ 544206 w 1944216"/>
+              <a:gd name="connsiteY13" fmla="*/ 1710435 h 1080120"/>
+              <a:gd name="connsiteX14" fmla="*/ 324036 w 1944216"/>
+              <a:gd name="connsiteY14" fmla="*/ 1080120 h 1080120"/>
+              <a:gd name="connsiteX15" fmla="*/ 180024 w 1944216"/>
+              <a:gd name="connsiteY15" fmla="*/ 1080120 h 1080120"/>
+              <a:gd name="connsiteX16" fmla="*/ 0 w 1944216"/>
+              <a:gd name="connsiteY16" fmla="*/ 900096 h 1080120"/>
+              <a:gd name="connsiteX17" fmla="*/ 0 w 1944216"/>
+              <a:gd name="connsiteY17" fmla="*/ 900100 h 1080120"/>
+              <a:gd name="connsiteX18" fmla="*/ 0 w 1944216"/>
+              <a:gd name="connsiteY18" fmla="*/ 630070 h 1080120"/>
+              <a:gd name="connsiteX19" fmla="*/ 0 w 1944216"/>
+              <a:gd name="connsiteY19" fmla="*/ 630070 h 1080120"/>
+              <a:gd name="connsiteX20" fmla="*/ 0 w 1944216"/>
+              <a:gd name="connsiteY20" fmla="*/ 180024 h 1080120"/>
+              <a:gd name="connsiteX0" fmla="*/ 0 w 1944216"/>
+              <a:gd name="connsiteY0" fmla="*/ 180024 h 1710435"/>
+              <a:gd name="connsiteX1" fmla="*/ 180024 w 1944216"/>
+              <a:gd name="connsiteY1" fmla="*/ 0 h 1710435"/>
+              <a:gd name="connsiteX2" fmla="*/ 324036 w 1944216"/>
+              <a:gd name="connsiteY2" fmla="*/ 0 h 1710435"/>
+              <a:gd name="connsiteX3" fmla="*/ 324036 w 1944216"/>
+              <a:gd name="connsiteY3" fmla="*/ 0 h 1710435"/>
+              <a:gd name="connsiteX4" fmla="*/ 810090 w 1944216"/>
+              <a:gd name="connsiteY4" fmla="*/ 0 h 1710435"/>
+              <a:gd name="connsiteX5" fmla="*/ 1764192 w 1944216"/>
+              <a:gd name="connsiteY5" fmla="*/ 0 h 1710435"/>
+              <a:gd name="connsiteX6" fmla="*/ 1944216 w 1944216"/>
+              <a:gd name="connsiteY6" fmla="*/ 180024 h 1710435"/>
+              <a:gd name="connsiteX7" fmla="*/ 1944216 w 1944216"/>
+              <a:gd name="connsiteY7" fmla="*/ 630070 h 1710435"/>
+              <a:gd name="connsiteX8" fmla="*/ 1944216 w 1944216"/>
+              <a:gd name="connsiteY8" fmla="*/ 630070 h 1710435"/>
+              <a:gd name="connsiteX9" fmla="*/ 1944216 w 1944216"/>
+              <a:gd name="connsiteY9" fmla="*/ 900100 h 1710435"/>
+              <a:gd name="connsiteX10" fmla="*/ 1944216 w 1944216"/>
+              <a:gd name="connsiteY10" fmla="*/ 900096 h 1710435"/>
+              <a:gd name="connsiteX11" fmla="*/ 1764192 w 1944216"/>
+              <a:gd name="connsiteY11" fmla="*/ 1080120 h 1710435"/>
+              <a:gd name="connsiteX12" fmla="*/ 810090 w 1944216"/>
+              <a:gd name="connsiteY12" fmla="*/ 1080120 h 1710435"/>
+              <a:gd name="connsiteX13" fmla="*/ 544206 w 1944216"/>
+              <a:gd name="connsiteY13" fmla="*/ 1710435 h 1710435"/>
+              <a:gd name="connsiteX14" fmla="*/ 461196 w 1944216"/>
+              <a:gd name="connsiteY14" fmla="*/ 1080120 h 1710435"/>
+              <a:gd name="connsiteX15" fmla="*/ 180024 w 1944216"/>
+              <a:gd name="connsiteY15" fmla="*/ 1080120 h 1710435"/>
+              <a:gd name="connsiteX16" fmla="*/ 0 w 1944216"/>
+              <a:gd name="connsiteY16" fmla="*/ 900096 h 1710435"/>
+              <a:gd name="connsiteX17" fmla="*/ 0 w 1944216"/>
+              <a:gd name="connsiteY17" fmla="*/ 900100 h 1710435"/>
+              <a:gd name="connsiteX18" fmla="*/ 0 w 1944216"/>
+              <a:gd name="connsiteY18" fmla="*/ 630070 h 1710435"/>
+              <a:gd name="connsiteX19" fmla="*/ 0 w 1944216"/>
+              <a:gd name="connsiteY19" fmla="*/ 630070 h 1710435"/>
+              <a:gd name="connsiteX20" fmla="*/ 0 w 1944216"/>
+              <a:gd name="connsiteY20" fmla="*/ 180024 h 1710435"/>
+              <a:gd name="connsiteX0" fmla="*/ 0 w 1944216"/>
+              <a:gd name="connsiteY0" fmla="*/ 180024 h 1710435"/>
+              <a:gd name="connsiteX1" fmla="*/ 180024 w 1944216"/>
+              <a:gd name="connsiteY1" fmla="*/ 0 h 1710435"/>
+              <a:gd name="connsiteX2" fmla="*/ 324036 w 1944216"/>
+              <a:gd name="connsiteY2" fmla="*/ 0 h 1710435"/>
+              <a:gd name="connsiteX3" fmla="*/ 324036 w 1944216"/>
+              <a:gd name="connsiteY3" fmla="*/ 0 h 1710435"/>
+              <a:gd name="connsiteX4" fmla="*/ 810090 w 1944216"/>
+              <a:gd name="connsiteY4" fmla="*/ 0 h 1710435"/>
+              <a:gd name="connsiteX5" fmla="*/ 1764192 w 1944216"/>
+              <a:gd name="connsiteY5" fmla="*/ 0 h 1710435"/>
+              <a:gd name="connsiteX6" fmla="*/ 1944216 w 1944216"/>
+              <a:gd name="connsiteY6" fmla="*/ 180024 h 1710435"/>
+              <a:gd name="connsiteX7" fmla="*/ 1944216 w 1944216"/>
+              <a:gd name="connsiteY7" fmla="*/ 630070 h 1710435"/>
+              <a:gd name="connsiteX8" fmla="*/ 1944216 w 1944216"/>
+              <a:gd name="connsiteY8" fmla="*/ 630070 h 1710435"/>
+              <a:gd name="connsiteX9" fmla="*/ 1944216 w 1944216"/>
+              <a:gd name="connsiteY9" fmla="*/ 900100 h 1710435"/>
+              <a:gd name="connsiteX10" fmla="*/ 1944216 w 1944216"/>
+              <a:gd name="connsiteY10" fmla="*/ 900096 h 1710435"/>
+              <a:gd name="connsiteX11" fmla="*/ 1764192 w 1944216"/>
+              <a:gd name="connsiteY11" fmla="*/ 1080120 h 1710435"/>
+              <a:gd name="connsiteX12" fmla="*/ 650070 w 1944216"/>
+              <a:gd name="connsiteY12" fmla="*/ 1080120 h 1710435"/>
+              <a:gd name="connsiteX13" fmla="*/ 544206 w 1944216"/>
+              <a:gd name="connsiteY13" fmla="*/ 1710435 h 1710435"/>
+              <a:gd name="connsiteX14" fmla="*/ 461196 w 1944216"/>
+              <a:gd name="connsiteY14" fmla="*/ 1080120 h 1710435"/>
+              <a:gd name="connsiteX15" fmla="*/ 180024 w 1944216"/>
+              <a:gd name="connsiteY15" fmla="*/ 1080120 h 1710435"/>
+              <a:gd name="connsiteX16" fmla="*/ 0 w 1944216"/>
+              <a:gd name="connsiteY16" fmla="*/ 900096 h 1710435"/>
+              <a:gd name="connsiteX17" fmla="*/ 0 w 1944216"/>
+              <a:gd name="connsiteY17" fmla="*/ 900100 h 1710435"/>
+              <a:gd name="connsiteX18" fmla="*/ 0 w 1944216"/>
+              <a:gd name="connsiteY18" fmla="*/ 630070 h 1710435"/>
+              <a:gd name="connsiteX19" fmla="*/ 0 w 1944216"/>
+              <a:gd name="connsiteY19" fmla="*/ 630070 h 1710435"/>
+              <a:gd name="connsiteX20" fmla="*/ 0 w 1944216"/>
+              <a:gd name="connsiteY20" fmla="*/ 180024 h 1710435"/>
+              <a:gd name="connsiteX0" fmla="*/ 0 w 1944216"/>
+              <a:gd name="connsiteY0" fmla="*/ 180024 h 1710435"/>
+              <a:gd name="connsiteX1" fmla="*/ 180024 w 1944216"/>
+              <a:gd name="connsiteY1" fmla="*/ 0 h 1710435"/>
+              <a:gd name="connsiteX2" fmla="*/ 324036 w 1944216"/>
+              <a:gd name="connsiteY2" fmla="*/ 0 h 1710435"/>
+              <a:gd name="connsiteX3" fmla="*/ 324036 w 1944216"/>
+              <a:gd name="connsiteY3" fmla="*/ 0 h 1710435"/>
+              <a:gd name="connsiteX4" fmla="*/ 810090 w 1944216"/>
+              <a:gd name="connsiteY4" fmla="*/ 0 h 1710435"/>
+              <a:gd name="connsiteX5" fmla="*/ 1764192 w 1944216"/>
+              <a:gd name="connsiteY5" fmla="*/ 0 h 1710435"/>
+              <a:gd name="connsiteX6" fmla="*/ 1944216 w 1944216"/>
+              <a:gd name="connsiteY6" fmla="*/ 180024 h 1710435"/>
+              <a:gd name="connsiteX7" fmla="*/ 1944216 w 1944216"/>
+              <a:gd name="connsiteY7" fmla="*/ 630070 h 1710435"/>
+              <a:gd name="connsiteX8" fmla="*/ 1944216 w 1944216"/>
+              <a:gd name="connsiteY8" fmla="*/ 630070 h 1710435"/>
+              <a:gd name="connsiteX9" fmla="*/ 1944216 w 1944216"/>
+              <a:gd name="connsiteY9" fmla="*/ 900100 h 1710435"/>
+              <a:gd name="connsiteX10" fmla="*/ 1944216 w 1944216"/>
+              <a:gd name="connsiteY10" fmla="*/ 900096 h 1710435"/>
+              <a:gd name="connsiteX11" fmla="*/ 1764192 w 1944216"/>
+              <a:gd name="connsiteY11" fmla="*/ 1080120 h 1710435"/>
+              <a:gd name="connsiteX12" fmla="*/ 922907 w 1944216"/>
+              <a:gd name="connsiteY12" fmla="*/ 1078218 h 1710435"/>
+              <a:gd name="connsiteX13" fmla="*/ 544206 w 1944216"/>
+              <a:gd name="connsiteY13" fmla="*/ 1710435 h 1710435"/>
+              <a:gd name="connsiteX14" fmla="*/ 461196 w 1944216"/>
+              <a:gd name="connsiteY14" fmla="*/ 1080120 h 1710435"/>
+              <a:gd name="connsiteX15" fmla="*/ 180024 w 1944216"/>
+              <a:gd name="connsiteY15" fmla="*/ 1080120 h 1710435"/>
+              <a:gd name="connsiteX16" fmla="*/ 0 w 1944216"/>
+              <a:gd name="connsiteY16" fmla="*/ 900096 h 1710435"/>
+              <a:gd name="connsiteX17" fmla="*/ 0 w 1944216"/>
+              <a:gd name="connsiteY17" fmla="*/ 900100 h 1710435"/>
+              <a:gd name="connsiteX18" fmla="*/ 0 w 1944216"/>
+              <a:gd name="connsiteY18" fmla="*/ 630070 h 1710435"/>
+              <a:gd name="connsiteX19" fmla="*/ 0 w 1944216"/>
+              <a:gd name="connsiteY19" fmla="*/ 630070 h 1710435"/>
+              <a:gd name="connsiteX20" fmla="*/ 0 w 1944216"/>
+              <a:gd name="connsiteY20" fmla="*/ 180024 h 1710435"/>
+              <a:gd name="connsiteX0" fmla="*/ 0 w 1944216"/>
+              <a:gd name="connsiteY0" fmla="*/ 180024 h 1710435"/>
+              <a:gd name="connsiteX1" fmla="*/ 180024 w 1944216"/>
+              <a:gd name="connsiteY1" fmla="*/ 0 h 1710435"/>
+              <a:gd name="connsiteX2" fmla="*/ 324036 w 1944216"/>
+              <a:gd name="connsiteY2" fmla="*/ 0 h 1710435"/>
+              <a:gd name="connsiteX3" fmla="*/ 324036 w 1944216"/>
+              <a:gd name="connsiteY3" fmla="*/ 0 h 1710435"/>
+              <a:gd name="connsiteX4" fmla="*/ 810090 w 1944216"/>
+              <a:gd name="connsiteY4" fmla="*/ 0 h 1710435"/>
+              <a:gd name="connsiteX5" fmla="*/ 1764192 w 1944216"/>
+              <a:gd name="connsiteY5" fmla="*/ 0 h 1710435"/>
+              <a:gd name="connsiteX6" fmla="*/ 1944216 w 1944216"/>
+              <a:gd name="connsiteY6" fmla="*/ 180024 h 1710435"/>
+              <a:gd name="connsiteX7" fmla="*/ 1944216 w 1944216"/>
+              <a:gd name="connsiteY7" fmla="*/ 630070 h 1710435"/>
+              <a:gd name="connsiteX8" fmla="*/ 1944216 w 1944216"/>
+              <a:gd name="connsiteY8" fmla="*/ 630070 h 1710435"/>
+              <a:gd name="connsiteX9" fmla="*/ 1944216 w 1944216"/>
+              <a:gd name="connsiteY9" fmla="*/ 900100 h 1710435"/>
+              <a:gd name="connsiteX10" fmla="*/ 1944216 w 1944216"/>
+              <a:gd name="connsiteY10" fmla="*/ 900096 h 1710435"/>
+              <a:gd name="connsiteX11" fmla="*/ 1764192 w 1944216"/>
+              <a:gd name="connsiteY11" fmla="*/ 1080120 h 1710435"/>
+              <a:gd name="connsiteX12" fmla="*/ 922907 w 1944216"/>
+              <a:gd name="connsiteY12" fmla="*/ 1078218 h 1710435"/>
+              <a:gd name="connsiteX13" fmla="*/ 544206 w 1944216"/>
+              <a:gd name="connsiteY13" fmla="*/ 1710435 h 1710435"/>
+              <a:gd name="connsiteX14" fmla="*/ 638755 w 1944216"/>
+              <a:gd name="connsiteY14" fmla="*/ 1080123 h 1710435"/>
+              <a:gd name="connsiteX15" fmla="*/ 180024 w 1944216"/>
+              <a:gd name="connsiteY15" fmla="*/ 1080120 h 1710435"/>
+              <a:gd name="connsiteX16" fmla="*/ 0 w 1944216"/>
+              <a:gd name="connsiteY16" fmla="*/ 900096 h 1710435"/>
+              <a:gd name="connsiteX17" fmla="*/ 0 w 1944216"/>
+              <a:gd name="connsiteY17" fmla="*/ 900100 h 1710435"/>
+              <a:gd name="connsiteX18" fmla="*/ 0 w 1944216"/>
+              <a:gd name="connsiteY18" fmla="*/ 630070 h 1710435"/>
+              <a:gd name="connsiteX19" fmla="*/ 0 w 1944216"/>
+              <a:gd name="connsiteY19" fmla="*/ 630070 h 1710435"/>
+              <a:gd name="connsiteX20" fmla="*/ 0 w 1944216"/>
+              <a:gd name="connsiteY20" fmla="*/ 180024 h 1710435"/>
+              <a:gd name="connsiteX0" fmla="*/ 0 w 1944216"/>
+              <a:gd name="connsiteY0" fmla="*/ 180024 h 1674243"/>
+              <a:gd name="connsiteX1" fmla="*/ 180024 w 1944216"/>
+              <a:gd name="connsiteY1" fmla="*/ 0 h 1674243"/>
+              <a:gd name="connsiteX2" fmla="*/ 324036 w 1944216"/>
+              <a:gd name="connsiteY2" fmla="*/ 0 h 1674243"/>
+              <a:gd name="connsiteX3" fmla="*/ 324036 w 1944216"/>
+              <a:gd name="connsiteY3" fmla="*/ 0 h 1674243"/>
+              <a:gd name="connsiteX4" fmla="*/ 810090 w 1944216"/>
+              <a:gd name="connsiteY4" fmla="*/ 0 h 1674243"/>
+              <a:gd name="connsiteX5" fmla="*/ 1764192 w 1944216"/>
+              <a:gd name="connsiteY5" fmla="*/ 0 h 1674243"/>
+              <a:gd name="connsiteX6" fmla="*/ 1944216 w 1944216"/>
+              <a:gd name="connsiteY6" fmla="*/ 180024 h 1674243"/>
+              <a:gd name="connsiteX7" fmla="*/ 1944216 w 1944216"/>
+              <a:gd name="connsiteY7" fmla="*/ 630070 h 1674243"/>
+              <a:gd name="connsiteX8" fmla="*/ 1944216 w 1944216"/>
+              <a:gd name="connsiteY8" fmla="*/ 630070 h 1674243"/>
+              <a:gd name="connsiteX9" fmla="*/ 1944216 w 1944216"/>
+              <a:gd name="connsiteY9" fmla="*/ 900100 h 1674243"/>
+              <a:gd name="connsiteX10" fmla="*/ 1944216 w 1944216"/>
+              <a:gd name="connsiteY10" fmla="*/ 900096 h 1674243"/>
+              <a:gd name="connsiteX11" fmla="*/ 1764192 w 1944216"/>
+              <a:gd name="connsiteY11" fmla="*/ 1080120 h 1674243"/>
+              <a:gd name="connsiteX12" fmla="*/ 922907 w 1944216"/>
+              <a:gd name="connsiteY12" fmla="*/ 1078218 h 1674243"/>
+              <a:gd name="connsiteX13" fmla="*/ 752080 w 1944216"/>
+              <a:gd name="connsiteY13" fmla="*/ 1674243 h 1674243"/>
+              <a:gd name="connsiteX14" fmla="*/ 638755 w 1944216"/>
+              <a:gd name="connsiteY14" fmla="*/ 1080123 h 1674243"/>
+              <a:gd name="connsiteX15" fmla="*/ 180024 w 1944216"/>
+              <a:gd name="connsiteY15" fmla="*/ 1080120 h 1674243"/>
+              <a:gd name="connsiteX16" fmla="*/ 0 w 1944216"/>
+              <a:gd name="connsiteY16" fmla="*/ 900096 h 1674243"/>
+              <a:gd name="connsiteX17" fmla="*/ 0 w 1944216"/>
+              <a:gd name="connsiteY17" fmla="*/ 900100 h 1674243"/>
+              <a:gd name="connsiteX18" fmla="*/ 0 w 1944216"/>
+              <a:gd name="connsiteY18" fmla="*/ 630070 h 1674243"/>
+              <a:gd name="connsiteX19" fmla="*/ 0 w 1944216"/>
+              <a:gd name="connsiteY19" fmla="*/ 630070 h 1674243"/>
+              <a:gd name="connsiteX20" fmla="*/ 0 w 1944216"/>
+              <a:gd name="connsiteY20" fmla="*/ 180024 h 1674243"/>
+              <a:gd name="connsiteX0" fmla="*/ 0 w 1944216"/>
+              <a:gd name="connsiteY0" fmla="*/ 181377 h 1675596"/>
+              <a:gd name="connsiteX1" fmla="*/ 180024 w 1944216"/>
+              <a:gd name="connsiteY1" fmla="*/ 1353 h 1675596"/>
+              <a:gd name="connsiteX2" fmla="*/ 324036 w 1944216"/>
+              <a:gd name="connsiteY2" fmla="*/ 1353 h 1675596"/>
+              <a:gd name="connsiteX3" fmla="*/ 324036 w 1944216"/>
+              <a:gd name="connsiteY3" fmla="*/ 1353 h 1675596"/>
+              <a:gd name="connsiteX4" fmla="*/ 810090 w 1944216"/>
+              <a:gd name="connsiteY4" fmla="*/ 1353 h 1675596"/>
+              <a:gd name="connsiteX5" fmla="*/ 1764192 w 1944216"/>
+              <a:gd name="connsiteY5" fmla="*/ 1353 h 1675596"/>
+              <a:gd name="connsiteX6" fmla="*/ 1944215 w 1944216"/>
+              <a:gd name="connsiteY6" fmla="*/ 82320 h 1675596"/>
+              <a:gd name="connsiteX7" fmla="*/ 1944216 w 1944216"/>
+              <a:gd name="connsiteY7" fmla="*/ 631423 h 1675596"/>
+              <a:gd name="connsiteX8" fmla="*/ 1944216 w 1944216"/>
+              <a:gd name="connsiteY8" fmla="*/ 631423 h 1675596"/>
+              <a:gd name="connsiteX9" fmla="*/ 1944216 w 1944216"/>
+              <a:gd name="connsiteY9" fmla="*/ 901453 h 1675596"/>
+              <a:gd name="connsiteX10" fmla="*/ 1944216 w 1944216"/>
+              <a:gd name="connsiteY10" fmla="*/ 901449 h 1675596"/>
+              <a:gd name="connsiteX11" fmla="*/ 1764192 w 1944216"/>
+              <a:gd name="connsiteY11" fmla="*/ 1081473 h 1675596"/>
+              <a:gd name="connsiteX12" fmla="*/ 922907 w 1944216"/>
+              <a:gd name="connsiteY12" fmla="*/ 1079571 h 1675596"/>
+              <a:gd name="connsiteX13" fmla="*/ 752080 w 1944216"/>
+              <a:gd name="connsiteY13" fmla="*/ 1675596 h 1675596"/>
+              <a:gd name="connsiteX14" fmla="*/ 638755 w 1944216"/>
+              <a:gd name="connsiteY14" fmla="*/ 1081476 h 1675596"/>
+              <a:gd name="connsiteX15" fmla="*/ 180024 w 1944216"/>
+              <a:gd name="connsiteY15" fmla="*/ 1081473 h 1675596"/>
+              <a:gd name="connsiteX16" fmla="*/ 0 w 1944216"/>
+              <a:gd name="connsiteY16" fmla="*/ 901449 h 1675596"/>
+              <a:gd name="connsiteX17" fmla="*/ 0 w 1944216"/>
+              <a:gd name="connsiteY17" fmla="*/ 901453 h 1675596"/>
+              <a:gd name="connsiteX18" fmla="*/ 0 w 1944216"/>
+              <a:gd name="connsiteY18" fmla="*/ 631423 h 1675596"/>
+              <a:gd name="connsiteX19" fmla="*/ 0 w 1944216"/>
+              <a:gd name="connsiteY19" fmla="*/ 631423 h 1675596"/>
+              <a:gd name="connsiteX20" fmla="*/ 0 w 1944216"/>
+              <a:gd name="connsiteY20" fmla="*/ 181377 h 1675596"/>
+              <a:gd name="connsiteX0" fmla="*/ 0 w 1944216"/>
+              <a:gd name="connsiteY0" fmla="*/ 181377 h 1675596"/>
+              <a:gd name="connsiteX1" fmla="*/ 180024 w 1944216"/>
+              <a:gd name="connsiteY1" fmla="*/ 1353 h 1675596"/>
+              <a:gd name="connsiteX2" fmla="*/ 324036 w 1944216"/>
+              <a:gd name="connsiteY2" fmla="*/ 1353 h 1675596"/>
+              <a:gd name="connsiteX3" fmla="*/ 324036 w 1944216"/>
+              <a:gd name="connsiteY3" fmla="*/ 1353 h 1675596"/>
+              <a:gd name="connsiteX4" fmla="*/ 810090 w 1944216"/>
+              <a:gd name="connsiteY4" fmla="*/ 1353 h 1675596"/>
+              <a:gd name="connsiteX5" fmla="*/ 1764192 w 1944216"/>
+              <a:gd name="connsiteY5" fmla="*/ 1353 h 1675596"/>
+              <a:gd name="connsiteX6" fmla="*/ 1944215 w 1944216"/>
+              <a:gd name="connsiteY6" fmla="*/ 82320 h 1675596"/>
+              <a:gd name="connsiteX7" fmla="*/ 1944216 w 1944216"/>
+              <a:gd name="connsiteY7" fmla="*/ 631423 h 1675596"/>
+              <a:gd name="connsiteX8" fmla="*/ 1944216 w 1944216"/>
+              <a:gd name="connsiteY8" fmla="*/ 631423 h 1675596"/>
+              <a:gd name="connsiteX9" fmla="*/ 1944216 w 1944216"/>
+              <a:gd name="connsiteY9" fmla="*/ 901453 h 1675596"/>
+              <a:gd name="connsiteX10" fmla="*/ 1944216 w 1944216"/>
+              <a:gd name="connsiteY10" fmla="*/ 987174 h 1675596"/>
+              <a:gd name="connsiteX11" fmla="*/ 1764192 w 1944216"/>
+              <a:gd name="connsiteY11" fmla="*/ 1081473 h 1675596"/>
+              <a:gd name="connsiteX12" fmla="*/ 922907 w 1944216"/>
+              <a:gd name="connsiteY12" fmla="*/ 1079571 h 1675596"/>
+              <a:gd name="connsiteX13" fmla="*/ 752080 w 1944216"/>
+              <a:gd name="connsiteY13" fmla="*/ 1675596 h 1675596"/>
+              <a:gd name="connsiteX14" fmla="*/ 638755 w 1944216"/>
+              <a:gd name="connsiteY14" fmla="*/ 1081476 h 1675596"/>
+              <a:gd name="connsiteX15" fmla="*/ 180024 w 1944216"/>
+              <a:gd name="connsiteY15" fmla="*/ 1081473 h 1675596"/>
+              <a:gd name="connsiteX16" fmla="*/ 0 w 1944216"/>
+              <a:gd name="connsiteY16" fmla="*/ 901449 h 1675596"/>
+              <a:gd name="connsiteX17" fmla="*/ 0 w 1944216"/>
+              <a:gd name="connsiteY17" fmla="*/ 901453 h 1675596"/>
+              <a:gd name="connsiteX18" fmla="*/ 0 w 1944216"/>
+              <a:gd name="connsiteY18" fmla="*/ 631423 h 1675596"/>
+              <a:gd name="connsiteX19" fmla="*/ 0 w 1944216"/>
+              <a:gd name="connsiteY19" fmla="*/ 631423 h 1675596"/>
+              <a:gd name="connsiteX20" fmla="*/ 0 w 1944216"/>
+              <a:gd name="connsiteY20" fmla="*/ 181377 h 1675596"/>
+              <a:gd name="connsiteX0" fmla="*/ 0 w 1944216"/>
+              <a:gd name="connsiteY0" fmla="*/ 181377 h 1675596"/>
+              <a:gd name="connsiteX1" fmla="*/ 180024 w 1944216"/>
+              <a:gd name="connsiteY1" fmla="*/ 1353 h 1675596"/>
+              <a:gd name="connsiteX2" fmla="*/ 324036 w 1944216"/>
+              <a:gd name="connsiteY2" fmla="*/ 1353 h 1675596"/>
+              <a:gd name="connsiteX3" fmla="*/ 324036 w 1944216"/>
+              <a:gd name="connsiteY3" fmla="*/ 1353 h 1675596"/>
+              <a:gd name="connsiteX4" fmla="*/ 810090 w 1944216"/>
+              <a:gd name="connsiteY4" fmla="*/ 1353 h 1675596"/>
+              <a:gd name="connsiteX5" fmla="*/ 1764192 w 1944216"/>
+              <a:gd name="connsiteY5" fmla="*/ 1353 h 1675596"/>
+              <a:gd name="connsiteX6" fmla="*/ 1944215 w 1944216"/>
+              <a:gd name="connsiteY6" fmla="*/ 82320 h 1675596"/>
+              <a:gd name="connsiteX7" fmla="*/ 1944216 w 1944216"/>
+              <a:gd name="connsiteY7" fmla="*/ 631423 h 1675596"/>
+              <a:gd name="connsiteX8" fmla="*/ 1944216 w 1944216"/>
+              <a:gd name="connsiteY8" fmla="*/ 631423 h 1675596"/>
+              <a:gd name="connsiteX9" fmla="*/ 1944216 w 1944216"/>
+              <a:gd name="connsiteY9" fmla="*/ 901453 h 1675596"/>
+              <a:gd name="connsiteX10" fmla="*/ 1944216 w 1944216"/>
+              <a:gd name="connsiteY10" fmla="*/ 987174 h 1675596"/>
+              <a:gd name="connsiteX11" fmla="*/ 1764192 w 1944216"/>
+              <a:gd name="connsiteY11" fmla="*/ 1081473 h 1675596"/>
+              <a:gd name="connsiteX12" fmla="*/ 922907 w 1944216"/>
+              <a:gd name="connsiteY12" fmla="*/ 1079571 h 1675596"/>
+              <a:gd name="connsiteX13" fmla="*/ 752080 w 1944216"/>
+              <a:gd name="connsiteY13" fmla="*/ 1675596 h 1675596"/>
+              <a:gd name="connsiteX14" fmla="*/ 638755 w 1944216"/>
+              <a:gd name="connsiteY14" fmla="*/ 1081476 h 1675596"/>
+              <a:gd name="connsiteX15" fmla="*/ 106402 w 1944216"/>
+              <a:gd name="connsiteY15" fmla="*/ 1079568 h 1675596"/>
+              <a:gd name="connsiteX16" fmla="*/ 0 w 1944216"/>
+              <a:gd name="connsiteY16" fmla="*/ 901449 h 1675596"/>
+              <a:gd name="connsiteX17" fmla="*/ 0 w 1944216"/>
+              <a:gd name="connsiteY17" fmla="*/ 901453 h 1675596"/>
+              <a:gd name="connsiteX18" fmla="*/ 0 w 1944216"/>
+              <a:gd name="connsiteY18" fmla="*/ 631423 h 1675596"/>
+              <a:gd name="connsiteX19" fmla="*/ 0 w 1944216"/>
+              <a:gd name="connsiteY19" fmla="*/ 631423 h 1675596"/>
+              <a:gd name="connsiteX20" fmla="*/ 0 w 1944216"/>
+              <a:gd name="connsiteY20" fmla="*/ 181377 h 1675596"/>
+              <a:gd name="connsiteX0" fmla="*/ 0 w 1948547"/>
+              <a:gd name="connsiteY0" fmla="*/ 84222 h 1675596"/>
+              <a:gd name="connsiteX1" fmla="*/ 184355 w 1948547"/>
+              <a:gd name="connsiteY1" fmla="*/ 1353 h 1675596"/>
+              <a:gd name="connsiteX2" fmla="*/ 328367 w 1948547"/>
+              <a:gd name="connsiteY2" fmla="*/ 1353 h 1675596"/>
+              <a:gd name="connsiteX3" fmla="*/ 328367 w 1948547"/>
+              <a:gd name="connsiteY3" fmla="*/ 1353 h 1675596"/>
+              <a:gd name="connsiteX4" fmla="*/ 814421 w 1948547"/>
+              <a:gd name="connsiteY4" fmla="*/ 1353 h 1675596"/>
+              <a:gd name="connsiteX5" fmla="*/ 1768523 w 1948547"/>
+              <a:gd name="connsiteY5" fmla="*/ 1353 h 1675596"/>
+              <a:gd name="connsiteX6" fmla="*/ 1948546 w 1948547"/>
+              <a:gd name="connsiteY6" fmla="*/ 82320 h 1675596"/>
+              <a:gd name="connsiteX7" fmla="*/ 1948547 w 1948547"/>
+              <a:gd name="connsiteY7" fmla="*/ 631423 h 1675596"/>
+              <a:gd name="connsiteX8" fmla="*/ 1948547 w 1948547"/>
+              <a:gd name="connsiteY8" fmla="*/ 631423 h 1675596"/>
+              <a:gd name="connsiteX9" fmla="*/ 1948547 w 1948547"/>
+              <a:gd name="connsiteY9" fmla="*/ 901453 h 1675596"/>
+              <a:gd name="connsiteX10" fmla="*/ 1948547 w 1948547"/>
+              <a:gd name="connsiteY10" fmla="*/ 987174 h 1675596"/>
+              <a:gd name="connsiteX11" fmla="*/ 1768523 w 1948547"/>
+              <a:gd name="connsiteY11" fmla="*/ 1081473 h 1675596"/>
+              <a:gd name="connsiteX12" fmla="*/ 927238 w 1948547"/>
+              <a:gd name="connsiteY12" fmla="*/ 1079571 h 1675596"/>
+              <a:gd name="connsiteX13" fmla="*/ 756411 w 1948547"/>
+              <a:gd name="connsiteY13" fmla="*/ 1675596 h 1675596"/>
+              <a:gd name="connsiteX14" fmla="*/ 643086 w 1948547"/>
+              <a:gd name="connsiteY14" fmla="*/ 1081476 h 1675596"/>
+              <a:gd name="connsiteX15" fmla="*/ 110733 w 1948547"/>
+              <a:gd name="connsiteY15" fmla="*/ 1079568 h 1675596"/>
+              <a:gd name="connsiteX16" fmla="*/ 4331 w 1948547"/>
+              <a:gd name="connsiteY16" fmla="*/ 901449 h 1675596"/>
+              <a:gd name="connsiteX17" fmla="*/ 4331 w 1948547"/>
+              <a:gd name="connsiteY17" fmla="*/ 901453 h 1675596"/>
+              <a:gd name="connsiteX18" fmla="*/ 4331 w 1948547"/>
+              <a:gd name="connsiteY18" fmla="*/ 631423 h 1675596"/>
+              <a:gd name="connsiteX19" fmla="*/ 4331 w 1948547"/>
+              <a:gd name="connsiteY19" fmla="*/ 631423 h 1675596"/>
+              <a:gd name="connsiteX20" fmla="*/ 0 w 1948547"/>
+              <a:gd name="connsiteY20" fmla="*/ 84222 h 1675596"/>
+              <a:gd name="connsiteX0" fmla="*/ 0 w 1948547"/>
+              <a:gd name="connsiteY0" fmla="*/ 84222 h 1675596"/>
+              <a:gd name="connsiteX1" fmla="*/ 184355 w 1948547"/>
+              <a:gd name="connsiteY1" fmla="*/ 1353 h 1675596"/>
+              <a:gd name="connsiteX2" fmla="*/ 328367 w 1948547"/>
+              <a:gd name="connsiteY2" fmla="*/ 1353 h 1675596"/>
+              <a:gd name="connsiteX3" fmla="*/ 328367 w 1948547"/>
+              <a:gd name="connsiteY3" fmla="*/ 1353 h 1675596"/>
+              <a:gd name="connsiteX4" fmla="*/ 814421 w 1948547"/>
+              <a:gd name="connsiteY4" fmla="*/ 1353 h 1675596"/>
+              <a:gd name="connsiteX5" fmla="*/ 1768523 w 1948547"/>
+              <a:gd name="connsiteY5" fmla="*/ 1353 h 1675596"/>
+              <a:gd name="connsiteX6" fmla="*/ 1948546 w 1948547"/>
+              <a:gd name="connsiteY6" fmla="*/ 82320 h 1675596"/>
+              <a:gd name="connsiteX7" fmla="*/ 1948547 w 1948547"/>
+              <a:gd name="connsiteY7" fmla="*/ 631423 h 1675596"/>
+              <a:gd name="connsiteX8" fmla="*/ 1948547 w 1948547"/>
+              <a:gd name="connsiteY8" fmla="*/ 631423 h 1675596"/>
+              <a:gd name="connsiteX9" fmla="*/ 1948547 w 1948547"/>
+              <a:gd name="connsiteY9" fmla="*/ 901453 h 1675596"/>
+              <a:gd name="connsiteX10" fmla="*/ 1948547 w 1948547"/>
+              <a:gd name="connsiteY10" fmla="*/ 987174 h 1675596"/>
+              <a:gd name="connsiteX11" fmla="*/ 1768523 w 1948547"/>
+              <a:gd name="connsiteY11" fmla="*/ 1081473 h 1675596"/>
+              <a:gd name="connsiteX12" fmla="*/ 927238 w 1948547"/>
+              <a:gd name="connsiteY12" fmla="*/ 1079571 h 1675596"/>
+              <a:gd name="connsiteX13" fmla="*/ 756411 w 1948547"/>
+              <a:gd name="connsiteY13" fmla="*/ 1675596 h 1675596"/>
+              <a:gd name="connsiteX14" fmla="*/ 643086 w 1948547"/>
+              <a:gd name="connsiteY14" fmla="*/ 1081476 h 1675596"/>
+              <a:gd name="connsiteX15" fmla="*/ 110733 w 1948547"/>
+              <a:gd name="connsiteY15" fmla="*/ 1079568 h 1675596"/>
+              <a:gd name="connsiteX16" fmla="*/ 4331 w 1948547"/>
+              <a:gd name="connsiteY16" fmla="*/ 901449 h 1675596"/>
+              <a:gd name="connsiteX17" fmla="*/ 4330 w 1948547"/>
+              <a:gd name="connsiteY17" fmla="*/ 1021471 h 1675596"/>
+              <a:gd name="connsiteX18" fmla="*/ 4331 w 1948547"/>
+              <a:gd name="connsiteY18" fmla="*/ 631423 h 1675596"/>
+              <a:gd name="connsiteX19" fmla="*/ 4331 w 1948547"/>
+              <a:gd name="connsiteY19" fmla="*/ 631423 h 1675596"/>
+              <a:gd name="connsiteX20" fmla="*/ 0 w 1948547"/>
+              <a:gd name="connsiteY20" fmla="*/ 84222 h 1675596"/>
+              <a:gd name="connsiteX0" fmla="*/ 0 w 1948547"/>
+              <a:gd name="connsiteY0" fmla="*/ 84222 h 1675596"/>
+              <a:gd name="connsiteX1" fmla="*/ 184355 w 1948547"/>
+              <a:gd name="connsiteY1" fmla="*/ 1353 h 1675596"/>
+              <a:gd name="connsiteX2" fmla="*/ 328367 w 1948547"/>
+              <a:gd name="connsiteY2" fmla="*/ 1353 h 1675596"/>
+              <a:gd name="connsiteX3" fmla="*/ 328367 w 1948547"/>
+              <a:gd name="connsiteY3" fmla="*/ 1353 h 1675596"/>
+              <a:gd name="connsiteX4" fmla="*/ 814421 w 1948547"/>
+              <a:gd name="connsiteY4" fmla="*/ 1353 h 1675596"/>
+              <a:gd name="connsiteX5" fmla="*/ 1768523 w 1948547"/>
+              <a:gd name="connsiteY5" fmla="*/ 1353 h 1675596"/>
+              <a:gd name="connsiteX6" fmla="*/ 1948546 w 1948547"/>
+              <a:gd name="connsiteY6" fmla="*/ 82320 h 1675596"/>
+              <a:gd name="connsiteX7" fmla="*/ 1948547 w 1948547"/>
+              <a:gd name="connsiteY7" fmla="*/ 631423 h 1675596"/>
+              <a:gd name="connsiteX8" fmla="*/ 1948547 w 1948547"/>
+              <a:gd name="connsiteY8" fmla="*/ 631423 h 1675596"/>
+              <a:gd name="connsiteX9" fmla="*/ 1948547 w 1948547"/>
+              <a:gd name="connsiteY9" fmla="*/ 901453 h 1675596"/>
+              <a:gd name="connsiteX10" fmla="*/ 1948547 w 1948547"/>
+              <a:gd name="connsiteY10" fmla="*/ 987174 h 1675596"/>
+              <a:gd name="connsiteX11" fmla="*/ 1768523 w 1948547"/>
+              <a:gd name="connsiteY11" fmla="*/ 1081473 h 1675596"/>
+              <a:gd name="connsiteX12" fmla="*/ 927238 w 1948547"/>
+              <a:gd name="connsiteY12" fmla="*/ 1079571 h 1675596"/>
+              <a:gd name="connsiteX13" fmla="*/ 756411 w 1948547"/>
+              <a:gd name="connsiteY13" fmla="*/ 1675596 h 1675596"/>
+              <a:gd name="connsiteX14" fmla="*/ 643086 w 1948547"/>
+              <a:gd name="connsiteY14" fmla="*/ 1081476 h 1675596"/>
+              <a:gd name="connsiteX15" fmla="*/ 110733 w 1948547"/>
+              <a:gd name="connsiteY15" fmla="*/ 1079568 h 1675596"/>
+              <a:gd name="connsiteX16" fmla="*/ 4331 w 1948547"/>
+              <a:gd name="connsiteY16" fmla="*/ 901449 h 1675596"/>
+              <a:gd name="connsiteX17" fmla="*/ 4330 w 1948547"/>
+              <a:gd name="connsiteY17" fmla="*/ 880504 h 1675596"/>
+              <a:gd name="connsiteX18" fmla="*/ 4331 w 1948547"/>
+              <a:gd name="connsiteY18" fmla="*/ 631423 h 1675596"/>
+              <a:gd name="connsiteX19" fmla="*/ 4331 w 1948547"/>
+              <a:gd name="connsiteY19" fmla="*/ 631423 h 1675596"/>
+              <a:gd name="connsiteX20" fmla="*/ 0 w 1948547"/>
+              <a:gd name="connsiteY20" fmla="*/ 84222 h 1675596"/>
+              <a:gd name="connsiteX0" fmla="*/ 0 w 1948547"/>
+              <a:gd name="connsiteY0" fmla="*/ 84222 h 1675596"/>
+              <a:gd name="connsiteX1" fmla="*/ 184355 w 1948547"/>
+              <a:gd name="connsiteY1" fmla="*/ 1353 h 1675596"/>
+              <a:gd name="connsiteX2" fmla="*/ 328367 w 1948547"/>
+              <a:gd name="connsiteY2" fmla="*/ 1353 h 1675596"/>
+              <a:gd name="connsiteX3" fmla="*/ 328367 w 1948547"/>
+              <a:gd name="connsiteY3" fmla="*/ 1353 h 1675596"/>
+              <a:gd name="connsiteX4" fmla="*/ 814421 w 1948547"/>
+              <a:gd name="connsiteY4" fmla="*/ 1353 h 1675596"/>
+              <a:gd name="connsiteX5" fmla="*/ 1768523 w 1948547"/>
+              <a:gd name="connsiteY5" fmla="*/ 1353 h 1675596"/>
+              <a:gd name="connsiteX6" fmla="*/ 1948546 w 1948547"/>
+              <a:gd name="connsiteY6" fmla="*/ 82320 h 1675596"/>
+              <a:gd name="connsiteX7" fmla="*/ 1948547 w 1948547"/>
+              <a:gd name="connsiteY7" fmla="*/ 631423 h 1675596"/>
+              <a:gd name="connsiteX8" fmla="*/ 1948547 w 1948547"/>
+              <a:gd name="connsiteY8" fmla="*/ 631423 h 1675596"/>
+              <a:gd name="connsiteX9" fmla="*/ 1948547 w 1948547"/>
+              <a:gd name="connsiteY9" fmla="*/ 901453 h 1675596"/>
+              <a:gd name="connsiteX10" fmla="*/ 1948547 w 1948547"/>
+              <a:gd name="connsiteY10" fmla="*/ 987174 h 1675596"/>
+              <a:gd name="connsiteX11" fmla="*/ 1768523 w 1948547"/>
+              <a:gd name="connsiteY11" fmla="*/ 1081473 h 1675596"/>
+              <a:gd name="connsiteX12" fmla="*/ 927238 w 1948547"/>
+              <a:gd name="connsiteY12" fmla="*/ 1079571 h 1675596"/>
+              <a:gd name="connsiteX13" fmla="*/ 756411 w 1948547"/>
+              <a:gd name="connsiteY13" fmla="*/ 1675596 h 1675596"/>
+              <a:gd name="connsiteX14" fmla="*/ 643086 w 1948547"/>
+              <a:gd name="connsiteY14" fmla="*/ 1081476 h 1675596"/>
+              <a:gd name="connsiteX15" fmla="*/ 110733 w 1948547"/>
+              <a:gd name="connsiteY15" fmla="*/ 1079568 h 1675596"/>
+              <a:gd name="connsiteX16" fmla="*/ 4330 w 1948547"/>
+              <a:gd name="connsiteY16" fmla="*/ 983367 h 1675596"/>
+              <a:gd name="connsiteX17" fmla="*/ 4330 w 1948547"/>
+              <a:gd name="connsiteY17" fmla="*/ 880504 h 1675596"/>
+              <a:gd name="connsiteX18" fmla="*/ 4331 w 1948547"/>
+              <a:gd name="connsiteY18" fmla="*/ 631423 h 1675596"/>
+              <a:gd name="connsiteX19" fmla="*/ 4331 w 1948547"/>
+              <a:gd name="connsiteY19" fmla="*/ 631423 h 1675596"/>
+              <a:gd name="connsiteX20" fmla="*/ 0 w 1948547"/>
+              <a:gd name="connsiteY20" fmla="*/ 84222 h 1675596"/>
+              <a:gd name="connsiteX0" fmla="*/ 0 w 1948547"/>
+              <a:gd name="connsiteY0" fmla="*/ 84222 h 1675596"/>
+              <a:gd name="connsiteX1" fmla="*/ 184355 w 1948547"/>
+              <a:gd name="connsiteY1" fmla="*/ 1353 h 1675596"/>
+              <a:gd name="connsiteX2" fmla="*/ 328367 w 1948547"/>
+              <a:gd name="connsiteY2" fmla="*/ 1353 h 1675596"/>
+              <a:gd name="connsiteX3" fmla="*/ 328367 w 1948547"/>
+              <a:gd name="connsiteY3" fmla="*/ 1353 h 1675596"/>
+              <a:gd name="connsiteX4" fmla="*/ 814421 w 1948547"/>
+              <a:gd name="connsiteY4" fmla="*/ 1353 h 1675596"/>
+              <a:gd name="connsiteX5" fmla="*/ 1768523 w 1948547"/>
+              <a:gd name="connsiteY5" fmla="*/ 1353 h 1675596"/>
+              <a:gd name="connsiteX6" fmla="*/ 1948546 w 1948547"/>
+              <a:gd name="connsiteY6" fmla="*/ 82320 h 1675596"/>
+              <a:gd name="connsiteX7" fmla="*/ 1948547 w 1948547"/>
+              <a:gd name="connsiteY7" fmla="*/ 631423 h 1675596"/>
+              <a:gd name="connsiteX8" fmla="*/ 1948547 w 1948547"/>
+              <a:gd name="connsiteY8" fmla="*/ 631423 h 1675596"/>
+              <a:gd name="connsiteX9" fmla="*/ 1948547 w 1948547"/>
+              <a:gd name="connsiteY9" fmla="*/ 901453 h 1675596"/>
+              <a:gd name="connsiteX10" fmla="*/ 1948547 w 1948547"/>
+              <a:gd name="connsiteY10" fmla="*/ 987174 h 1675596"/>
+              <a:gd name="connsiteX11" fmla="*/ 1768523 w 1948547"/>
+              <a:gd name="connsiteY11" fmla="*/ 1081473 h 1675596"/>
+              <a:gd name="connsiteX12" fmla="*/ 927238 w 1948547"/>
+              <a:gd name="connsiteY12" fmla="*/ 1079571 h 1675596"/>
+              <a:gd name="connsiteX13" fmla="*/ 756411 w 1948547"/>
+              <a:gd name="connsiteY13" fmla="*/ 1675596 h 1675596"/>
+              <a:gd name="connsiteX14" fmla="*/ 643086 w 1948547"/>
+              <a:gd name="connsiteY14" fmla="*/ 1081476 h 1675596"/>
+              <a:gd name="connsiteX15" fmla="*/ 110733 w 1948547"/>
+              <a:gd name="connsiteY15" fmla="*/ 1079568 h 1675596"/>
+              <a:gd name="connsiteX16" fmla="*/ 4330 w 1948547"/>
+              <a:gd name="connsiteY16" fmla="*/ 956700 h 1675596"/>
+              <a:gd name="connsiteX17" fmla="*/ 4330 w 1948547"/>
+              <a:gd name="connsiteY17" fmla="*/ 880504 h 1675596"/>
+              <a:gd name="connsiteX18" fmla="*/ 4331 w 1948547"/>
+              <a:gd name="connsiteY18" fmla="*/ 631423 h 1675596"/>
+              <a:gd name="connsiteX19" fmla="*/ 4331 w 1948547"/>
+              <a:gd name="connsiteY19" fmla="*/ 631423 h 1675596"/>
+              <a:gd name="connsiteX20" fmla="*/ 0 w 1948547"/>
+              <a:gd name="connsiteY20" fmla="*/ 84222 h 1675596"/>
+              <a:gd name="connsiteX0" fmla="*/ 0 w 1948547"/>
+              <a:gd name="connsiteY0" fmla="*/ 84222 h 1467954"/>
+              <a:gd name="connsiteX1" fmla="*/ 184355 w 1948547"/>
+              <a:gd name="connsiteY1" fmla="*/ 1353 h 1467954"/>
+              <a:gd name="connsiteX2" fmla="*/ 328367 w 1948547"/>
+              <a:gd name="connsiteY2" fmla="*/ 1353 h 1467954"/>
+              <a:gd name="connsiteX3" fmla="*/ 328367 w 1948547"/>
+              <a:gd name="connsiteY3" fmla="*/ 1353 h 1467954"/>
+              <a:gd name="connsiteX4" fmla="*/ 814421 w 1948547"/>
+              <a:gd name="connsiteY4" fmla="*/ 1353 h 1467954"/>
+              <a:gd name="connsiteX5" fmla="*/ 1768523 w 1948547"/>
+              <a:gd name="connsiteY5" fmla="*/ 1353 h 1467954"/>
+              <a:gd name="connsiteX6" fmla="*/ 1948546 w 1948547"/>
+              <a:gd name="connsiteY6" fmla="*/ 82320 h 1467954"/>
+              <a:gd name="connsiteX7" fmla="*/ 1948547 w 1948547"/>
+              <a:gd name="connsiteY7" fmla="*/ 631423 h 1467954"/>
+              <a:gd name="connsiteX8" fmla="*/ 1948547 w 1948547"/>
+              <a:gd name="connsiteY8" fmla="*/ 631423 h 1467954"/>
+              <a:gd name="connsiteX9" fmla="*/ 1948547 w 1948547"/>
+              <a:gd name="connsiteY9" fmla="*/ 901453 h 1467954"/>
+              <a:gd name="connsiteX10" fmla="*/ 1948547 w 1948547"/>
+              <a:gd name="connsiteY10" fmla="*/ 987174 h 1467954"/>
+              <a:gd name="connsiteX11" fmla="*/ 1768523 w 1948547"/>
+              <a:gd name="connsiteY11" fmla="*/ 1081473 h 1467954"/>
+              <a:gd name="connsiteX12" fmla="*/ 927238 w 1948547"/>
+              <a:gd name="connsiteY12" fmla="*/ 1079571 h 1467954"/>
+              <a:gd name="connsiteX13" fmla="*/ 782395 w 1948547"/>
+              <a:gd name="connsiteY13" fmla="*/ 1467954 h 1467954"/>
+              <a:gd name="connsiteX14" fmla="*/ 643086 w 1948547"/>
+              <a:gd name="connsiteY14" fmla="*/ 1081476 h 1467954"/>
+              <a:gd name="connsiteX15" fmla="*/ 110733 w 1948547"/>
+              <a:gd name="connsiteY15" fmla="*/ 1079568 h 1467954"/>
+              <a:gd name="connsiteX16" fmla="*/ 4330 w 1948547"/>
+              <a:gd name="connsiteY16" fmla="*/ 956700 h 1467954"/>
+              <a:gd name="connsiteX17" fmla="*/ 4330 w 1948547"/>
+              <a:gd name="connsiteY17" fmla="*/ 880504 h 1467954"/>
+              <a:gd name="connsiteX18" fmla="*/ 4331 w 1948547"/>
+              <a:gd name="connsiteY18" fmla="*/ 631423 h 1467954"/>
+              <a:gd name="connsiteX19" fmla="*/ 4331 w 1948547"/>
+              <a:gd name="connsiteY19" fmla="*/ 631423 h 1467954"/>
+              <a:gd name="connsiteX20" fmla="*/ 0 w 1948547"/>
+              <a:gd name="connsiteY20" fmla="*/ 84222 h 1467954"/>
+            </a:gdLst>
+            <a:ahLst/>
+            <a:cxnLst>
+              <a:cxn ang="0">
+                <a:pos x="connsiteX0" y="connsiteY0"/>
+              </a:cxn>
+              <a:cxn ang="0">
+                <a:pos x="connsiteX1" y="connsiteY1"/>
+              </a:cxn>
+              <a:cxn ang="0">
+                <a:pos x="connsiteX2" y="connsiteY2"/>
+              </a:cxn>
+              <a:cxn ang="0">
+                <a:pos x="connsiteX3" y="connsiteY3"/>
+              </a:cxn>
+              <a:cxn ang="0">
+                <a:pos x="connsiteX4" y="connsiteY4"/>
+              </a:cxn>
+              <a:cxn ang="0">
+                <a:pos x="connsiteX5" y="connsiteY5"/>
+              </a:cxn>
+              <a:cxn ang="0">
+                <a:pos x="connsiteX6" y="connsiteY6"/>
+              </a:cxn>
+              <a:cxn ang="0">
+                <a:pos x="connsiteX7" y="connsiteY7"/>
+              </a:cxn>
+              <a:cxn ang="0">
+                <a:pos x="connsiteX8" y="connsiteY8"/>
+              </a:cxn>
+              <a:cxn ang="0">
+                <a:pos x="connsiteX9" y="connsiteY9"/>
+              </a:cxn>
+              <a:cxn ang="0">
+                <a:pos x="connsiteX10" y="connsiteY10"/>
+              </a:cxn>
+              <a:cxn ang="0">
+                <a:pos x="connsiteX11" y="connsiteY11"/>
+              </a:cxn>
+              <a:cxn ang="0">
+                <a:pos x="connsiteX12" y="connsiteY12"/>
+              </a:cxn>
+              <a:cxn ang="0">
+                <a:pos x="connsiteX13" y="connsiteY13"/>
+              </a:cxn>
+              <a:cxn ang="0">
+                <a:pos x="connsiteX14" y="connsiteY14"/>
+              </a:cxn>
+              <a:cxn ang="0">
+                <a:pos x="connsiteX15" y="connsiteY15"/>
+              </a:cxn>
+              <a:cxn ang="0">
+                <a:pos x="connsiteX16" y="connsiteY16"/>
+              </a:cxn>
+              <a:cxn ang="0">
+                <a:pos x="connsiteX17" y="connsiteY17"/>
+              </a:cxn>
+              <a:cxn ang="0">
+                <a:pos x="connsiteX18" y="connsiteY18"/>
+              </a:cxn>
+              <a:cxn ang="0">
+                <a:pos x="connsiteX19" y="connsiteY19"/>
+              </a:cxn>
+              <a:cxn ang="0">
+                <a:pos x="connsiteX20" y="connsiteY20"/>
+              </a:cxn>
+            </a:cxnLst>
+            <a:rect l="l" t="t" r="r" b="b"/>
+            <a:pathLst>
+              <a:path w="1948547" h="1467954">
+                <a:moveTo>
+                  <a:pt x="0" y="84222"/>
+                </a:moveTo>
+                <a:cubicBezTo>
+                  <a:pt x="0" y="-15203"/>
+                  <a:pt x="84930" y="1353"/>
+                  <a:pt x="184355" y="1353"/>
+                </a:cubicBezTo>
+                <a:lnTo>
+                  <a:pt x="328367" y="1353"/>
+                </a:lnTo>
+                <a:lnTo>
+                  <a:pt x="328367" y="1353"/>
+                </a:lnTo>
+                <a:lnTo>
+                  <a:pt x="814421" y="1353"/>
+                </a:lnTo>
+                <a:lnTo>
+                  <a:pt x="1768523" y="1353"/>
+                </a:lnTo>
+                <a:cubicBezTo>
+                  <a:pt x="1867948" y="1353"/>
+                  <a:pt x="1948546" y="-17105"/>
+                  <a:pt x="1948546" y="82320"/>
+                </a:cubicBezTo>
+                <a:cubicBezTo>
+                  <a:pt x="1948546" y="265354"/>
+                  <a:pt x="1948547" y="448389"/>
+                  <a:pt x="1948547" y="631423"/>
+                </a:cubicBezTo>
+                <a:lnTo>
+                  <a:pt x="1948547" y="631423"/>
+                </a:lnTo>
+                <a:lnTo>
+                  <a:pt x="1948547" y="901453"/>
+                </a:lnTo>
+                <a:lnTo>
+                  <a:pt x="1948547" y="987174"/>
+                </a:lnTo>
+                <a:cubicBezTo>
+                  <a:pt x="1948547" y="1086599"/>
+                  <a:pt x="1867948" y="1081473"/>
+                  <a:pt x="1768523" y="1081473"/>
+                </a:cubicBezTo>
+                <a:lnTo>
+                  <a:pt x="927238" y="1079571"/>
+                </a:lnTo>
+                <a:lnTo>
+                  <a:pt x="782395" y="1467954"/>
+                </a:lnTo>
+                <a:lnTo>
+                  <a:pt x="643086" y="1081476"/>
+                </a:lnTo>
+                <a:lnTo>
+                  <a:pt x="110733" y="1079568"/>
+                </a:lnTo>
+                <a:cubicBezTo>
+                  <a:pt x="11308" y="1079568"/>
+                  <a:pt x="4330" y="1056125"/>
+                  <a:pt x="4330" y="956700"/>
+                </a:cubicBezTo>
+                <a:lnTo>
+                  <a:pt x="4330" y="880504"/>
+                </a:lnTo>
+                <a:cubicBezTo>
+                  <a:pt x="4330" y="750488"/>
+                  <a:pt x="4331" y="761439"/>
+                  <a:pt x="4331" y="631423"/>
+                </a:cubicBezTo>
+                <a:lnTo>
+                  <a:pt x="4331" y="631423"/>
+                </a:lnTo>
+                <a:cubicBezTo>
+                  <a:pt x="2887" y="449023"/>
+                  <a:pt x="1444" y="266622"/>
+                  <a:pt x="0" y="84222"/>
+                </a:cubicBezTo>
+                <a:close/>
+              </a:path>
+            </a:pathLst>
+          </a:custGeom>
+          <a:solidFill>
+            <a:schemeClr val="bg1"/>
+          </a:solidFill>
+          <a:ln w="6350">
+            <a:solidFill>
+              <a:schemeClr val="bg1">
+                <a:lumMod val="65000"/>
+              </a:schemeClr>
+            </a:solidFill>
+          </a:ln>
+        </p:spPr>
+        <p:style>
+          <a:lnRef idx="2">
+            <a:schemeClr val="accent1">
+              <a:shade val="50000"/>
+            </a:schemeClr>
+          </a:lnRef>
+          <a:fillRef idx="1">
+            <a:schemeClr val="accent1"/>
+          </a:fillRef>
+          <a:effectRef idx="0">
+            <a:schemeClr val="accent1"/>
+          </a:effectRef>
+          <a:fontRef idx="minor">
+            <a:schemeClr val="lt1"/>
+          </a:fontRef>
+        </p:style>
+        <p:txBody>
+          <a:bodyPr rtlCol="0" anchor="ctr"/>
+          <a:lstStyle/>
+          <a:p>
+            <a:pPr algn="ctr"/>
+            <a:endParaRPr lang="nl-NL"/>
+          </a:p>
+        </p:txBody>
+      </p:sp>
     </p:spTree>
     <p:extLst>
       <p:ext uri="{BB962C8B-B14F-4D97-AF65-F5344CB8AC3E}">

</xml_diff>

<commit_message>
[fixes #97], [fixes #104], [fixes #108] Combined commit for introduction, cloning button and removed death
</commit_message>
<xml_diff>
--- a/Spacefarm/assets/www/farming/images/textbox/textboxes powerpoint.pptx
+++ b/Spacefarm/assets/www/farming/images/textbox/textboxes powerpoint.pptx
@@ -288,7 +288,7 @@
           <a:p>
             <a:fld id="{A5739391-7E05-4257-8A89-E6BE91A06449}" type="datetimeFigureOut">
               <a:rPr lang="nl-NL" smtClean="0"/>
-              <a:t>19-12-2014</a:t>
+              <a:t>8-1-2015</a:t>
             </a:fld>
             <a:endParaRPr lang="nl-NL"/>
           </a:p>
@@ -458,7 +458,7 @@
           <a:p>
             <a:fld id="{A5739391-7E05-4257-8A89-E6BE91A06449}" type="datetimeFigureOut">
               <a:rPr lang="nl-NL" smtClean="0"/>
-              <a:t>19-12-2014</a:t>
+              <a:t>8-1-2015</a:t>
             </a:fld>
             <a:endParaRPr lang="nl-NL"/>
           </a:p>
@@ -638,7 +638,7 @@
           <a:p>
             <a:fld id="{A5739391-7E05-4257-8A89-E6BE91A06449}" type="datetimeFigureOut">
               <a:rPr lang="nl-NL" smtClean="0"/>
-              <a:t>19-12-2014</a:t>
+              <a:t>8-1-2015</a:t>
             </a:fld>
             <a:endParaRPr lang="nl-NL"/>
           </a:p>
@@ -808,7 +808,7 @@
           <a:p>
             <a:fld id="{A5739391-7E05-4257-8A89-E6BE91A06449}" type="datetimeFigureOut">
               <a:rPr lang="nl-NL" smtClean="0"/>
-              <a:t>19-12-2014</a:t>
+              <a:t>8-1-2015</a:t>
             </a:fld>
             <a:endParaRPr lang="nl-NL"/>
           </a:p>
@@ -1054,7 +1054,7 @@
           <a:p>
             <a:fld id="{A5739391-7E05-4257-8A89-E6BE91A06449}" type="datetimeFigureOut">
               <a:rPr lang="nl-NL" smtClean="0"/>
-              <a:t>19-12-2014</a:t>
+              <a:t>8-1-2015</a:t>
             </a:fld>
             <a:endParaRPr lang="nl-NL"/>
           </a:p>
@@ -1342,7 +1342,7 @@
           <a:p>
             <a:fld id="{A5739391-7E05-4257-8A89-E6BE91A06449}" type="datetimeFigureOut">
               <a:rPr lang="nl-NL" smtClean="0"/>
-              <a:t>19-12-2014</a:t>
+              <a:t>8-1-2015</a:t>
             </a:fld>
             <a:endParaRPr lang="nl-NL"/>
           </a:p>
@@ -1764,7 +1764,7 @@
           <a:p>
             <a:fld id="{A5739391-7E05-4257-8A89-E6BE91A06449}" type="datetimeFigureOut">
               <a:rPr lang="nl-NL" smtClean="0"/>
-              <a:t>19-12-2014</a:t>
+              <a:t>8-1-2015</a:t>
             </a:fld>
             <a:endParaRPr lang="nl-NL"/>
           </a:p>
@@ -1882,7 +1882,7 @@
           <a:p>
             <a:fld id="{A5739391-7E05-4257-8A89-E6BE91A06449}" type="datetimeFigureOut">
               <a:rPr lang="nl-NL" smtClean="0"/>
-              <a:t>19-12-2014</a:t>
+              <a:t>8-1-2015</a:t>
             </a:fld>
             <a:endParaRPr lang="nl-NL"/>
           </a:p>
@@ -1977,7 +1977,7 @@
           <a:p>
             <a:fld id="{A5739391-7E05-4257-8A89-E6BE91A06449}" type="datetimeFigureOut">
               <a:rPr lang="nl-NL" smtClean="0"/>
-              <a:t>19-12-2014</a:t>
+              <a:t>8-1-2015</a:t>
             </a:fld>
             <a:endParaRPr lang="nl-NL"/>
           </a:p>
@@ -2254,7 +2254,7 @@
           <a:p>
             <a:fld id="{A5739391-7E05-4257-8A89-E6BE91A06449}" type="datetimeFigureOut">
               <a:rPr lang="nl-NL" smtClean="0"/>
-              <a:t>19-12-2014</a:t>
+              <a:t>8-1-2015</a:t>
             </a:fld>
             <a:endParaRPr lang="nl-NL"/>
           </a:p>
@@ -2507,7 +2507,7 @@
           <a:p>
             <a:fld id="{A5739391-7E05-4257-8A89-E6BE91A06449}" type="datetimeFigureOut">
               <a:rPr lang="nl-NL" smtClean="0"/>
-              <a:t>19-12-2014</a:t>
+              <a:t>8-1-2015</a:t>
             </a:fld>
             <a:endParaRPr lang="nl-NL"/>
           </a:p>
@@ -2720,7 +2720,7 @@
           <a:p>
             <a:fld id="{A5739391-7E05-4257-8A89-E6BE91A06449}" type="datetimeFigureOut">
               <a:rPr lang="nl-NL" smtClean="0"/>
-              <a:t>19-12-2014</a:t>
+              <a:t>8-1-2015</a:t>
             </a:fld>
             <a:endParaRPr lang="nl-NL"/>
           </a:p>
@@ -5657,6 +5657,1524 @@
           </a:p>
         </p:txBody>
       </p:sp>
+      <p:sp>
+        <p:nvSpPr>
+          <p:cNvPr id="9" name="Rounded Rectangular Callout 5"/>
+          <p:cNvSpPr/>
+          <p:nvPr/>
+        </p:nvSpPr>
+        <p:spPr>
+          <a:xfrm rot="16200000" flipH="1" flipV="1">
+            <a:off x="1082134" y="2798823"/>
+            <a:ext cx="1320623" cy="2261772"/>
+          </a:xfrm>
+          <a:custGeom>
+            <a:avLst/>
+            <a:gdLst>
+              <a:gd name="connsiteX0" fmla="*/ 0 w 1944216"/>
+              <a:gd name="connsiteY0" fmla="*/ 180024 h 1080120"/>
+              <a:gd name="connsiteX1" fmla="*/ 180024 w 1944216"/>
+              <a:gd name="connsiteY1" fmla="*/ 0 h 1080120"/>
+              <a:gd name="connsiteX2" fmla="*/ 324036 w 1944216"/>
+              <a:gd name="connsiteY2" fmla="*/ 0 h 1080120"/>
+              <a:gd name="connsiteX3" fmla="*/ 324036 w 1944216"/>
+              <a:gd name="connsiteY3" fmla="*/ 0 h 1080120"/>
+              <a:gd name="connsiteX4" fmla="*/ 810090 w 1944216"/>
+              <a:gd name="connsiteY4" fmla="*/ 0 h 1080120"/>
+              <a:gd name="connsiteX5" fmla="*/ 1764192 w 1944216"/>
+              <a:gd name="connsiteY5" fmla="*/ 0 h 1080120"/>
+              <a:gd name="connsiteX6" fmla="*/ 1944216 w 1944216"/>
+              <a:gd name="connsiteY6" fmla="*/ 180024 h 1080120"/>
+              <a:gd name="connsiteX7" fmla="*/ 1944216 w 1944216"/>
+              <a:gd name="connsiteY7" fmla="*/ 630070 h 1080120"/>
+              <a:gd name="connsiteX8" fmla="*/ 1944216 w 1944216"/>
+              <a:gd name="connsiteY8" fmla="*/ 630070 h 1080120"/>
+              <a:gd name="connsiteX9" fmla="*/ 1944216 w 1944216"/>
+              <a:gd name="connsiteY9" fmla="*/ 900100 h 1080120"/>
+              <a:gd name="connsiteX10" fmla="*/ 1944216 w 1944216"/>
+              <a:gd name="connsiteY10" fmla="*/ 900096 h 1080120"/>
+              <a:gd name="connsiteX11" fmla="*/ 1764192 w 1944216"/>
+              <a:gd name="connsiteY11" fmla="*/ 1080120 h 1080120"/>
+              <a:gd name="connsiteX12" fmla="*/ 810090 w 1944216"/>
+              <a:gd name="connsiteY12" fmla="*/ 1080120 h 1080120"/>
+              <a:gd name="connsiteX13" fmla="*/ 544206 w 1944216"/>
+              <a:gd name="connsiteY13" fmla="*/ 1710435 h 1080120"/>
+              <a:gd name="connsiteX14" fmla="*/ 324036 w 1944216"/>
+              <a:gd name="connsiteY14" fmla="*/ 1080120 h 1080120"/>
+              <a:gd name="connsiteX15" fmla="*/ 180024 w 1944216"/>
+              <a:gd name="connsiteY15" fmla="*/ 1080120 h 1080120"/>
+              <a:gd name="connsiteX16" fmla="*/ 0 w 1944216"/>
+              <a:gd name="connsiteY16" fmla="*/ 900096 h 1080120"/>
+              <a:gd name="connsiteX17" fmla="*/ 0 w 1944216"/>
+              <a:gd name="connsiteY17" fmla="*/ 900100 h 1080120"/>
+              <a:gd name="connsiteX18" fmla="*/ 0 w 1944216"/>
+              <a:gd name="connsiteY18" fmla="*/ 630070 h 1080120"/>
+              <a:gd name="connsiteX19" fmla="*/ 0 w 1944216"/>
+              <a:gd name="connsiteY19" fmla="*/ 630070 h 1080120"/>
+              <a:gd name="connsiteX20" fmla="*/ 0 w 1944216"/>
+              <a:gd name="connsiteY20" fmla="*/ 180024 h 1080120"/>
+              <a:gd name="connsiteX0" fmla="*/ 0 w 1944216"/>
+              <a:gd name="connsiteY0" fmla="*/ 180024 h 1710435"/>
+              <a:gd name="connsiteX1" fmla="*/ 180024 w 1944216"/>
+              <a:gd name="connsiteY1" fmla="*/ 0 h 1710435"/>
+              <a:gd name="connsiteX2" fmla="*/ 324036 w 1944216"/>
+              <a:gd name="connsiteY2" fmla="*/ 0 h 1710435"/>
+              <a:gd name="connsiteX3" fmla="*/ 324036 w 1944216"/>
+              <a:gd name="connsiteY3" fmla="*/ 0 h 1710435"/>
+              <a:gd name="connsiteX4" fmla="*/ 810090 w 1944216"/>
+              <a:gd name="connsiteY4" fmla="*/ 0 h 1710435"/>
+              <a:gd name="connsiteX5" fmla="*/ 1764192 w 1944216"/>
+              <a:gd name="connsiteY5" fmla="*/ 0 h 1710435"/>
+              <a:gd name="connsiteX6" fmla="*/ 1944216 w 1944216"/>
+              <a:gd name="connsiteY6" fmla="*/ 180024 h 1710435"/>
+              <a:gd name="connsiteX7" fmla="*/ 1944216 w 1944216"/>
+              <a:gd name="connsiteY7" fmla="*/ 630070 h 1710435"/>
+              <a:gd name="connsiteX8" fmla="*/ 1944216 w 1944216"/>
+              <a:gd name="connsiteY8" fmla="*/ 630070 h 1710435"/>
+              <a:gd name="connsiteX9" fmla="*/ 1944216 w 1944216"/>
+              <a:gd name="connsiteY9" fmla="*/ 900100 h 1710435"/>
+              <a:gd name="connsiteX10" fmla="*/ 1944216 w 1944216"/>
+              <a:gd name="connsiteY10" fmla="*/ 900096 h 1710435"/>
+              <a:gd name="connsiteX11" fmla="*/ 1764192 w 1944216"/>
+              <a:gd name="connsiteY11" fmla="*/ 1080120 h 1710435"/>
+              <a:gd name="connsiteX12" fmla="*/ 810090 w 1944216"/>
+              <a:gd name="connsiteY12" fmla="*/ 1080120 h 1710435"/>
+              <a:gd name="connsiteX13" fmla="*/ 544206 w 1944216"/>
+              <a:gd name="connsiteY13" fmla="*/ 1710435 h 1710435"/>
+              <a:gd name="connsiteX14" fmla="*/ 461196 w 1944216"/>
+              <a:gd name="connsiteY14" fmla="*/ 1080120 h 1710435"/>
+              <a:gd name="connsiteX15" fmla="*/ 180024 w 1944216"/>
+              <a:gd name="connsiteY15" fmla="*/ 1080120 h 1710435"/>
+              <a:gd name="connsiteX16" fmla="*/ 0 w 1944216"/>
+              <a:gd name="connsiteY16" fmla="*/ 900096 h 1710435"/>
+              <a:gd name="connsiteX17" fmla="*/ 0 w 1944216"/>
+              <a:gd name="connsiteY17" fmla="*/ 900100 h 1710435"/>
+              <a:gd name="connsiteX18" fmla="*/ 0 w 1944216"/>
+              <a:gd name="connsiteY18" fmla="*/ 630070 h 1710435"/>
+              <a:gd name="connsiteX19" fmla="*/ 0 w 1944216"/>
+              <a:gd name="connsiteY19" fmla="*/ 630070 h 1710435"/>
+              <a:gd name="connsiteX20" fmla="*/ 0 w 1944216"/>
+              <a:gd name="connsiteY20" fmla="*/ 180024 h 1710435"/>
+              <a:gd name="connsiteX0" fmla="*/ 0 w 1944216"/>
+              <a:gd name="connsiteY0" fmla="*/ 180024 h 1710435"/>
+              <a:gd name="connsiteX1" fmla="*/ 180024 w 1944216"/>
+              <a:gd name="connsiteY1" fmla="*/ 0 h 1710435"/>
+              <a:gd name="connsiteX2" fmla="*/ 324036 w 1944216"/>
+              <a:gd name="connsiteY2" fmla="*/ 0 h 1710435"/>
+              <a:gd name="connsiteX3" fmla="*/ 324036 w 1944216"/>
+              <a:gd name="connsiteY3" fmla="*/ 0 h 1710435"/>
+              <a:gd name="connsiteX4" fmla="*/ 810090 w 1944216"/>
+              <a:gd name="connsiteY4" fmla="*/ 0 h 1710435"/>
+              <a:gd name="connsiteX5" fmla="*/ 1764192 w 1944216"/>
+              <a:gd name="connsiteY5" fmla="*/ 0 h 1710435"/>
+              <a:gd name="connsiteX6" fmla="*/ 1944216 w 1944216"/>
+              <a:gd name="connsiteY6" fmla="*/ 180024 h 1710435"/>
+              <a:gd name="connsiteX7" fmla="*/ 1944216 w 1944216"/>
+              <a:gd name="connsiteY7" fmla="*/ 630070 h 1710435"/>
+              <a:gd name="connsiteX8" fmla="*/ 1944216 w 1944216"/>
+              <a:gd name="connsiteY8" fmla="*/ 630070 h 1710435"/>
+              <a:gd name="connsiteX9" fmla="*/ 1944216 w 1944216"/>
+              <a:gd name="connsiteY9" fmla="*/ 900100 h 1710435"/>
+              <a:gd name="connsiteX10" fmla="*/ 1944216 w 1944216"/>
+              <a:gd name="connsiteY10" fmla="*/ 900096 h 1710435"/>
+              <a:gd name="connsiteX11" fmla="*/ 1764192 w 1944216"/>
+              <a:gd name="connsiteY11" fmla="*/ 1080120 h 1710435"/>
+              <a:gd name="connsiteX12" fmla="*/ 650070 w 1944216"/>
+              <a:gd name="connsiteY12" fmla="*/ 1080120 h 1710435"/>
+              <a:gd name="connsiteX13" fmla="*/ 544206 w 1944216"/>
+              <a:gd name="connsiteY13" fmla="*/ 1710435 h 1710435"/>
+              <a:gd name="connsiteX14" fmla="*/ 461196 w 1944216"/>
+              <a:gd name="connsiteY14" fmla="*/ 1080120 h 1710435"/>
+              <a:gd name="connsiteX15" fmla="*/ 180024 w 1944216"/>
+              <a:gd name="connsiteY15" fmla="*/ 1080120 h 1710435"/>
+              <a:gd name="connsiteX16" fmla="*/ 0 w 1944216"/>
+              <a:gd name="connsiteY16" fmla="*/ 900096 h 1710435"/>
+              <a:gd name="connsiteX17" fmla="*/ 0 w 1944216"/>
+              <a:gd name="connsiteY17" fmla="*/ 900100 h 1710435"/>
+              <a:gd name="connsiteX18" fmla="*/ 0 w 1944216"/>
+              <a:gd name="connsiteY18" fmla="*/ 630070 h 1710435"/>
+              <a:gd name="connsiteX19" fmla="*/ 0 w 1944216"/>
+              <a:gd name="connsiteY19" fmla="*/ 630070 h 1710435"/>
+              <a:gd name="connsiteX20" fmla="*/ 0 w 1944216"/>
+              <a:gd name="connsiteY20" fmla="*/ 180024 h 1710435"/>
+              <a:gd name="connsiteX0" fmla="*/ 0 w 1944216"/>
+              <a:gd name="connsiteY0" fmla="*/ 180024 h 1710435"/>
+              <a:gd name="connsiteX1" fmla="*/ 180024 w 1944216"/>
+              <a:gd name="connsiteY1" fmla="*/ 0 h 1710435"/>
+              <a:gd name="connsiteX2" fmla="*/ 324036 w 1944216"/>
+              <a:gd name="connsiteY2" fmla="*/ 0 h 1710435"/>
+              <a:gd name="connsiteX3" fmla="*/ 324036 w 1944216"/>
+              <a:gd name="connsiteY3" fmla="*/ 0 h 1710435"/>
+              <a:gd name="connsiteX4" fmla="*/ 810090 w 1944216"/>
+              <a:gd name="connsiteY4" fmla="*/ 0 h 1710435"/>
+              <a:gd name="connsiteX5" fmla="*/ 1764192 w 1944216"/>
+              <a:gd name="connsiteY5" fmla="*/ 0 h 1710435"/>
+              <a:gd name="connsiteX6" fmla="*/ 1944216 w 1944216"/>
+              <a:gd name="connsiteY6" fmla="*/ 180024 h 1710435"/>
+              <a:gd name="connsiteX7" fmla="*/ 1944216 w 1944216"/>
+              <a:gd name="connsiteY7" fmla="*/ 630070 h 1710435"/>
+              <a:gd name="connsiteX8" fmla="*/ 1944216 w 1944216"/>
+              <a:gd name="connsiteY8" fmla="*/ 630070 h 1710435"/>
+              <a:gd name="connsiteX9" fmla="*/ 1944216 w 1944216"/>
+              <a:gd name="connsiteY9" fmla="*/ 900100 h 1710435"/>
+              <a:gd name="connsiteX10" fmla="*/ 1944216 w 1944216"/>
+              <a:gd name="connsiteY10" fmla="*/ 900096 h 1710435"/>
+              <a:gd name="connsiteX11" fmla="*/ 1764192 w 1944216"/>
+              <a:gd name="connsiteY11" fmla="*/ 1080120 h 1710435"/>
+              <a:gd name="connsiteX12" fmla="*/ 922907 w 1944216"/>
+              <a:gd name="connsiteY12" fmla="*/ 1078218 h 1710435"/>
+              <a:gd name="connsiteX13" fmla="*/ 544206 w 1944216"/>
+              <a:gd name="connsiteY13" fmla="*/ 1710435 h 1710435"/>
+              <a:gd name="connsiteX14" fmla="*/ 461196 w 1944216"/>
+              <a:gd name="connsiteY14" fmla="*/ 1080120 h 1710435"/>
+              <a:gd name="connsiteX15" fmla="*/ 180024 w 1944216"/>
+              <a:gd name="connsiteY15" fmla="*/ 1080120 h 1710435"/>
+              <a:gd name="connsiteX16" fmla="*/ 0 w 1944216"/>
+              <a:gd name="connsiteY16" fmla="*/ 900096 h 1710435"/>
+              <a:gd name="connsiteX17" fmla="*/ 0 w 1944216"/>
+              <a:gd name="connsiteY17" fmla="*/ 900100 h 1710435"/>
+              <a:gd name="connsiteX18" fmla="*/ 0 w 1944216"/>
+              <a:gd name="connsiteY18" fmla="*/ 630070 h 1710435"/>
+              <a:gd name="connsiteX19" fmla="*/ 0 w 1944216"/>
+              <a:gd name="connsiteY19" fmla="*/ 630070 h 1710435"/>
+              <a:gd name="connsiteX20" fmla="*/ 0 w 1944216"/>
+              <a:gd name="connsiteY20" fmla="*/ 180024 h 1710435"/>
+              <a:gd name="connsiteX0" fmla="*/ 0 w 1944216"/>
+              <a:gd name="connsiteY0" fmla="*/ 180024 h 1710435"/>
+              <a:gd name="connsiteX1" fmla="*/ 180024 w 1944216"/>
+              <a:gd name="connsiteY1" fmla="*/ 0 h 1710435"/>
+              <a:gd name="connsiteX2" fmla="*/ 324036 w 1944216"/>
+              <a:gd name="connsiteY2" fmla="*/ 0 h 1710435"/>
+              <a:gd name="connsiteX3" fmla="*/ 324036 w 1944216"/>
+              <a:gd name="connsiteY3" fmla="*/ 0 h 1710435"/>
+              <a:gd name="connsiteX4" fmla="*/ 810090 w 1944216"/>
+              <a:gd name="connsiteY4" fmla="*/ 0 h 1710435"/>
+              <a:gd name="connsiteX5" fmla="*/ 1764192 w 1944216"/>
+              <a:gd name="connsiteY5" fmla="*/ 0 h 1710435"/>
+              <a:gd name="connsiteX6" fmla="*/ 1944216 w 1944216"/>
+              <a:gd name="connsiteY6" fmla="*/ 180024 h 1710435"/>
+              <a:gd name="connsiteX7" fmla="*/ 1944216 w 1944216"/>
+              <a:gd name="connsiteY7" fmla="*/ 630070 h 1710435"/>
+              <a:gd name="connsiteX8" fmla="*/ 1944216 w 1944216"/>
+              <a:gd name="connsiteY8" fmla="*/ 630070 h 1710435"/>
+              <a:gd name="connsiteX9" fmla="*/ 1944216 w 1944216"/>
+              <a:gd name="connsiteY9" fmla="*/ 900100 h 1710435"/>
+              <a:gd name="connsiteX10" fmla="*/ 1944216 w 1944216"/>
+              <a:gd name="connsiteY10" fmla="*/ 900096 h 1710435"/>
+              <a:gd name="connsiteX11" fmla="*/ 1764192 w 1944216"/>
+              <a:gd name="connsiteY11" fmla="*/ 1080120 h 1710435"/>
+              <a:gd name="connsiteX12" fmla="*/ 922907 w 1944216"/>
+              <a:gd name="connsiteY12" fmla="*/ 1078218 h 1710435"/>
+              <a:gd name="connsiteX13" fmla="*/ 544206 w 1944216"/>
+              <a:gd name="connsiteY13" fmla="*/ 1710435 h 1710435"/>
+              <a:gd name="connsiteX14" fmla="*/ 638755 w 1944216"/>
+              <a:gd name="connsiteY14" fmla="*/ 1080123 h 1710435"/>
+              <a:gd name="connsiteX15" fmla="*/ 180024 w 1944216"/>
+              <a:gd name="connsiteY15" fmla="*/ 1080120 h 1710435"/>
+              <a:gd name="connsiteX16" fmla="*/ 0 w 1944216"/>
+              <a:gd name="connsiteY16" fmla="*/ 900096 h 1710435"/>
+              <a:gd name="connsiteX17" fmla="*/ 0 w 1944216"/>
+              <a:gd name="connsiteY17" fmla="*/ 900100 h 1710435"/>
+              <a:gd name="connsiteX18" fmla="*/ 0 w 1944216"/>
+              <a:gd name="connsiteY18" fmla="*/ 630070 h 1710435"/>
+              <a:gd name="connsiteX19" fmla="*/ 0 w 1944216"/>
+              <a:gd name="connsiteY19" fmla="*/ 630070 h 1710435"/>
+              <a:gd name="connsiteX20" fmla="*/ 0 w 1944216"/>
+              <a:gd name="connsiteY20" fmla="*/ 180024 h 1710435"/>
+              <a:gd name="connsiteX0" fmla="*/ 0 w 1944216"/>
+              <a:gd name="connsiteY0" fmla="*/ 180024 h 1674243"/>
+              <a:gd name="connsiteX1" fmla="*/ 180024 w 1944216"/>
+              <a:gd name="connsiteY1" fmla="*/ 0 h 1674243"/>
+              <a:gd name="connsiteX2" fmla="*/ 324036 w 1944216"/>
+              <a:gd name="connsiteY2" fmla="*/ 0 h 1674243"/>
+              <a:gd name="connsiteX3" fmla="*/ 324036 w 1944216"/>
+              <a:gd name="connsiteY3" fmla="*/ 0 h 1674243"/>
+              <a:gd name="connsiteX4" fmla="*/ 810090 w 1944216"/>
+              <a:gd name="connsiteY4" fmla="*/ 0 h 1674243"/>
+              <a:gd name="connsiteX5" fmla="*/ 1764192 w 1944216"/>
+              <a:gd name="connsiteY5" fmla="*/ 0 h 1674243"/>
+              <a:gd name="connsiteX6" fmla="*/ 1944216 w 1944216"/>
+              <a:gd name="connsiteY6" fmla="*/ 180024 h 1674243"/>
+              <a:gd name="connsiteX7" fmla="*/ 1944216 w 1944216"/>
+              <a:gd name="connsiteY7" fmla="*/ 630070 h 1674243"/>
+              <a:gd name="connsiteX8" fmla="*/ 1944216 w 1944216"/>
+              <a:gd name="connsiteY8" fmla="*/ 630070 h 1674243"/>
+              <a:gd name="connsiteX9" fmla="*/ 1944216 w 1944216"/>
+              <a:gd name="connsiteY9" fmla="*/ 900100 h 1674243"/>
+              <a:gd name="connsiteX10" fmla="*/ 1944216 w 1944216"/>
+              <a:gd name="connsiteY10" fmla="*/ 900096 h 1674243"/>
+              <a:gd name="connsiteX11" fmla="*/ 1764192 w 1944216"/>
+              <a:gd name="connsiteY11" fmla="*/ 1080120 h 1674243"/>
+              <a:gd name="connsiteX12" fmla="*/ 922907 w 1944216"/>
+              <a:gd name="connsiteY12" fmla="*/ 1078218 h 1674243"/>
+              <a:gd name="connsiteX13" fmla="*/ 752080 w 1944216"/>
+              <a:gd name="connsiteY13" fmla="*/ 1674243 h 1674243"/>
+              <a:gd name="connsiteX14" fmla="*/ 638755 w 1944216"/>
+              <a:gd name="connsiteY14" fmla="*/ 1080123 h 1674243"/>
+              <a:gd name="connsiteX15" fmla="*/ 180024 w 1944216"/>
+              <a:gd name="connsiteY15" fmla="*/ 1080120 h 1674243"/>
+              <a:gd name="connsiteX16" fmla="*/ 0 w 1944216"/>
+              <a:gd name="connsiteY16" fmla="*/ 900096 h 1674243"/>
+              <a:gd name="connsiteX17" fmla="*/ 0 w 1944216"/>
+              <a:gd name="connsiteY17" fmla="*/ 900100 h 1674243"/>
+              <a:gd name="connsiteX18" fmla="*/ 0 w 1944216"/>
+              <a:gd name="connsiteY18" fmla="*/ 630070 h 1674243"/>
+              <a:gd name="connsiteX19" fmla="*/ 0 w 1944216"/>
+              <a:gd name="connsiteY19" fmla="*/ 630070 h 1674243"/>
+              <a:gd name="connsiteX20" fmla="*/ 0 w 1944216"/>
+              <a:gd name="connsiteY20" fmla="*/ 180024 h 1674243"/>
+              <a:gd name="connsiteX0" fmla="*/ 0 w 1944216"/>
+              <a:gd name="connsiteY0" fmla="*/ 181377 h 1675596"/>
+              <a:gd name="connsiteX1" fmla="*/ 180024 w 1944216"/>
+              <a:gd name="connsiteY1" fmla="*/ 1353 h 1675596"/>
+              <a:gd name="connsiteX2" fmla="*/ 324036 w 1944216"/>
+              <a:gd name="connsiteY2" fmla="*/ 1353 h 1675596"/>
+              <a:gd name="connsiteX3" fmla="*/ 324036 w 1944216"/>
+              <a:gd name="connsiteY3" fmla="*/ 1353 h 1675596"/>
+              <a:gd name="connsiteX4" fmla="*/ 810090 w 1944216"/>
+              <a:gd name="connsiteY4" fmla="*/ 1353 h 1675596"/>
+              <a:gd name="connsiteX5" fmla="*/ 1764192 w 1944216"/>
+              <a:gd name="connsiteY5" fmla="*/ 1353 h 1675596"/>
+              <a:gd name="connsiteX6" fmla="*/ 1944215 w 1944216"/>
+              <a:gd name="connsiteY6" fmla="*/ 82320 h 1675596"/>
+              <a:gd name="connsiteX7" fmla="*/ 1944216 w 1944216"/>
+              <a:gd name="connsiteY7" fmla="*/ 631423 h 1675596"/>
+              <a:gd name="connsiteX8" fmla="*/ 1944216 w 1944216"/>
+              <a:gd name="connsiteY8" fmla="*/ 631423 h 1675596"/>
+              <a:gd name="connsiteX9" fmla="*/ 1944216 w 1944216"/>
+              <a:gd name="connsiteY9" fmla="*/ 901453 h 1675596"/>
+              <a:gd name="connsiteX10" fmla="*/ 1944216 w 1944216"/>
+              <a:gd name="connsiteY10" fmla="*/ 901449 h 1675596"/>
+              <a:gd name="connsiteX11" fmla="*/ 1764192 w 1944216"/>
+              <a:gd name="connsiteY11" fmla="*/ 1081473 h 1675596"/>
+              <a:gd name="connsiteX12" fmla="*/ 922907 w 1944216"/>
+              <a:gd name="connsiteY12" fmla="*/ 1079571 h 1675596"/>
+              <a:gd name="connsiteX13" fmla="*/ 752080 w 1944216"/>
+              <a:gd name="connsiteY13" fmla="*/ 1675596 h 1675596"/>
+              <a:gd name="connsiteX14" fmla="*/ 638755 w 1944216"/>
+              <a:gd name="connsiteY14" fmla="*/ 1081476 h 1675596"/>
+              <a:gd name="connsiteX15" fmla="*/ 180024 w 1944216"/>
+              <a:gd name="connsiteY15" fmla="*/ 1081473 h 1675596"/>
+              <a:gd name="connsiteX16" fmla="*/ 0 w 1944216"/>
+              <a:gd name="connsiteY16" fmla="*/ 901449 h 1675596"/>
+              <a:gd name="connsiteX17" fmla="*/ 0 w 1944216"/>
+              <a:gd name="connsiteY17" fmla="*/ 901453 h 1675596"/>
+              <a:gd name="connsiteX18" fmla="*/ 0 w 1944216"/>
+              <a:gd name="connsiteY18" fmla="*/ 631423 h 1675596"/>
+              <a:gd name="connsiteX19" fmla="*/ 0 w 1944216"/>
+              <a:gd name="connsiteY19" fmla="*/ 631423 h 1675596"/>
+              <a:gd name="connsiteX20" fmla="*/ 0 w 1944216"/>
+              <a:gd name="connsiteY20" fmla="*/ 181377 h 1675596"/>
+              <a:gd name="connsiteX0" fmla="*/ 0 w 1944216"/>
+              <a:gd name="connsiteY0" fmla="*/ 181377 h 1675596"/>
+              <a:gd name="connsiteX1" fmla="*/ 180024 w 1944216"/>
+              <a:gd name="connsiteY1" fmla="*/ 1353 h 1675596"/>
+              <a:gd name="connsiteX2" fmla="*/ 324036 w 1944216"/>
+              <a:gd name="connsiteY2" fmla="*/ 1353 h 1675596"/>
+              <a:gd name="connsiteX3" fmla="*/ 324036 w 1944216"/>
+              <a:gd name="connsiteY3" fmla="*/ 1353 h 1675596"/>
+              <a:gd name="connsiteX4" fmla="*/ 810090 w 1944216"/>
+              <a:gd name="connsiteY4" fmla="*/ 1353 h 1675596"/>
+              <a:gd name="connsiteX5" fmla="*/ 1764192 w 1944216"/>
+              <a:gd name="connsiteY5" fmla="*/ 1353 h 1675596"/>
+              <a:gd name="connsiteX6" fmla="*/ 1944215 w 1944216"/>
+              <a:gd name="connsiteY6" fmla="*/ 82320 h 1675596"/>
+              <a:gd name="connsiteX7" fmla="*/ 1944216 w 1944216"/>
+              <a:gd name="connsiteY7" fmla="*/ 631423 h 1675596"/>
+              <a:gd name="connsiteX8" fmla="*/ 1944216 w 1944216"/>
+              <a:gd name="connsiteY8" fmla="*/ 631423 h 1675596"/>
+              <a:gd name="connsiteX9" fmla="*/ 1944216 w 1944216"/>
+              <a:gd name="connsiteY9" fmla="*/ 901453 h 1675596"/>
+              <a:gd name="connsiteX10" fmla="*/ 1944216 w 1944216"/>
+              <a:gd name="connsiteY10" fmla="*/ 987174 h 1675596"/>
+              <a:gd name="connsiteX11" fmla="*/ 1764192 w 1944216"/>
+              <a:gd name="connsiteY11" fmla="*/ 1081473 h 1675596"/>
+              <a:gd name="connsiteX12" fmla="*/ 922907 w 1944216"/>
+              <a:gd name="connsiteY12" fmla="*/ 1079571 h 1675596"/>
+              <a:gd name="connsiteX13" fmla="*/ 752080 w 1944216"/>
+              <a:gd name="connsiteY13" fmla="*/ 1675596 h 1675596"/>
+              <a:gd name="connsiteX14" fmla="*/ 638755 w 1944216"/>
+              <a:gd name="connsiteY14" fmla="*/ 1081476 h 1675596"/>
+              <a:gd name="connsiteX15" fmla="*/ 180024 w 1944216"/>
+              <a:gd name="connsiteY15" fmla="*/ 1081473 h 1675596"/>
+              <a:gd name="connsiteX16" fmla="*/ 0 w 1944216"/>
+              <a:gd name="connsiteY16" fmla="*/ 901449 h 1675596"/>
+              <a:gd name="connsiteX17" fmla="*/ 0 w 1944216"/>
+              <a:gd name="connsiteY17" fmla="*/ 901453 h 1675596"/>
+              <a:gd name="connsiteX18" fmla="*/ 0 w 1944216"/>
+              <a:gd name="connsiteY18" fmla="*/ 631423 h 1675596"/>
+              <a:gd name="connsiteX19" fmla="*/ 0 w 1944216"/>
+              <a:gd name="connsiteY19" fmla="*/ 631423 h 1675596"/>
+              <a:gd name="connsiteX20" fmla="*/ 0 w 1944216"/>
+              <a:gd name="connsiteY20" fmla="*/ 181377 h 1675596"/>
+              <a:gd name="connsiteX0" fmla="*/ 0 w 1944216"/>
+              <a:gd name="connsiteY0" fmla="*/ 181377 h 1675596"/>
+              <a:gd name="connsiteX1" fmla="*/ 180024 w 1944216"/>
+              <a:gd name="connsiteY1" fmla="*/ 1353 h 1675596"/>
+              <a:gd name="connsiteX2" fmla="*/ 324036 w 1944216"/>
+              <a:gd name="connsiteY2" fmla="*/ 1353 h 1675596"/>
+              <a:gd name="connsiteX3" fmla="*/ 324036 w 1944216"/>
+              <a:gd name="connsiteY3" fmla="*/ 1353 h 1675596"/>
+              <a:gd name="connsiteX4" fmla="*/ 810090 w 1944216"/>
+              <a:gd name="connsiteY4" fmla="*/ 1353 h 1675596"/>
+              <a:gd name="connsiteX5" fmla="*/ 1764192 w 1944216"/>
+              <a:gd name="connsiteY5" fmla="*/ 1353 h 1675596"/>
+              <a:gd name="connsiteX6" fmla="*/ 1944215 w 1944216"/>
+              <a:gd name="connsiteY6" fmla="*/ 82320 h 1675596"/>
+              <a:gd name="connsiteX7" fmla="*/ 1944216 w 1944216"/>
+              <a:gd name="connsiteY7" fmla="*/ 631423 h 1675596"/>
+              <a:gd name="connsiteX8" fmla="*/ 1944216 w 1944216"/>
+              <a:gd name="connsiteY8" fmla="*/ 631423 h 1675596"/>
+              <a:gd name="connsiteX9" fmla="*/ 1944216 w 1944216"/>
+              <a:gd name="connsiteY9" fmla="*/ 901453 h 1675596"/>
+              <a:gd name="connsiteX10" fmla="*/ 1944216 w 1944216"/>
+              <a:gd name="connsiteY10" fmla="*/ 987174 h 1675596"/>
+              <a:gd name="connsiteX11" fmla="*/ 1764192 w 1944216"/>
+              <a:gd name="connsiteY11" fmla="*/ 1081473 h 1675596"/>
+              <a:gd name="connsiteX12" fmla="*/ 922907 w 1944216"/>
+              <a:gd name="connsiteY12" fmla="*/ 1079571 h 1675596"/>
+              <a:gd name="connsiteX13" fmla="*/ 752080 w 1944216"/>
+              <a:gd name="connsiteY13" fmla="*/ 1675596 h 1675596"/>
+              <a:gd name="connsiteX14" fmla="*/ 638755 w 1944216"/>
+              <a:gd name="connsiteY14" fmla="*/ 1081476 h 1675596"/>
+              <a:gd name="connsiteX15" fmla="*/ 106402 w 1944216"/>
+              <a:gd name="connsiteY15" fmla="*/ 1079568 h 1675596"/>
+              <a:gd name="connsiteX16" fmla="*/ 0 w 1944216"/>
+              <a:gd name="connsiteY16" fmla="*/ 901449 h 1675596"/>
+              <a:gd name="connsiteX17" fmla="*/ 0 w 1944216"/>
+              <a:gd name="connsiteY17" fmla="*/ 901453 h 1675596"/>
+              <a:gd name="connsiteX18" fmla="*/ 0 w 1944216"/>
+              <a:gd name="connsiteY18" fmla="*/ 631423 h 1675596"/>
+              <a:gd name="connsiteX19" fmla="*/ 0 w 1944216"/>
+              <a:gd name="connsiteY19" fmla="*/ 631423 h 1675596"/>
+              <a:gd name="connsiteX20" fmla="*/ 0 w 1944216"/>
+              <a:gd name="connsiteY20" fmla="*/ 181377 h 1675596"/>
+              <a:gd name="connsiteX0" fmla="*/ 0 w 1948547"/>
+              <a:gd name="connsiteY0" fmla="*/ 84222 h 1675596"/>
+              <a:gd name="connsiteX1" fmla="*/ 184355 w 1948547"/>
+              <a:gd name="connsiteY1" fmla="*/ 1353 h 1675596"/>
+              <a:gd name="connsiteX2" fmla="*/ 328367 w 1948547"/>
+              <a:gd name="connsiteY2" fmla="*/ 1353 h 1675596"/>
+              <a:gd name="connsiteX3" fmla="*/ 328367 w 1948547"/>
+              <a:gd name="connsiteY3" fmla="*/ 1353 h 1675596"/>
+              <a:gd name="connsiteX4" fmla="*/ 814421 w 1948547"/>
+              <a:gd name="connsiteY4" fmla="*/ 1353 h 1675596"/>
+              <a:gd name="connsiteX5" fmla="*/ 1768523 w 1948547"/>
+              <a:gd name="connsiteY5" fmla="*/ 1353 h 1675596"/>
+              <a:gd name="connsiteX6" fmla="*/ 1948546 w 1948547"/>
+              <a:gd name="connsiteY6" fmla="*/ 82320 h 1675596"/>
+              <a:gd name="connsiteX7" fmla="*/ 1948547 w 1948547"/>
+              <a:gd name="connsiteY7" fmla="*/ 631423 h 1675596"/>
+              <a:gd name="connsiteX8" fmla="*/ 1948547 w 1948547"/>
+              <a:gd name="connsiteY8" fmla="*/ 631423 h 1675596"/>
+              <a:gd name="connsiteX9" fmla="*/ 1948547 w 1948547"/>
+              <a:gd name="connsiteY9" fmla="*/ 901453 h 1675596"/>
+              <a:gd name="connsiteX10" fmla="*/ 1948547 w 1948547"/>
+              <a:gd name="connsiteY10" fmla="*/ 987174 h 1675596"/>
+              <a:gd name="connsiteX11" fmla="*/ 1768523 w 1948547"/>
+              <a:gd name="connsiteY11" fmla="*/ 1081473 h 1675596"/>
+              <a:gd name="connsiteX12" fmla="*/ 927238 w 1948547"/>
+              <a:gd name="connsiteY12" fmla="*/ 1079571 h 1675596"/>
+              <a:gd name="connsiteX13" fmla="*/ 756411 w 1948547"/>
+              <a:gd name="connsiteY13" fmla="*/ 1675596 h 1675596"/>
+              <a:gd name="connsiteX14" fmla="*/ 643086 w 1948547"/>
+              <a:gd name="connsiteY14" fmla="*/ 1081476 h 1675596"/>
+              <a:gd name="connsiteX15" fmla="*/ 110733 w 1948547"/>
+              <a:gd name="connsiteY15" fmla="*/ 1079568 h 1675596"/>
+              <a:gd name="connsiteX16" fmla="*/ 4331 w 1948547"/>
+              <a:gd name="connsiteY16" fmla="*/ 901449 h 1675596"/>
+              <a:gd name="connsiteX17" fmla="*/ 4331 w 1948547"/>
+              <a:gd name="connsiteY17" fmla="*/ 901453 h 1675596"/>
+              <a:gd name="connsiteX18" fmla="*/ 4331 w 1948547"/>
+              <a:gd name="connsiteY18" fmla="*/ 631423 h 1675596"/>
+              <a:gd name="connsiteX19" fmla="*/ 4331 w 1948547"/>
+              <a:gd name="connsiteY19" fmla="*/ 631423 h 1675596"/>
+              <a:gd name="connsiteX20" fmla="*/ 0 w 1948547"/>
+              <a:gd name="connsiteY20" fmla="*/ 84222 h 1675596"/>
+              <a:gd name="connsiteX0" fmla="*/ 0 w 1948547"/>
+              <a:gd name="connsiteY0" fmla="*/ 84222 h 1675596"/>
+              <a:gd name="connsiteX1" fmla="*/ 184355 w 1948547"/>
+              <a:gd name="connsiteY1" fmla="*/ 1353 h 1675596"/>
+              <a:gd name="connsiteX2" fmla="*/ 328367 w 1948547"/>
+              <a:gd name="connsiteY2" fmla="*/ 1353 h 1675596"/>
+              <a:gd name="connsiteX3" fmla="*/ 328367 w 1948547"/>
+              <a:gd name="connsiteY3" fmla="*/ 1353 h 1675596"/>
+              <a:gd name="connsiteX4" fmla="*/ 814421 w 1948547"/>
+              <a:gd name="connsiteY4" fmla="*/ 1353 h 1675596"/>
+              <a:gd name="connsiteX5" fmla="*/ 1768523 w 1948547"/>
+              <a:gd name="connsiteY5" fmla="*/ 1353 h 1675596"/>
+              <a:gd name="connsiteX6" fmla="*/ 1948546 w 1948547"/>
+              <a:gd name="connsiteY6" fmla="*/ 82320 h 1675596"/>
+              <a:gd name="connsiteX7" fmla="*/ 1948547 w 1948547"/>
+              <a:gd name="connsiteY7" fmla="*/ 631423 h 1675596"/>
+              <a:gd name="connsiteX8" fmla="*/ 1948547 w 1948547"/>
+              <a:gd name="connsiteY8" fmla="*/ 631423 h 1675596"/>
+              <a:gd name="connsiteX9" fmla="*/ 1948547 w 1948547"/>
+              <a:gd name="connsiteY9" fmla="*/ 901453 h 1675596"/>
+              <a:gd name="connsiteX10" fmla="*/ 1948547 w 1948547"/>
+              <a:gd name="connsiteY10" fmla="*/ 987174 h 1675596"/>
+              <a:gd name="connsiteX11" fmla="*/ 1768523 w 1948547"/>
+              <a:gd name="connsiteY11" fmla="*/ 1081473 h 1675596"/>
+              <a:gd name="connsiteX12" fmla="*/ 927238 w 1948547"/>
+              <a:gd name="connsiteY12" fmla="*/ 1079571 h 1675596"/>
+              <a:gd name="connsiteX13" fmla="*/ 756411 w 1948547"/>
+              <a:gd name="connsiteY13" fmla="*/ 1675596 h 1675596"/>
+              <a:gd name="connsiteX14" fmla="*/ 643086 w 1948547"/>
+              <a:gd name="connsiteY14" fmla="*/ 1081476 h 1675596"/>
+              <a:gd name="connsiteX15" fmla="*/ 110733 w 1948547"/>
+              <a:gd name="connsiteY15" fmla="*/ 1079568 h 1675596"/>
+              <a:gd name="connsiteX16" fmla="*/ 4331 w 1948547"/>
+              <a:gd name="connsiteY16" fmla="*/ 901449 h 1675596"/>
+              <a:gd name="connsiteX17" fmla="*/ 4330 w 1948547"/>
+              <a:gd name="connsiteY17" fmla="*/ 1021471 h 1675596"/>
+              <a:gd name="connsiteX18" fmla="*/ 4331 w 1948547"/>
+              <a:gd name="connsiteY18" fmla="*/ 631423 h 1675596"/>
+              <a:gd name="connsiteX19" fmla="*/ 4331 w 1948547"/>
+              <a:gd name="connsiteY19" fmla="*/ 631423 h 1675596"/>
+              <a:gd name="connsiteX20" fmla="*/ 0 w 1948547"/>
+              <a:gd name="connsiteY20" fmla="*/ 84222 h 1675596"/>
+              <a:gd name="connsiteX0" fmla="*/ 0 w 1948547"/>
+              <a:gd name="connsiteY0" fmla="*/ 84222 h 1675596"/>
+              <a:gd name="connsiteX1" fmla="*/ 184355 w 1948547"/>
+              <a:gd name="connsiteY1" fmla="*/ 1353 h 1675596"/>
+              <a:gd name="connsiteX2" fmla="*/ 328367 w 1948547"/>
+              <a:gd name="connsiteY2" fmla="*/ 1353 h 1675596"/>
+              <a:gd name="connsiteX3" fmla="*/ 328367 w 1948547"/>
+              <a:gd name="connsiteY3" fmla="*/ 1353 h 1675596"/>
+              <a:gd name="connsiteX4" fmla="*/ 814421 w 1948547"/>
+              <a:gd name="connsiteY4" fmla="*/ 1353 h 1675596"/>
+              <a:gd name="connsiteX5" fmla="*/ 1768523 w 1948547"/>
+              <a:gd name="connsiteY5" fmla="*/ 1353 h 1675596"/>
+              <a:gd name="connsiteX6" fmla="*/ 1948546 w 1948547"/>
+              <a:gd name="connsiteY6" fmla="*/ 82320 h 1675596"/>
+              <a:gd name="connsiteX7" fmla="*/ 1948547 w 1948547"/>
+              <a:gd name="connsiteY7" fmla="*/ 631423 h 1675596"/>
+              <a:gd name="connsiteX8" fmla="*/ 1948547 w 1948547"/>
+              <a:gd name="connsiteY8" fmla="*/ 631423 h 1675596"/>
+              <a:gd name="connsiteX9" fmla="*/ 1948547 w 1948547"/>
+              <a:gd name="connsiteY9" fmla="*/ 901453 h 1675596"/>
+              <a:gd name="connsiteX10" fmla="*/ 1948547 w 1948547"/>
+              <a:gd name="connsiteY10" fmla="*/ 987174 h 1675596"/>
+              <a:gd name="connsiteX11" fmla="*/ 1768523 w 1948547"/>
+              <a:gd name="connsiteY11" fmla="*/ 1081473 h 1675596"/>
+              <a:gd name="connsiteX12" fmla="*/ 927238 w 1948547"/>
+              <a:gd name="connsiteY12" fmla="*/ 1079571 h 1675596"/>
+              <a:gd name="connsiteX13" fmla="*/ 756411 w 1948547"/>
+              <a:gd name="connsiteY13" fmla="*/ 1675596 h 1675596"/>
+              <a:gd name="connsiteX14" fmla="*/ 643086 w 1948547"/>
+              <a:gd name="connsiteY14" fmla="*/ 1081476 h 1675596"/>
+              <a:gd name="connsiteX15" fmla="*/ 110733 w 1948547"/>
+              <a:gd name="connsiteY15" fmla="*/ 1079568 h 1675596"/>
+              <a:gd name="connsiteX16" fmla="*/ 4331 w 1948547"/>
+              <a:gd name="connsiteY16" fmla="*/ 901449 h 1675596"/>
+              <a:gd name="connsiteX17" fmla="*/ 4330 w 1948547"/>
+              <a:gd name="connsiteY17" fmla="*/ 880504 h 1675596"/>
+              <a:gd name="connsiteX18" fmla="*/ 4331 w 1948547"/>
+              <a:gd name="connsiteY18" fmla="*/ 631423 h 1675596"/>
+              <a:gd name="connsiteX19" fmla="*/ 4331 w 1948547"/>
+              <a:gd name="connsiteY19" fmla="*/ 631423 h 1675596"/>
+              <a:gd name="connsiteX20" fmla="*/ 0 w 1948547"/>
+              <a:gd name="connsiteY20" fmla="*/ 84222 h 1675596"/>
+              <a:gd name="connsiteX0" fmla="*/ 0 w 1948547"/>
+              <a:gd name="connsiteY0" fmla="*/ 84222 h 1675596"/>
+              <a:gd name="connsiteX1" fmla="*/ 184355 w 1948547"/>
+              <a:gd name="connsiteY1" fmla="*/ 1353 h 1675596"/>
+              <a:gd name="connsiteX2" fmla="*/ 328367 w 1948547"/>
+              <a:gd name="connsiteY2" fmla="*/ 1353 h 1675596"/>
+              <a:gd name="connsiteX3" fmla="*/ 328367 w 1948547"/>
+              <a:gd name="connsiteY3" fmla="*/ 1353 h 1675596"/>
+              <a:gd name="connsiteX4" fmla="*/ 814421 w 1948547"/>
+              <a:gd name="connsiteY4" fmla="*/ 1353 h 1675596"/>
+              <a:gd name="connsiteX5" fmla="*/ 1768523 w 1948547"/>
+              <a:gd name="connsiteY5" fmla="*/ 1353 h 1675596"/>
+              <a:gd name="connsiteX6" fmla="*/ 1948546 w 1948547"/>
+              <a:gd name="connsiteY6" fmla="*/ 82320 h 1675596"/>
+              <a:gd name="connsiteX7" fmla="*/ 1948547 w 1948547"/>
+              <a:gd name="connsiteY7" fmla="*/ 631423 h 1675596"/>
+              <a:gd name="connsiteX8" fmla="*/ 1948547 w 1948547"/>
+              <a:gd name="connsiteY8" fmla="*/ 631423 h 1675596"/>
+              <a:gd name="connsiteX9" fmla="*/ 1948547 w 1948547"/>
+              <a:gd name="connsiteY9" fmla="*/ 901453 h 1675596"/>
+              <a:gd name="connsiteX10" fmla="*/ 1948547 w 1948547"/>
+              <a:gd name="connsiteY10" fmla="*/ 987174 h 1675596"/>
+              <a:gd name="connsiteX11" fmla="*/ 1768523 w 1948547"/>
+              <a:gd name="connsiteY11" fmla="*/ 1081473 h 1675596"/>
+              <a:gd name="connsiteX12" fmla="*/ 927238 w 1948547"/>
+              <a:gd name="connsiteY12" fmla="*/ 1079571 h 1675596"/>
+              <a:gd name="connsiteX13" fmla="*/ 756411 w 1948547"/>
+              <a:gd name="connsiteY13" fmla="*/ 1675596 h 1675596"/>
+              <a:gd name="connsiteX14" fmla="*/ 643086 w 1948547"/>
+              <a:gd name="connsiteY14" fmla="*/ 1081476 h 1675596"/>
+              <a:gd name="connsiteX15" fmla="*/ 110733 w 1948547"/>
+              <a:gd name="connsiteY15" fmla="*/ 1079568 h 1675596"/>
+              <a:gd name="connsiteX16" fmla="*/ 4330 w 1948547"/>
+              <a:gd name="connsiteY16" fmla="*/ 983367 h 1675596"/>
+              <a:gd name="connsiteX17" fmla="*/ 4330 w 1948547"/>
+              <a:gd name="connsiteY17" fmla="*/ 880504 h 1675596"/>
+              <a:gd name="connsiteX18" fmla="*/ 4331 w 1948547"/>
+              <a:gd name="connsiteY18" fmla="*/ 631423 h 1675596"/>
+              <a:gd name="connsiteX19" fmla="*/ 4331 w 1948547"/>
+              <a:gd name="connsiteY19" fmla="*/ 631423 h 1675596"/>
+              <a:gd name="connsiteX20" fmla="*/ 0 w 1948547"/>
+              <a:gd name="connsiteY20" fmla="*/ 84222 h 1675596"/>
+              <a:gd name="connsiteX0" fmla="*/ 0 w 1948547"/>
+              <a:gd name="connsiteY0" fmla="*/ 84222 h 1675596"/>
+              <a:gd name="connsiteX1" fmla="*/ 184355 w 1948547"/>
+              <a:gd name="connsiteY1" fmla="*/ 1353 h 1675596"/>
+              <a:gd name="connsiteX2" fmla="*/ 328367 w 1948547"/>
+              <a:gd name="connsiteY2" fmla="*/ 1353 h 1675596"/>
+              <a:gd name="connsiteX3" fmla="*/ 328367 w 1948547"/>
+              <a:gd name="connsiteY3" fmla="*/ 1353 h 1675596"/>
+              <a:gd name="connsiteX4" fmla="*/ 814421 w 1948547"/>
+              <a:gd name="connsiteY4" fmla="*/ 1353 h 1675596"/>
+              <a:gd name="connsiteX5" fmla="*/ 1768523 w 1948547"/>
+              <a:gd name="connsiteY5" fmla="*/ 1353 h 1675596"/>
+              <a:gd name="connsiteX6" fmla="*/ 1948546 w 1948547"/>
+              <a:gd name="connsiteY6" fmla="*/ 82320 h 1675596"/>
+              <a:gd name="connsiteX7" fmla="*/ 1948547 w 1948547"/>
+              <a:gd name="connsiteY7" fmla="*/ 631423 h 1675596"/>
+              <a:gd name="connsiteX8" fmla="*/ 1948547 w 1948547"/>
+              <a:gd name="connsiteY8" fmla="*/ 631423 h 1675596"/>
+              <a:gd name="connsiteX9" fmla="*/ 1948547 w 1948547"/>
+              <a:gd name="connsiteY9" fmla="*/ 901453 h 1675596"/>
+              <a:gd name="connsiteX10" fmla="*/ 1948547 w 1948547"/>
+              <a:gd name="connsiteY10" fmla="*/ 987174 h 1675596"/>
+              <a:gd name="connsiteX11" fmla="*/ 1768523 w 1948547"/>
+              <a:gd name="connsiteY11" fmla="*/ 1081473 h 1675596"/>
+              <a:gd name="connsiteX12" fmla="*/ 927238 w 1948547"/>
+              <a:gd name="connsiteY12" fmla="*/ 1079571 h 1675596"/>
+              <a:gd name="connsiteX13" fmla="*/ 756411 w 1948547"/>
+              <a:gd name="connsiteY13" fmla="*/ 1675596 h 1675596"/>
+              <a:gd name="connsiteX14" fmla="*/ 643086 w 1948547"/>
+              <a:gd name="connsiteY14" fmla="*/ 1081476 h 1675596"/>
+              <a:gd name="connsiteX15" fmla="*/ 110733 w 1948547"/>
+              <a:gd name="connsiteY15" fmla="*/ 1079568 h 1675596"/>
+              <a:gd name="connsiteX16" fmla="*/ 4330 w 1948547"/>
+              <a:gd name="connsiteY16" fmla="*/ 956700 h 1675596"/>
+              <a:gd name="connsiteX17" fmla="*/ 4330 w 1948547"/>
+              <a:gd name="connsiteY17" fmla="*/ 880504 h 1675596"/>
+              <a:gd name="connsiteX18" fmla="*/ 4331 w 1948547"/>
+              <a:gd name="connsiteY18" fmla="*/ 631423 h 1675596"/>
+              <a:gd name="connsiteX19" fmla="*/ 4331 w 1948547"/>
+              <a:gd name="connsiteY19" fmla="*/ 631423 h 1675596"/>
+              <a:gd name="connsiteX20" fmla="*/ 0 w 1948547"/>
+              <a:gd name="connsiteY20" fmla="*/ 84222 h 1675596"/>
+              <a:gd name="connsiteX0" fmla="*/ 0 w 1948547"/>
+              <a:gd name="connsiteY0" fmla="*/ 84222 h 1467954"/>
+              <a:gd name="connsiteX1" fmla="*/ 184355 w 1948547"/>
+              <a:gd name="connsiteY1" fmla="*/ 1353 h 1467954"/>
+              <a:gd name="connsiteX2" fmla="*/ 328367 w 1948547"/>
+              <a:gd name="connsiteY2" fmla="*/ 1353 h 1467954"/>
+              <a:gd name="connsiteX3" fmla="*/ 328367 w 1948547"/>
+              <a:gd name="connsiteY3" fmla="*/ 1353 h 1467954"/>
+              <a:gd name="connsiteX4" fmla="*/ 814421 w 1948547"/>
+              <a:gd name="connsiteY4" fmla="*/ 1353 h 1467954"/>
+              <a:gd name="connsiteX5" fmla="*/ 1768523 w 1948547"/>
+              <a:gd name="connsiteY5" fmla="*/ 1353 h 1467954"/>
+              <a:gd name="connsiteX6" fmla="*/ 1948546 w 1948547"/>
+              <a:gd name="connsiteY6" fmla="*/ 82320 h 1467954"/>
+              <a:gd name="connsiteX7" fmla="*/ 1948547 w 1948547"/>
+              <a:gd name="connsiteY7" fmla="*/ 631423 h 1467954"/>
+              <a:gd name="connsiteX8" fmla="*/ 1948547 w 1948547"/>
+              <a:gd name="connsiteY8" fmla="*/ 631423 h 1467954"/>
+              <a:gd name="connsiteX9" fmla="*/ 1948547 w 1948547"/>
+              <a:gd name="connsiteY9" fmla="*/ 901453 h 1467954"/>
+              <a:gd name="connsiteX10" fmla="*/ 1948547 w 1948547"/>
+              <a:gd name="connsiteY10" fmla="*/ 987174 h 1467954"/>
+              <a:gd name="connsiteX11" fmla="*/ 1768523 w 1948547"/>
+              <a:gd name="connsiteY11" fmla="*/ 1081473 h 1467954"/>
+              <a:gd name="connsiteX12" fmla="*/ 927238 w 1948547"/>
+              <a:gd name="connsiteY12" fmla="*/ 1079571 h 1467954"/>
+              <a:gd name="connsiteX13" fmla="*/ 782395 w 1948547"/>
+              <a:gd name="connsiteY13" fmla="*/ 1467954 h 1467954"/>
+              <a:gd name="connsiteX14" fmla="*/ 643086 w 1948547"/>
+              <a:gd name="connsiteY14" fmla="*/ 1081476 h 1467954"/>
+              <a:gd name="connsiteX15" fmla="*/ 110733 w 1948547"/>
+              <a:gd name="connsiteY15" fmla="*/ 1079568 h 1467954"/>
+              <a:gd name="connsiteX16" fmla="*/ 4330 w 1948547"/>
+              <a:gd name="connsiteY16" fmla="*/ 956700 h 1467954"/>
+              <a:gd name="connsiteX17" fmla="*/ 4330 w 1948547"/>
+              <a:gd name="connsiteY17" fmla="*/ 880504 h 1467954"/>
+              <a:gd name="connsiteX18" fmla="*/ 4331 w 1948547"/>
+              <a:gd name="connsiteY18" fmla="*/ 631423 h 1467954"/>
+              <a:gd name="connsiteX19" fmla="*/ 4331 w 1948547"/>
+              <a:gd name="connsiteY19" fmla="*/ 631423 h 1467954"/>
+              <a:gd name="connsiteX20" fmla="*/ 0 w 1948547"/>
+              <a:gd name="connsiteY20" fmla="*/ 84222 h 1467954"/>
+            </a:gdLst>
+            <a:ahLst/>
+            <a:cxnLst>
+              <a:cxn ang="0">
+                <a:pos x="connsiteX0" y="connsiteY0"/>
+              </a:cxn>
+              <a:cxn ang="0">
+                <a:pos x="connsiteX1" y="connsiteY1"/>
+              </a:cxn>
+              <a:cxn ang="0">
+                <a:pos x="connsiteX2" y="connsiteY2"/>
+              </a:cxn>
+              <a:cxn ang="0">
+                <a:pos x="connsiteX3" y="connsiteY3"/>
+              </a:cxn>
+              <a:cxn ang="0">
+                <a:pos x="connsiteX4" y="connsiteY4"/>
+              </a:cxn>
+              <a:cxn ang="0">
+                <a:pos x="connsiteX5" y="connsiteY5"/>
+              </a:cxn>
+              <a:cxn ang="0">
+                <a:pos x="connsiteX6" y="connsiteY6"/>
+              </a:cxn>
+              <a:cxn ang="0">
+                <a:pos x="connsiteX7" y="connsiteY7"/>
+              </a:cxn>
+              <a:cxn ang="0">
+                <a:pos x="connsiteX8" y="connsiteY8"/>
+              </a:cxn>
+              <a:cxn ang="0">
+                <a:pos x="connsiteX9" y="connsiteY9"/>
+              </a:cxn>
+              <a:cxn ang="0">
+                <a:pos x="connsiteX10" y="connsiteY10"/>
+              </a:cxn>
+              <a:cxn ang="0">
+                <a:pos x="connsiteX11" y="connsiteY11"/>
+              </a:cxn>
+              <a:cxn ang="0">
+                <a:pos x="connsiteX12" y="connsiteY12"/>
+              </a:cxn>
+              <a:cxn ang="0">
+                <a:pos x="connsiteX13" y="connsiteY13"/>
+              </a:cxn>
+              <a:cxn ang="0">
+                <a:pos x="connsiteX14" y="connsiteY14"/>
+              </a:cxn>
+              <a:cxn ang="0">
+                <a:pos x="connsiteX15" y="connsiteY15"/>
+              </a:cxn>
+              <a:cxn ang="0">
+                <a:pos x="connsiteX16" y="connsiteY16"/>
+              </a:cxn>
+              <a:cxn ang="0">
+                <a:pos x="connsiteX17" y="connsiteY17"/>
+              </a:cxn>
+              <a:cxn ang="0">
+                <a:pos x="connsiteX18" y="connsiteY18"/>
+              </a:cxn>
+              <a:cxn ang="0">
+                <a:pos x="connsiteX19" y="connsiteY19"/>
+              </a:cxn>
+              <a:cxn ang="0">
+                <a:pos x="connsiteX20" y="connsiteY20"/>
+              </a:cxn>
+            </a:cxnLst>
+            <a:rect l="l" t="t" r="r" b="b"/>
+            <a:pathLst>
+              <a:path w="1948547" h="1467954">
+                <a:moveTo>
+                  <a:pt x="0" y="84222"/>
+                </a:moveTo>
+                <a:cubicBezTo>
+                  <a:pt x="0" y="-15203"/>
+                  <a:pt x="84930" y="1353"/>
+                  <a:pt x="184355" y="1353"/>
+                </a:cubicBezTo>
+                <a:lnTo>
+                  <a:pt x="328367" y="1353"/>
+                </a:lnTo>
+                <a:lnTo>
+                  <a:pt x="328367" y="1353"/>
+                </a:lnTo>
+                <a:lnTo>
+                  <a:pt x="814421" y="1353"/>
+                </a:lnTo>
+                <a:lnTo>
+                  <a:pt x="1768523" y="1353"/>
+                </a:lnTo>
+                <a:cubicBezTo>
+                  <a:pt x="1867948" y="1353"/>
+                  <a:pt x="1948546" y="-17105"/>
+                  <a:pt x="1948546" y="82320"/>
+                </a:cubicBezTo>
+                <a:cubicBezTo>
+                  <a:pt x="1948546" y="265354"/>
+                  <a:pt x="1948547" y="448389"/>
+                  <a:pt x="1948547" y="631423"/>
+                </a:cubicBezTo>
+                <a:lnTo>
+                  <a:pt x="1948547" y="631423"/>
+                </a:lnTo>
+                <a:lnTo>
+                  <a:pt x="1948547" y="901453"/>
+                </a:lnTo>
+                <a:lnTo>
+                  <a:pt x="1948547" y="987174"/>
+                </a:lnTo>
+                <a:cubicBezTo>
+                  <a:pt x="1948547" y="1086599"/>
+                  <a:pt x="1867948" y="1081473"/>
+                  <a:pt x="1768523" y="1081473"/>
+                </a:cubicBezTo>
+                <a:lnTo>
+                  <a:pt x="927238" y="1079571"/>
+                </a:lnTo>
+                <a:lnTo>
+                  <a:pt x="782395" y="1467954"/>
+                </a:lnTo>
+                <a:lnTo>
+                  <a:pt x="643086" y="1081476"/>
+                </a:lnTo>
+                <a:lnTo>
+                  <a:pt x="110733" y="1079568"/>
+                </a:lnTo>
+                <a:cubicBezTo>
+                  <a:pt x="11308" y="1079568"/>
+                  <a:pt x="4330" y="1056125"/>
+                  <a:pt x="4330" y="956700"/>
+                </a:cubicBezTo>
+                <a:lnTo>
+                  <a:pt x="4330" y="880504"/>
+                </a:lnTo>
+                <a:cubicBezTo>
+                  <a:pt x="4330" y="750488"/>
+                  <a:pt x="4331" y="761439"/>
+                  <a:pt x="4331" y="631423"/>
+                </a:cubicBezTo>
+                <a:lnTo>
+                  <a:pt x="4331" y="631423"/>
+                </a:lnTo>
+                <a:cubicBezTo>
+                  <a:pt x="2887" y="449023"/>
+                  <a:pt x="1444" y="266622"/>
+                  <a:pt x="0" y="84222"/>
+                </a:cubicBezTo>
+                <a:close/>
+              </a:path>
+            </a:pathLst>
+          </a:custGeom>
+          <a:solidFill>
+            <a:schemeClr val="bg1"/>
+          </a:solidFill>
+          <a:ln w="6350">
+            <a:solidFill>
+              <a:schemeClr val="bg1">
+                <a:lumMod val="65000"/>
+              </a:schemeClr>
+            </a:solidFill>
+          </a:ln>
+        </p:spPr>
+        <p:style>
+          <a:lnRef idx="2">
+            <a:schemeClr val="accent1">
+              <a:shade val="50000"/>
+            </a:schemeClr>
+          </a:lnRef>
+          <a:fillRef idx="1">
+            <a:schemeClr val="accent1"/>
+          </a:fillRef>
+          <a:effectRef idx="0">
+            <a:schemeClr val="accent1"/>
+          </a:effectRef>
+          <a:fontRef idx="minor">
+            <a:schemeClr val="lt1"/>
+          </a:fontRef>
+        </p:style>
+        <p:txBody>
+          <a:bodyPr rtlCol="0" anchor="ctr"/>
+          <a:lstStyle/>
+          <a:p>
+            <a:pPr algn="ctr"/>
+            <a:endParaRPr lang="nl-NL"/>
+          </a:p>
+        </p:txBody>
+      </p:sp>
+      <p:sp>
+        <p:nvSpPr>
+          <p:cNvPr id="10" name="Rounded Rectangle 9"/>
+          <p:cNvSpPr/>
+          <p:nvPr/>
+        </p:nvSpPr>
+        <p:spPr>
+          <a:xfrm>
+            <a:off x="3131840" y="1340768"/>
+            <a:ext cx="360040" cy="360040"/>
+          </a:xfrm>
+          <a:prstGeom prst="roundRect">
+            <a:avLst>
+              <a:gd name="adj" fmla="val 4630"/>
+            </a:avLst>
+          </a:prstGeom>
+          <a:solidFill>
+            <a:schemeClr val="bg1"/>
+          </a:solidFill>
+          <a:ln w="57150">
+            <a:solidFill>
+              <a:schemeClr val="bg1">
+                <a:lumMod val="65000"/>
+              </a:schemeClr>
+            </a:solidFill>
+          </a:ln>
+        </p:spPr>
+        <p:style>
+          <a:lnRef idx="2">
+            <a:schemeClr val="accent1">
+              <a:shade val="50000"/>
+            </a:schemeClr>
+          </a:lnRef>
+          <a:fillRef idx="1">
+            <a:schemeClr val="accent1"/>
+          </a:fillRef>
+          <a:effectRef idx="0">
+            <a:schemeClr val="accent1"/>
+          </a:effectRef>
+          <a:fontRef idx="minor">
+            <a:schemeClr val="lt1"/>
+          </a:fontRef>
+        </p:style>
+        <p:txBody>
+          <a:bodyPr rtlCol="0" anchor="ctr"/>
+          <a:lstStyle/>
+          <a:p>
+            <a:pPr algn="ctr"/>
+            <a:endParaRPr lang="nl-NL"/>
+          </a:p>
+        </p:txBody>
+      </p:sp>
+      <p:grpSp>
+        <p:nvGrpSpPr>
+          <p:cNvPr id="25" name="Group 24"/>
+          <p:cNvGrpSpPr/>
+          <p:nvPr/>
+        </p:nvGrpSpPr>
+        <p:grpSpPr>
+          <a:xfrm>
+            <a:off x="3644280" y="1340768"/>
+            <a:ext cx="371857" cy="360040"/>
+            <a:chOff x="3644280" y="1340768"/>
+            <a:chExt cx="371857" cy="360040"/>
+          </a:xfrm>
+        </p:grpSpPr>
+        <p:sp>
+          <p:nvSpPr>
+            <p:cNvPr id="11" name="Rounded Rectangle 10"/>
+            <p:cNvSpPr/>
+            <p:nvPr/>
+          </p:nvSpPr>
+          <p:spPr>
+            <a:xfrm>
+              <a:off x="3644280" y="1340768"/>
+              <a:ext cx="360040" cy="360040"/>
+            </a:xfrm>
+            <a:prstGeom prst="roundRect">
+              <a:avLst>
+                <a:gd name="adj" fmla="val 4630"/>
+              </a:avLst>
+            </a:prstGeom>
+            <a:solidFill>
+              <a:schemeClr val="bg1"/>
+            </a:solidFill>
+            <a:ln w="57150">
+              <a:solidFill>
+                <a:schemeClr val="bg1">
+                  <a:lumMod val="65000"/>
+                </a:schemeClr>
+              </a:solidFill>
+            </a:ln>
+          </p:spPr>
+          <p:style>
+            <a:lnRef idx="2">
+              <a:schemeClr val="accent1">
+                <a:shade val="50000"/>
+              </a:schemeClr>
+            </a:lnRef>
+            <a:fillRef idx="1">
+              <a:schemeClr val="accent1"/>
+            </a:fillRef>
+            <a:effectRef idx="0">
+              <a:schemeClr val="accent1"/>
+            </a:effectRef>
+            <a:fontRef idx="minor">
+              <a:schemeClr val="lt1"/>
+            </a:fontRef>
+          </p:style>
+          <p:txBody>
+            <a:bodyPr rtlCol="0" anchor="ctr"/>
+            <a:lstStyle/>
+            <a:p>
+              <a:pPr algn="ctr"/>
+              <a:endParaRPr lang="nl-NL" dirty="0"/>
+            </a:p>
+          </p:txBody>
+        </p:sp>
+        <p:sp>
+          <p:nvSpPr>
+            <p:cNvPr id="23" name="Freeform 22"/>
+            <p:cNvSpPr/>
+            <p:nvPr/>
+          </p:nvSpPr>
+          <p:spPr>
+            <a:xfrm>
+              <a:off x="3672096" y="1365370"/>
+              <a:ext cx="344041" cy="299403"/>
+            </a:xfrm>
+            <a:custGeom>
+              <a:avLst/>
+              <a:gdLst>
+                <a:gd name="connsiteX0" fmla="*/ 0 w 445770"/>
+                <a:gd name="connsiteY0" fmla="*/ 300990 h 625623"/>
+                <a:gd name="connsiteX1" fmla="*/ 129540 w 445770"/>
+                <a:gd name="connsiteY1" fmla="*/ 617220 h 625623"/>
+                <a:gd name="connsiteX2" fmla="*/ 445770 w 445770"/>
+                <a:gd name="connsiteY2" fmla="*/ 0 h 625623"/>
+                <a:gd name="connsiteX0" fmla="*/ 0 w 483870"/>
+                <a:gd name="connsiteY0" fmla="*/ 289560 h 613686"/>
+                <a:gd name="connsiteX1" fmla="*/ 129540 w 483870"/>
+                <a:gd name="connsiteY1" fmla="*/ 605790 h 613686"/>
+                <a:gd name="connsiteX2" fmla="*/ 483870 w 483870"/>
+                <a:gd name="connsiteY2" fmla="*/ 0 h 613686"/>
+                <a:gd name="connsiteX0" fmla="*/ 0 w 483870"/>
+                <a:gd name="connsiteY0" fmla="*/ 289560 h 613686"/>
+                <a:gd name="connsiteX1" fmla="*/ 129540 w 483870"/>
+                <a:gd name="connsiteY1" fmla="*/ 605790 h 613686"/>
+                <a:gd name="connsiteX2" fmla="*/ 483870 w 483870"/>
+                <a:gd name="connsiteY2" fmla="*/ 0 h 613686"/>
+                <a:gd name="connsiteX0" fmla="*/ 0 w 483870"/>
+                <a:gd name="connsiteY0" fmla="*/ 289560 h 629047"/>
+                <a:gd name="connsiteX1" fmla="*/ 129540 w 483870"/>
+                <a:gd name="connsiteY1" fmla="*/ 605790 h 629047"/>
+                <a:gd name="connsiteX2" fmla="*/ 483870 w 483870"/>
+                <a:gd name="connsiteY2" fmla="*/ 0 h 629047"/>
+                <a:gd name="connsiteX0" fmla="*/ 0 w 483870"/>
+                <a:gd name="connsiteY0" fmla="*/ 289560 h 609700"/>
+                <a:gd name="connsiteX1" fmla="*/ 135255 w 483870"/>
+                <a:gd name="connsiteY1" fmla="*/ 584835 h 609700"/>
+                <a:gd name="connsiteX2" fmla="*/ 483870 w 483870"/>
+                <a:gd name="connsiteY2" fmla="*/ 0 h 609700"/>
+                <a:gd name="connsiteX0" fmla="*/ 0 w 508635"/>
+                <a:gd name="connsiteY0" fmla="*/ 272415 h 575578"/>
+                <a:gd name="connsiteX1" fmla="*/ 135255 w 508635"/>
+                <a:gd name="connsiteY1" fmla="*/ 567690 h 575578"/>
+                <a:gd name="connsiteX2" fmla="*/ 508635 w 508635"/>
+                <a:gd name="connsiteY2" fmla="*/ 0 h 575578"/>
+                <a:gd name="connsiteX0" fmla="*/ 0 w 508635"/>
+                <a:gd name="connsiteY0" fmla="*/ 272415 h 599489"/>
+                <a:gd name="connsiteX1" fmla="*/ 102870 w 508635"/>
+                <a:gd name="connsiteY1" fmla="*/ 592455 h 599489"/>
+                <a:gd name="connsiteX2" fmla="*/ 508635 w 508635"/>
+                <a:gd name="connsiteY2" fmla="*/ 0 h 599489"/>
+                <a:gd name="connsiteX0" fmla="*/ 0 w 508635"/>
+                <a:gd name="connsiteY0" fmla="*/ 272415 h 613186"/>
+                <a:gd name="connsiteX1" fmla="*/ 102870 w 508635"/>
+                <a:gd name="connsiteY1" fmla="*/ 592455 h 613186"/>
+                <a:gd name="connsiteX2" fmla="*/ 508635 w 508635"/>
+                <a:gd name="connsiteY2" fmla="*/ 0 h 613186"/>
+                <a:gd name="connsiteX0" fmla="*/ 0 w 508635"/>
+                <a:gd name="connsiteY0" fmla="*/ 272415 h 597235"/>
+                <a:gd name="connsiteX1" fmla="*/ 99060 w 508635"/>
+                <a:gd name="connsiteY1" fmla="*/ 575310 h 597235"/>
+                <a:gd name="connsiteX2" fmla="*/ 508635 w 508635"/>
+                <a:gd name="connsiteY2" fmla="*/ 0 h 597235"/>
+                <a:gd name="connsiteX0" fmla="*/ 0 w 529590"/>
+                <a:gd name="connsiteY0" fmla="*/ 321945 h 587918"/>
+                <a:gd name="connsiteX1" fmla="*/ 120015 w 529590"/>
+                <a:gd name="connsiteY1" fmla="*/ 575310 h 587918"/>
+                <a:gd name="connsiteX2" fmla="*/ 529590 w 529590"/>
+                <a:gd name="connsiteY2" fmla="*/ 0 h 587918"/>
+                <a:gd name="connsiteX0" fmla="*/ 0 w 529590"/>
+                <a:gd name="connsiteY0" fmla="*/ 321945 h 596822"/>
+                <a:gd name="connsiteX1" fmla="*/ 110490 w 529590"/>
+                <a:gd name="connsiteY1" fmla="*/ 584835 h 596822"/>
+                <a:gd name="connsiteX2" fmla="*/ 529590 w 529590"/>
+                <a:gd name="connsiteY2" fmla="*/ 0 h 596822"/>
+                <a:gd name="connsiteX0" fmla="*/ 0 w 529590"/>
+                <a:gd name="connsiteY0" fmla="*/ 321945 h 644552"/>
+                <a:gd name="connsiteX1" fmla="*/ 110490 w 529590"/>
+                <a:gd name="connsiteY1" fmla="*/ 584835 h 644552"/>
+                <a:gd name="connsiteX2" fmla="*/ 529590 w 529590"/>
+                <a:gd name="connsiteY2" fmla="*/ 0 h 644552"/>
+                <a:gd name="connsiteX0" fmla="*/ 0 w 529590"/>
+                <a:gd name="connsiteY0" fmla="*/ 321945 h 607612"/>
+                <a:gd name="connsiteX1" fmla="*/ 120015 w 529590"/>
+                <a:gd name="connsiteY1" fmla="*/ 541020 h 607612"/>
+                <a:gd name="connsiteX2" fmla="*/ 529590 w 529590"/>
+                <a:gd name="connsiteY2" fmla="*/ 0 h 607612"/>
+                <a:gd name="connsiteX0" fmla="*/ 0 w 529590"/>
+                <a:gd name="connsiteY0" fmla="*/ 321945 h 601336"/>
+                <a:gd name="connsiteX1" fmla="*/ 116205 w 529590"/>
+                <a:gd name="connsiteY1" fmla="*/ 533400 h 601336"/>
+                <a:gd name="connsiteX2" fmla="*/ 529590 w 529590"/>
+                <a:gd name="connsiteY2" fmla="*/ 0 h 601336"/>
+                <a:gd name="connsiteX0" fmla="*/ 0 w 529590"/>
+                <a:gd name="connsiteY0" fmla="*/ 321945 h 599255"/>
+                <a:gd name="connsiteX1" fmla="*/ 167005 w 529590"/>
+                <a:gd name="connsiteY1" fmla="*/ 530860 h 599255"/>
+                <a:gd name="connsiteX2" fmla="*/ 529590 w 529590"/>
+                <a:gd name="connsiteY2" fmla="*/ 0 h 599255"/>
+                <a:gd name="connsiteX0" fmla="*/ 0 w 529590"/>
+                <a:gd name="connsiteY0" fmla="*/ 321945 h 575290"/>
+                <a:gd name="connsiteX1" fmla="*/ 167005 w 529590"/>
+                <a:gd name="connsiteY1" fmla="*/ 530860 h 575290"/>
+                <a:gd name="connsiteX2" fmla="*/ 529590 w 529590"/>
+                <a:gd name="connsiteY2" fmla="*/ 0 h 575290"/>
+                <a:gd name="connsiteX0" fmla="*/ 0 w 527050"/>
+                <a:gd name="connsiteY0" fmla="*/ 400685 h 567571"/>
+                <a:gd name="connsiteX1" fmla="*/ 164465 w 527050"/>
+                <a:gd name="connsiteY1" fmla="*/ 530860 h 567571"/>
+                <a:gd name="connsiteX2" fmla="*/ 527050 w 527050"/>
+                <a:gd name="connsiteY2" fmla="*/ 0 h 567571"/>
+                <a:gd name="connsiteX0" fmla="*/ 0 w 527050"/>
+                <a:gd name="connsiteY0" fmla="*/ 400685 h 557895"/>
+                <a:gd name="connsiteX1" fmla="*/ 164465 w 527050"/>
+                <a:gd name="connsiteY1" fmla="*/ 530860 h 557895"/>
+                <a:gd name="connsiteX2" fmla="*/ 527050 w 527050"/>
+                <a:gd name="connsiteY2" fmla="*/ 0 h 557895"/>
+                <a:gd name="connsiteX0" fmla="*/ 0 w 527050"/>
+                <a:gd name="connsiteY0" fmla="*/ 400685 h 580114"/>
+                <a:gd name="connsiteX1" fmla="*/ 164465 w 527050"/>
+                <a:gd name="connsiteY1" fmla="*/ 530860 h 580114"/>
+                <a:gd name="connsiteX2" fmla="*/ 527050 w 527050"/>
+                <a:gd name="connsiteY2" fmla="*/ 0 h 580114"/>
+                <a:gd name="connsiteX0" fmla="*/ 0 w 527050"/>
+                <a:gd name="connsiteY0" fmla="*/ 400685 h 574173"/>
+                <a:gd name="connsiteX1" fmla="*/ 164465 w 527050"/>
+                <a:gd name="connsiteY1" fmla="*/ 530860 h 574173"/>
+                <a:gd name="connsiteX2" fmla="*/ 527050 w 527050"/>
+                <a:gd name="connsiteY2" fmla="*/ 0 h 574173"/>
+                <a:gd name="connsiteX0" fmla="*/ 0 w 527050"/>
+                <a:gd name="connsiteY0" fmla="*/ 400685 h 576349"/>
+                <a:gd name="connsiteX1" fmla="*/ 164465 w 527050"/>
+                <a:gd name="connsiteY1" fmla="*/ 530860 h 576349"/>
+                <a:gd name="connsiteX2" fmla="*/ 527050 w 527050"/>
+                <a:gd name="connsiteY2" fmla="*/ 0 h 576349"/>
+                <a:gd name="connsiteX0" fmla="*/ 0 w 527050"/>
+                <a:gd name="connsiteY0" fmla="*/ 400685 h 588395"/>
+                <a:gd name="connsiteX1" fmla="*/ 164465 w 527050"/>
+                <a:gd name="connsiteY1" fmla="*/ 530860 h 588395"/>
+                <a:gd name="connsiteX2" fmla="*/ 527050 w 527050"/>
+                <a:gd name="connsiteY2" fmla="*/ 0 h 588395"/>
+                <a:gd name="connsiteX0" fmla="*/ 0 w 415290"/>
+                <a:gd name="connsiteY0" fmla="*/ 227965 h 368754"/>
+                <a:gd name="connsiteX1" fmla="*/ 164465 w 415290"/>
+                <a:gd name="connsiteY1" fmla="*/ 358140 h 368754"/>
+                <a:gd name="connsiteX2" fmla="*/ 415290 w 415290"/>
+                <a:gd name="connsiteY2" fmla="*/ 0 h 368754"/>
+                <a:gd name="connsiteX0" fmla="*/ 0 w 415290"/>
+                <a:gd name="connsiteY0" fmla="*/ 227965 h 368754"/>
+                <a:gd name="connsiteX1" fmla="*/ 164465 w 415290"/>
+                <a:gd name="connsiteY1" fmla="*/ 358140 h 368754"/>
+                <a:gd name="connsiteX2" fmla="*/ 415290 w 415290"/>
+                <a:gd name="connsiteY2" fmla="*/ 0 h 368754"/>
+                <a:gd name="connsiteX0" fmla="*/ 0 w 369570"/>
+                <a:gd name="connsiteY0" fmla="*/ 253365 h 395757"/>
+                <a:gd name="connsiteX1" fmla="*/ 164465 w 369570"/>
+                <a:gd name="connsiteY1" fmla="*/ 383540 h 395757"/>
+                <a:gd name="connsiteX2" fmla="*/ 369570 w 369570"/>
+                <a:gd name="connsiteY2" fmla="*/ 0 h 395757"/>
+                <a:gd name="connsiteX0" fmla="*/ 0 w 369570"/>
+                <a:gd name="connsiteY0" fmla="*/ 253365 h 455797"/>
+                <a:gd name="connsiteX1" fmla="*/ 164465 w 369570"/>
+                <a:gd name="connsiteY1" fmla="*/ 383540 h 455797"/>
+                <a:gd name="connsiteX2" fmla="*/ 369570 w 369570"/>
+                <a:gd name="connsiteY2" fmla="*/ 0 h 455797"/>
+                <a:gd name="connsiteX0" fmla="*/ 0 w 337185"/>
+                <a:gd name="connsiteY0" fmla="*/ 251460 h 393731"/>
+                <a:gd name="connsiteX1" fmla="*/ 164465 w 337185"/>
+                <a:gd name="connsiteY1" fmla="*/ 381635 h 393731"/>
+                <a:gd name="connsiteX2" fmla="*/ 337185 w 337185"/>
+                <a:gd name="connsiteY2" fmla="*/ 0 h 393731"/>
+                <a:gd name="connsiteX0" fmla="*/ 0 w 337185"/>
+                <a:gd name="connsiteY0" fmla="*/ 251460 h 393731"/>
+                <a:gd name="connsiteX1" fmla="*/ 164465 w 337185"/>
+                <a:gd name="connsiteY1" fmla="*/ 381635 h 393731"/>
+                <a:gd name="connsiteX2" fmla="*/ 337185 w 337185"/>
+                <a:gd name="connsiteY2" fmla="*/ 0 h 393731"/>
+                <a:gd name="connsiteX0" fmla="*/ 0 w 337185"/>
+                <a:gd name="connsiteY0" fmla="*/ 251460 h 418150"/>
+                <a:gd name="connsiteX1" fmla="*/ 137795 w 337185"/>
+                <a:gd name="connsiteY1" fmla="*/ 408305 h 418150"/>
+                <a:gd name="connsiteX2" fmla="*/ 337185 w 337185"/>
+                <a:gd name="connsiteY2" fmla="*/ 0 h 418150"/>
+                <a:gd name="connsiteX0" fmla="*/ 0 w 337185"/>
+                <a:gd name="connsiteY0" fmla="*/ 251460 h 454852"/>
+                <a:gd name="connsiteX1" fmla="*/ 137795 w 337185"/>
+                <a:gd name="connsiteY1" fmla="*/ 408305 h 454852"/>
+                <a:gd name="connsiteX2" fmla="*/ 337185 w 337185"/>
+                <a:gd name="connsiteY2" fmla="*/ 0 h 454852"/>
+                <a:gd name="connsiteX0" fmla="*/ 0 w 373380"/>
+                <a:gd name="connsiteY0" fmla="*/ 121920 h 282012"/>
+                <a:gd name="connsiteX1" fmla="*/ 137795 w 373380"/>
+                <a:gd name="connsiteY1" fmla="*/ 278765 h 282012"/>
+                <a:gd name="connsiteX2" fmla="*/ 373380 w 373380"/>
+                <a:gd name="connsiteY2" fmla="*/ 0 h 282012"/>
+                <a:gd name="connsiteX0" fmla="*/ 0 w 373380"/>
+                <a:gd name="connsiteY0" fmla="*/ 121920 h 282012"/>
+                <a:gd name="connsiteX1" fmla="*/ 137795 w 373380"/>
+                <a:gd name="connsiteY1" fmla="*/ 278765 h 282012"/>
+                <a:gd name="connsiteX2" fmla="*/ 373380 w 373380"/>
+                <a:gd name="connsiteY2" fmla="*/ 0 h 282012"/>
+                <a:gd name="connsiteX0" fmla="*/ 0 w 373380"/>
+                <a:gd name="connsiteY0" fmla="*/ 121920 h 317334"/>
+                <a:gd name="connsiteX1" fmla="*/ 107315 w 373380"/>
+                <a:gd name="connsiteY1" fmla="*/ 314960 h 317334"/>
+                <a:gd name="connsiteX2" fmla="*/ 373380 w 373380"/>
+                <a:gd name="connsiteY2" fmla="*/ 0 h 317334"/>
+                <a:gd name="connsiteX0" fmla="*/ 0 w 373380"/>
+                <a:gd name="connsiteY0" fmla="*/ 121920 h 363266"/>
+                <a:gd name="connsiteX1" fmla="*/ 107315 w 373380"/>
+                <a:gd name="connsiteY1" fmla="*/ 314960 h 363266"/>
+                <a:gd name="connsiteX2" fmla="*/ 373380 w 373380"/>
+                <a:gd name="connsiteY2" fmla="*/ 0 h 363266"/>
+                <a:gd name="connsiteX0" fmla="*/ 0 w 373380"/>
+                <a:gd name="connsiteY0" fmla="*/ 121920 h 361721"/>
+                <a:gd name="connsiteX1" fmla="*/ 107315 w 373380"/>
+                <a:gd name="connsiteY1" fmla="*/ 314960 h 361721"/>
+                <a:gd name="connsiteX2" fmla="*/ 373380 w 373380"/>
+                <a:gd name="connsiteY2" fmla="*/ 0 h 361721"/>
+                <a:gd name="connsiteX0" fmla="*/ 0 w 373380"/>
+                <a:gd name="connsiteY0" fmla="*/ 121920 h 357882"/>
+                <a:gd name="connsiteX1" fmla="*/ 107315 w 373380"/>
+                <a:gd name="connsiteY1" fmla="*/ 314960 h 357882"/>
+                <a:gd name="connsiteX2" fmla="*/ 373380 w 373380"/>
+                <a:gd name="connsiteY2" fmla="*/ 0 h 357882"/>
+                <a:gd name="connsiteX0" fmla="*/ 0 w 409575"/>
+                <a:gd name="connsiteY0" fmla="*/ 139065 h 318350"/>
+                <a:gd name="connsiteX1" fmla="*/ 143510 w 409575"/>
+                <a:gd name="connsiteY1" fmla="*/ 314960 h 318350"/>
+                <a:gd name="connsiteX2" fmla="*/ 409575 w 409575"/>
+                <a:gd name="connsiteY2" fmla="*/ 0 h 318350"/>
+                <a:gd name="connsiteX0" fmla="*/ 0 w 409575"/>
+                <a:gd name="connsiteY0" fmla="*/ 139065 h 351975"/>
+                <a:gd name="connsiteX1" fmla="*/ 143510 w 409575"/>
+                <a:gd name="connsiteY1" fmla="*/ 314960 h 351975"/>
+                <a:gd name="connsiteX2" fmla="*/ 409575 w 409575"/>
+                <a:gd name="connsiteY2" fmla="*/ 0 h 351975"/>
+                <a:gd name="connsiteX0" fmla="*/ 0 w 409575"/>
+                <a:gd name="connsiteY0" fmla="*/ 139065 h 351975"/>
+                <a:gd name="connsiteX1" fmla="*/ 143510 w 409575"/>
+                <a:gd name="connsiteY1" fmla="*/ 314960 h 351975"/>
+                <a:gd name="connsiteX2" fmla="*/ 409575 w 409575"/>
+                <a:gd name="connsiteY2" fmla="*/ 0 h 351975"/>
+                <a:gd name="connsiteX0" fmla="*/ 0 w 373380"/>
+                <a:gd name="connsiteY0" fmla="*/ 100965 h 278836"/>
+                <a:gd name="connsiteX1" fmla="*/ 143510 w 373380"/>
+                <a:gd name="connsiteY1" fmla="*/ 276860 h 278836"/>
+                <a:gd name="connsiteX2" fmla="*/ 373380 w 373380"/>
+                <a:gd name="connsiteY2" fmla="*/ 0 h 278836"/>
+                <a:gd name="connsiteX0" fmla="*/ 0 w 373380"/>
+                <a:gd name="connsiteY0" fmla="*/ 100965 h 317467"/>
+                <a:gd name="connsiteX1" fmla="*/ 143510 w 373380"/>
+                <a:gd name="connsiteY1" fmla="*/ 276860 h 317467"/>
+                <a:gd name="connsiteX2" fmla="*/ 373380 w 373380"/>
+                <a:gd name="connsiteY2" fmla="*/ 0 h 317467"/>
+                <a:gd name="connsiteX0" fmla="*/ 0 w 373380"/>
+                <a:gd name="connsiteY0" fmla="*/ 100965 h 318621"/>
+                <a:gd name="connsiteX1" fmla="*/ 143510 w 373380"/>
+                <a:gd name="connsiteY1" fmla="*/ 276860 h 318621"/>
+                <a:gd name="connsiteX2" fmla="*/ 373380 w 373380"/>
+                <a:gd name="connsiteY2" fmla="*/ 0 h 318621"/>
+                <a:gd name="connsiteX0" fmla="*/ 0 w 373380"/>
+                <a:gd name="connsiteY0" fmla="*/ 100965 h 318858"/>
+                <a:gd name="connsiteX1" fmla="*/ 143510 w 373380"/>
+                <a:gd name="connsiteY1" fmla="*/ 276860 h 318858"/>
+                <a:gd name="connsiteX2" fmla="*/ 373380 w 373380"/>
+                <a:gd name="connsiteY2" fmla="*/ 0 h 318858"/>
+                <a:gd name="connsiteX0" fmla="*/ 0 w 373380"/>
+                <a:gd name="connsiteY0" fmla="*/ 100965 h 319584"/>
+                <a:gd name="connsiteX1" fmla="*/ 143510 w 373380"/>
+                <a:gd name="connsiteY1" fmla="*/ 276860 h 319584"/>
+                <a:gd name="connsiteX2" fmla="*/ 373380 w 373380"/>
+                <a:gd name="connsiteY2" fmla="*/ 0 h 319584"/>
+                <a:gd name="connsiteX0" fmla="*/ 0 w 373380"/>
+                <a:gd name="connsiteY0" fmla="*/ 100965 h 327524"/>
+                <a:gd name="connsiteX1" fmla="*/ 143510 w 373380"/>
+                <a:gd name="connsiteY1" fmla="*/ 276860 h 327524"/>
+                <a:gd name="connsiteX2" fmla="*/ 373380 w 373380"/>
+                <a:gd name="connsiteY2" fmla="*/ 0 h 327524"/>
+                <a:gd name="connsiteX0" fmla="*/ 0 w 373380"/>
+                <a:gd name="connsiteY0" fmla="*/ 100965 h 325131"/>
+                <a:gd name="connsiteX1" fmla="*/ 143510 w 373380"/>
+                <a:gd name="connsiteY1" fmla="*/ 276860 h 325131"/>
+                <a:gd name="connsiteX2" fmla="*/ 373380 w 373380"/>
+                <a:gd name="connsiteY2" fmla="*/ 0 h 325131"/>
+                <a:gd name="connsiteX0" fmla="*/ 0 w 373380"/>
+                <a:gd name="connsiteY0" fmla="*/ 100965 h 322747"/>
+                <a:gd name="connsiteX1" fmla="*/ 143510 w 373380"/>
+                <a:gd name="connsiteY1" fmla="*/ 276860 h 322747"/>
+                <a:gd name="connsiteX2" fmla="*/ 373380 w 373380"/>
+                <a:gd name="connsiteY2" fmla="*/ 0 h 322747"/>
+                <a:gd name="connsiteX0" fmla="*/ 0 w 373380"/>
+                <a:gd name="connsiteY0" fmla="*/ 100965 h 322747"/>
+                <a:gd name="connsiteX1" fmla="*/ 143510 w 373380"/>
+                <a:gd name="connsiteY1" fmla="*/ 276860 h 322747"/>
+                <a:gd name="connsiteX2" fmla="*/ 373380 w 373380"/>
+                <a:gd name="connsiteY2" fmla="*/ 0 h 322747"/>
+                <a:gd name="connsiteX0" fmla="*/ 0 w 373380"/>
+                <a:gd name="connsiteY0" fmla="*/ 100965 h 311439"/>
+                <a:gd name="connsiteX1" fmla="*/ 177800 w 373380"/>
+                <a:gd name="connsiteY1" fmla="*/ 263525 h 311439"/>
+                <a:gd name="connsiteX2" fmla="*/ 373380 w 373380"/>
+                <a:gd name="connsiteY2" fmla="*/ 0 h 311439"/>
+                <a:gd name="connsiteX0" fmla="*/ 0 w 373380"/>
+                <a:gd name="connsiteY0" fmla="*/ 100965 h 324418"/>
+                <a:gd name="connsiteX1" fmla="*/ 177800 w 373380"/>
+                <a:gd name="connsiteY1" fmla="*/ 263525 h 324418"/>
+                <a:gd name="connsiteX2" fmla="*/ 373380 w 373380"/>
+                <a:gd name="connsiteY2" fmla="*/ 0 h 324418"/>
+                <a:gd name="connsiteX0" fmla="*/ 0 w 373380"/>
+                <a:gd name="connsiteY0" fmla="*/ 100965 h 317096"/>
+                <a:gd name="connsiteX1" fmla="*/ 177800 w 373380"/>
+                <a:gd name="connsiteY1" fmla="*/ 263525 h 317096"/>
+                <a:gd name="connsiteX2" fmla="*/ 373380 w 373380"/>
+                <a:gd name="connsiteY2" fmla="*/ 0 h 317096"/>
+                <a:gd name="connsiteX0" fmla="*/ 0 w 358140"/>
+                <a:gd name="connsiteY0" fmla="*/ 156210 h 274140"/>
+                <a:gd name="connsiteX1" fmla="*/ 162560 w 358140"/>
+                <a:gd name="connsiteY1" fmla="*/ 263525 h 274140"/>
+                <a:gd name="connsiteX2" fmla="*/ 358140 w 358140"/>
+                <a:gd name="connsiteY2" fmla="*/ 0 h 274140"/>
+                <a:gd name="connsiteX0" fmla="*/ 0 w 358140"/>
+                <a:gd name="connsiteY0" fmla="*/ 156210 h 323719"/>
+                <a:gd name="connsiteX1" fmla="*/ 162560 w 358140"/>
+                <a:gd name="connsiteY1" fmla="*/ 263525 h 323719"/>
+                <a:gd name="connsiteX2" fmla="*/ 358140 w 358140"/>
+                <a:gd name="connsiteY2" fmla="*/ 0 h 323719"/>
+                <a:gd name="connsiteX0" fmla="*/ 0 w 358140"/>
+                <a:gd name="connsiteY0" fmla="*/ 156210 h 312268"/>
+                <a:gd name="connsiteX1" fmla="*/ 143510 w 358140"/>
+                <a:gd name="connsiteY1" fmla="*/ 236855 h 312268"/>
+                <a:gd name="connsiteX2" fmla="*/ 358140 w 358140"/>
+                <a:gd name="connsiteY2" fmla="*/ 0 h 312268"/>
+                <a:gd name="connsiteX0" fmla="*/ 0 w 358140"/>
+                <a:gd name="connsiteY0" fmla="*/ 156210 h 323012"/>
+                <a:gd name="connsiteX1" fmla="*/ 143510 w 358140"/>
+                <a:gd name="connsiteY1" fmla="*/ 236855 h 323012"/>
+                <a:gd name="connsiteX2" fmla="*/ 358140 w 358140"/>
+                <a:gd name="connsiteY2" fmla="*/ 0 h 323012"/>
+                <a:gd name="connsiteX0" fmla="*/ 0 w 358140"/>
+                <a:gd name="connsiteY0" fmla="*/ 156210 h 324982"/>
+                <a:gd name="connsiteX1" fmla="*/ 143510 w 358140"/>
+                <a:gd name="connsiteY1" fmla="*/ 236855 h 324982"/>
+                <a:gd name="connsiteX2" fmla="*/ 358140 w 358140"/>
+                <a:gd name="connsiteY2" fmla="*/ 0 h 324982"/>
+                <a:gd name="connsiteX0" fmla="*/ 0 w 358140"/>
+                <a:gd name="connsiteY0" fmla="*/ 156210 h 317610"/>
+                <a:gd name="connsiteX1" fmla="*/ 145415 w 358140"/>
+                <a:gd name="connsiteY1" fmla="*/ 219710 h 317610"/>
+                <a:gd name="connsiteX2" fmla="*/ 358140 w 358140"/>
+                <a:gd name="connsiteY2" fmla="*/ 0 h 317610"/>
+                <a:gd name="connsiteX0" fmla="*/ 0 w 358140"/>
+                <a:gd name="connsiteY0" fmla="*/ 156210 h 312997"/>
+                <a:gd name="connsiteX1" fmla="*/ 137795 w 358140"/>
+                <a:gd name="connsiteY1" fmla="*/ 208280 h 312997"/>
+                <a:gd name="connsiteX2" fmla="*/ 358140 w 358140"/>
+                <a:gd name="connsiteY2" fmla="*/ 0 h 312997"/>
+                <a:gd name="connsiteX0" fmla="*/ 0 w 358140"/>
+                <a:gd name="connsiteY0" fmla="*/ 156210 h 304435"/>
+                <a:gd name="connsiteX1" fmla="*/ 143510 w 358140"/>
+                <a:gd name="connsiteY1" fmla="*/ 185420 h 304435"/>
+                <a:gd name="connsiteX2" fmla="*/ 358140 w 358140"/>
+                <a:gd name="connsiteY2" fmla="*/ 0 h 304435"/>
+                <a:gd name="connsiteX0" fmla="*/ 0 w 358140"/>
+                <a:gd name="connsiteY0" fmla="*/ 156210 h 305548"/>
+                <a:gd name="connsiteX1" fmla="*/ 143510 w 358140"/>
+                <a:gd name="connsiteY1" fmla="*/ 185420 h 305548"/>
+                <a:gd name="connsiteX2" fmla="*/ 358140 w 358140"/>
+                <a:gd name="connsiteY2" fmla="*/ 0 h 305548"/>
+                <a:gd name="connsiteX0" fmla="*/ 0 w 358140"/>
+                <a:gd name="connsiteY0" fmla="*/ 156210 h 311221"/>
+                <a:gd name="connsiteX1" fmla="*/ 173990 w 358140"/>
+                <a:gd name="connsiteY1" fmla="*/ 200660 h 311221"/>
+                <a:gd name="connsiteX2" fmla="*/ 358140 w 358140"/>
+                <a:gd name="connsiteY2" fmla="*/ 0 h 311221"/>
+                <a:gd name="connsiteX0" fmla="*/ 0 w 358140"/>
+                <a:gd name="connsiteY0" fmla="*/ 156210 h 314799"/>
+                <a:gd name="connsiteX1" fmla="*/ 173990 w 358140"/>
+                <a:gd name="connsiteY1" fmla="*/ 200660 h 314799"/>
+                <a:gd name="connsiteX2" fmla="*/ 358140 w 358140"/>
+                <a:gd name="connsiteY2" fmla="*/ 0 h 314799"/>
+                <a:gd name="connsiteX0" fmla="*/ 0 w 358140"/>
+                <a:gd name="connsiteY0" fmla="*/ 156210 h 315404"/>
+                <a:gd name="connsiteX1" fmla="*/ 173990 w 358140"/>
+                <a:gd name="connsiteY1" fmla="*/ 200660 h 315404"/>
+                <a:gd name="connsiteX2" fmla="*/ 358140 w 358140"/>
+                <a:gd name="connsiteY2" fmla="*/ 0 h 315404"/>
+                <a:gd name="connsiteX0" fmla="*/ 0 w 358140"/>
+                <a:gd name="connsiteY0" fmla="*/ 156210 h 315404"/>
+                <a:gd name="connsiteX1" fmla="*/ 173990 w 358140"/>
+                <a:gd name="connsiteY1" fmla="*/ 200660 h 315404"/>
+                <a:gd name="connsiteX2" fmla="*/ 358140 w 358140"/>
+                <a:gd name="connsiteY2" fmla="*/ 0 h 315404"/>
+                <a:gd name="connsiteX0" fmla="*/ 0 w 358140"/>
+                <a:gd name="connsiteY0" fmla="*/ 156210 h 315404"/>
+                <a:gd name="connsiteX1" fmla="*/ 173990 w 358140"/>
+                <a:gd name="connsiteY1" fmla="*/ 200660 h 315404"/>
+                <a:gd name="connsiteX2" fmla="*/ 358140 w 358140"/>
+                <a:gd name="connsiteY2" fmla="*/ 0 h 315404"/>
+                <a:gd name="connsiteX0" fmla="*/ 0 w 358140"/>
+                <a:gd name="connsiteY0" fmla="*/ 156210 h 313153"/>
+                <a:gd name="connsiteX1" fmla="*/ 164465 w 358140"/>
+                <a:gd name="connsiteY1" fmla="*/ 194945 h 313153"/>
+                <a:gd name="connsiteX2" fmla="*/ 358140 w 358140"/>
+                <a:gd name="connsiteY2" fmla="*/ 0 h 313153"/>
+                <a:gd name="connsiteX0" fmla="*/ 0 w 358140"/>
+                <a:gd name="connsiteY0" fmla="*/ 156210 h 313153"/>
+                <a:gd name="connsiteX1" fmla="*/ 164465 w 358140"/>
+                <a:gd name="connsiteY1" fmla="*/ 194945 h 313153"/>
+                <a:gd name="connsiteX2" fmla="*/ 358140 w 358140"/>
+                <a:gd name="connsiteY2" fmla="*/ 0 h 313153"/>
+                <a:gd name="connsiteX0" fmla="*/ 0 w 384810"/>
+                <a:gd name="connsiteY0" fmla="*/ 167640 h 305174"/>
+                <a:gd name="connsiteX1" fmla="*/ 191135 w 384810"/>
+                <a:gd name="connsiteY1" fmla="*/ 194945 h 305174"/>
+                <a:gd name="connsiteX2" fmla="*/ 384810 w 384810"/>
+                <a:gd name="connsiteY2" fmla="*/ 0 h 305174"/>
+                <a:gd name="connsiteX0" fmla="*/ 0 w 384810"/>
+                <a:gd name="connsiteY0" fmla="*/ 167640 h 290138"/>
+                <a:gd name="connsiteX1" fmla="*/ 191135 w 384810"/>
+                <a:gd name="connsiteY1" fmla="*/ 194945 h 290138"/>
+                <a:gd name="connsiteX2" fmla="*/ 384810 w 384810"/>
+                <a:gd name="connsiteY2" fmla="*/ 0 h 290138"/>
+                <a:gd name="connsiteX0" fmla="*/ 0 w 384810"/>
+                <a:gd name="connsiteY0" fmla="*/ 167640 h 297363"/>
+                <a:gd name="connsiteX1" fmla="*/ 200660 w 384810"/>
+                <a:gd name="connsiteY1" fmla="*/ 215900 h 297363"/>
+                <a:gd name="connsiteX2" fmla="*/ 384810 w 384810"/>
+                <a:gd name="connsiteY2" fmla="*/ 0 h 297363"/>
+                <a:gd name="connsiteX0" fmla="*/ 0 w 384810"/>
+                <a:gd name="connsiteY0" fmla="*/ 167640 h 328249"/>
+                <a:gd name="connsiteX1" fmla="*/ 200660 w 384810"/>
+                <a:gd name="connsiteY1" fmla="*/ 215900 h 328249"/>
+                <a:gd name="connsiteX2" fmla="*/ 384810 w 384810"/>
+                <a:gd name="connsiteY2" fmla="*/ 0 h 328249"/>
+                <a:gd name="connsiteX0" fmla="*/ 0 w 384810"/>
+                <a:gd name="connsiteY0" fmla="*/ 167640 h 326189"/>
+                <a:gd name="connsiteX1" fmla="*/ 200660 w 384810"/>
+                <a:gd name="connsiteY1" fmla="*/ 215900 h 326189"/>
+                <a:gd name="connsiteX2" fmla="*/ 384810 w 384810"/>
+                <a:gd name="connsiteY2" fmla="*/ 0 h 326189"/>
+                <a:gd name="connsiteX0" fmla="*/ 0 w 384810"/>
+                <a:gd name="connsiteY0" fmla="*/ 167640 h 316189"/>
+                <a:gd name="connsiteX1" fmla="*/ 200660 w 384810"/>
+                <a:gd name="connsiteY1" fmla="*/ 215900 h 316189"/>
+                <a:gd name="connsiteX2" fmla="*/ 384810 w 384810"/>
+                <a:gd name="connsiteY2" fmla="*/ 0 h 316189"/>
+                <a:gd name="connsiteX0" fmla="*/ 0 w 384810"/>
+                <a:gd name="connsiteY0" fmla="*/ 167640 h 308560"/>
+                <a:gd name="connsiteX1" fmla="*/ 200660 w 384810"/>
+                <a:gd name="connsiteY1" fmla="*/ 215900 h 308560"/>
+                <a:gd name="connsiteX2" fmla="*/ 384810 w 384810"/>
+                <a:gd name="connsiteY2" fmla="*/ 0 h 308560"/>
+                <a:gd name="connsiteX0" fmla="*/ 0 w 384810"/>
+                <a:gd name="connsiteY0" fmla="*/ 167640 h 308560"/>
+                <a:gd name="connsiteX1" fmla="*/ 187325 w 384810"/>
+                <a:gd name="connsiteY1" fmla="*/ 215900 h 308560"/>
+                <a:gd name="connsiteX2" fmla="*/ 384810 w 384810"/>
+                <a:gd name="connsiteY2" fmla="*/ 0 h 308560"/>
+                <a:gd name="connsiteX0" fmla="*/ 0 w 384810"/>
+                <a:gd name="connsiteY0" fmla="*/ 167640 h 301825"/>
+                <a:gd name="connsiteX1" fmla="*/ 187325 w 384810"/>
+                <a:gd name="connsiteY1" fmla="*/ 215900 h 301825"/>
+                <a:gd name="connsiteX2" fmla="*/ 384810 w 384810"/>
+                <a:gd name="connsiteY2" fmla="*/ 0 h 301825"/>
+                <a:gd name="connsiteX0" fmla="*/ 0 w 384810"/>
+                <a:gd name="connsiteY0" fmla="*/ 167640 h 286089"/>
+                <a:gd name="connsiteX1" fmla="*/ 187325 w 384810"/>
+                <a:gd name="connsiteY1" fmla="*/ 215900 h 286089"/>
+                <a:gd name="connsiteX2" fmla="*/ 384810 w 384810"/>
+                <a:gd name="connsiteY2" fmla="*/ 0 h 286089"/>
+                <a:gd name="connsiteX0" fmla="*/ 0 w 384810"/>
+                <a:gd name="connsiteY0" fmla="*/ 167640 h 245908"/>
+                <a:gd name="connsiteX1" fmla="*/ 187325 w 384810"/>
+                <a:gd name="connsiteY1" fmla="*/ 215900 h 245908"/>
+                <a:gd name="connsiteX2" fmla="*/ 384810 w 384810"/>
+                <a:gd name="connsiteY2" fmla="*/ 0 h 245908"/>
+                <a:gd name="connsiteX0" fmla="*/ 0 w 384810"/>
+                <a:gd name="connsiteY0" fmla="*/ 167640 h 297872"/>
+                <a:gd name="connsiteX1" fmla="*/ 158750 w 384810"/>
+                <a:gd name="connsiteY1" fmla="*/ 274955 h 297872"/>
+                <a:gd name="connsiteX2" fmla="*/ 384810 w 384810"/>
+                <a:gd name="connsiteY2" fmla="*/ 0 h 297872"/>
+                <a:gd name="connsiteX0" fmla="*/ 0 w 384810"/>
+                <a:gd name="connsiteY0" fmla="*/ 167640 h 301173"/>
+                <a:gd name="connsiteX1" fmla="*/ 158750 w 384810"/>
+                <a:gd name="connsiteY1" fmla="*/ 274955 h 301173"/>
+                <a:gd name="connsiteX2" fmla="*/ 384810 w 384810"/>
+                <a:gd name="connsiteY2" fmla="*/ 0 h 301173"/>
+                <a:gd name="connsiteX0" fmla="*/ 0 w 384810"/>
+                <a:gd name="connsiteY0" fmla="*/ 167640 h 304106"/>
+                <a:gd name="connsiteX1" fmla="*/ 158750 w 384810"/>
+                <a:gd name="connsiteY1" fmla="*/ 274955 h 304106"/>
+                <a:gd name="connsiteX2" fmla="*/ 384810 w 384810"/>
+                <a:gd name="connsiteY2" fmla="*/ 0 h 304106"/>
+                <a:gd name="connsiteX0" fmla="*/ 0 w 384810"/>
+                <a:gd name="connsiteY0" fmla="*/ 167640 h 299403"/>
+                <a:gd name="connsiteX1" fmla="*/ 158750 w 384810"/>
+                <a:gd name="connsiteY1" fmla="*/ 274955 h 299403"/>
+                <a:gd name="connsiteX2" fmla="*/ 384810 w 384810"/>
+                <a:gd name="connsiteY2" fmla="*/ 0 h 299403"/>
+              </a:gdLst>
+              <a:ahLst/>
+              <a:cxnLst>
+                <a:cxn ang="0">
+                  <a:pos x="connsiteX0" y="connsiteY0"/>
+                </a:cxn>
+                <a:cxn ang="0">
+                  <a:pos x="connsiteX1" y="connsiteY1"/>
+                </a:cxn>
+                <a:cxn ang="0">
+                  <a:pos x="connsiteX2" y="connsiteY2"/>
+                </a:cxn>
+              </a:cxnLst>
+              <a:rect l="l" t="t" r="r" b="b"/>
+              <a:pathLst>
+                <a:path w="384810" h="299403">
+                  <a:moveTo>
+                    <a:pt x="0" y="167640"/>
+                  </a:moveTo>
+                  <a:cubicBezTo>
+                    <a:pt x="88582" y="232727"/>
+                    <a:pt x="125095" y="350520"/>
+                    <a:pt x="158750" y="274955"/>
+                  </a:cubicBezTo>
+                  <a:cubicBezTo>
+                    <a:pt x="192405" y="199390"/>
+                    <a:pt x="247650" y="106045"/>
+                    <a:pt x="384810" y="0"/>
+                  </a:cubicBezTo>
+                </a:path>
+              </a:pathLst>
+            </a:custGeom>
+            <a:ln w="57150" cap="rnd" cmpd="sng">
+              <a:solidFill>
+                <a:srgbClr val="00B050"/>
+              </a:solidFill>
+              <a:round/>
+            </a:ln>
+          </p:spPr>
+          <p:style>
+            <a:lnRef idx="1">
+              <a:schemeClr val="accent1"/>
+            </a:lnRef>
+            <a:fillRef idx="0">
+              <a:schemeClr val="accent1"/>
+            </a:fillRef>
+            <a:effectRef idx="0">
+              <a:schemeClr val="accent1"/>
+            </a:effectRef>
+            <a:fontRef idx="minor">
+              <a:schemeClr val="tx1"/>
+            </a:fontRef>
+          </p:style>
+          <p:txBody>
+            <a:bodyPr rtlCol="0" anchor="ctr"/>
+            <a:lstStyle/>
+            <a:p>
+              <a:pPr algn="ctr"/>
+              <a:endParaRPr lang="nl-NL"/>
+            </a:p>
+          </p:txBody>
+        </p:sp>
+      </p:grpSp>
     </p:spTree>
     <p:extLst>
       <p:ext uri="{BB962C8B-B14F-4D97-AF65-F5344CB8AC3E}">

</xml_diff>